<commit_message>
Update exercise description in slides
</commit_message>
<xml_diff>
--- a/sparse-abft.pptx
+++ b/sparse-abft.pptx
@@ -303,7 +303,7 @@
             <a:fld id="{36830665-627D-8446-BB4C-F734FB643EF0}" type="datetime1">
               <a:rPr lang="en-US"/>
               <a:pPr/>
-              <a:t>09/04/16</a:t>
+              <a:t>11/04/16</a:t>
             </a:fld>
             <a:endParaRPr lang="en-US"/>
           </a:p>
@@ -13102,21 +13102,8 @@
           <a:p>
             <a:r>
               <a:rPr lang="en-GB" sz="2600" dirty="0" smtClean="0"/>
-              <a:t>Add </a:t>
-            </a:r>
-            <a:r>
-              <a:rPr lang="en-GB" sz="2600" dirty="0" smtClean="0"/>
-              <a:t>an extra </a:t>
-            </a:r>
-            <a:r>
-              <a:rPr lang="en-GB" sz="2600" dirty="0" smtClean="0"/>
-              <a:t>bit to </a:t>
-            </a:r>
-            <a:r>
-              <a:rPr lang="en-GB" sz="2600" dirty="0" smtClean="0"/>
-              <a:t>data (or repurpose an unused bit)</a:t>
-            </a:r>
-            <a:endParaRPr lang="en-GB" sz="2600" dirty="0" smtClean="0"/>
+              <a:t>Add an extra bit to data (or repurpose an unused bit)</a:t>
+            </a:r>
           </a:p>
           <a:p>
             <a:r>
@@ -13135,21 +13122,8 @@
             <a:pPr lvl="1"/>
             <a:r>
               <a:rPr lang="en-GB" sz="2600" dirty="0" smtClean="0"/>
-              <a:t>If </a:t>
-            </a:r>
-            <a:r>
-              <a:rPr lang="en-GB" sz="2600" dirty="0" smtClean="0"/>
-              <a:t>even </a:t>
-            </a:r>
-            <a:r>
-              <a:rPr lang="en-GB" sz="2600" dirty="0" smtClean="0"/>
-              <a:t>number, set parity bit to </a:t>
-            </a:r>
-            <a:r>
-              <a:rPr lang="en-GB" sz="2600" dirty="0" smtClean="0"/>
-              <a:t>‘0’</a:t>
-            </a:r>
-            <a:endParaRPr lang="en-GB" sz="2600" dirty="0" smtClean="0"/>
+              <a:t>If even number, set parity bit to ‘0’</a:t>
+            </a:r>
           </a:p>
           <a:p>
             <a:pPr lvl="1"/>
@@ -13187,11 +13161,7 @@
           <a:p>
             <a:r>
               <a:rPr lang="en-GB" sz="2600" dirty="0" smtClean="0"/>
-              <a:t>Can protect </a:t>
-            </a:r>
-            <a:r>
-              <a:rPr lang="en-GB" sz="2600" dirty="0" smtClean="0"/>
-              <a:t>any number of data bits</a:t>
+              <a:t>Can protect any number of data bits</a:t>
             </a:r>
           </a:p>
           <a:p>
@@ -18258,11 +18228,7 @@
             </a:r>
             <a:r>
               <a:rPr lang="en-GB" dirty="0" smtClean="0"/>
-              <a:t> (but not correct) </a:t>
-            </a:r>
-            <a:r>
-              <a:rPr lang="en-GB" dirty="0" smtClean="0"/>
-              <a:t>double-</a:t>
+              <a:t> (but not correct) double-</a:t>
             </a:r>
             <a:r>
               <a:rPr lang="en-GB" dirty="0"/>
@@ -18816,11 +18782,7 @@
             </a:r>
             <a:r>
               <a:rPr lang="en-GB" dirty="0" smtClean="0"/>
-              <a:t> </a:t>
-            </a:r>
-            <a:r>
-              <a:rPr lang="en-GB" dirty="0" smtClean="0"/>
-              <a:t>protects</a:t>
+              <a:t> protects</a:t>
             </a:r>
             <a:endParaRPr lang="en-GB" dirty="0"/>
           </a:p>
@@ -43462,13 +43424,8 @@
           <a:p>
             <a:r>
               <a:rPr lang="en-GB" dirty="0" smtClean="0"/>
-              <a:t>TODO: Show some performance </a:t>
-            </a:r>
-            <a:r>
-              <a:rPr lang="en-GB" dirty="0" smtClean="0"/>
-              <a:t>numbers for the different schemes?</a:t>
-            </a:r>
-            <a:endParaRPr lang="en-GB" dirty="0" smtClean="0"/>
+              <a:t>TODO: Show some performance numbers for the different schemes?</a:t>
+            </a:r>
           </a:p>
         </p:txBody>
       </p:sp>
@@ -43506,11 +43463,11 @@
   <p:clrMapOvr>
     <a:masterClrMapping/>
   </p:clrMapOvr>
-  <mc:AlternateContent xmlns:mc="http://schemas.openxmlformats.org/markup-compatibility/2006">
-    <mc:Choice xmlns:p14="http://schemas.microsoft.com/office/powerpoint/2010/main" Requires="p14">
+  <mc:AlternateContent xmlns:mc="http://schemas.openxmlformats.org/markup-compatibility/2006" xmlns:p14="http://schemas.microsoft.com/office/powerpoint/2010/main">
+    <mc:Choice Requires="p14">
       <p:transition spd="slow" p14:dur="2000"/>
     </mc:Choice>
-    <mc:Fallback>
+    <mc:Fallback xmlns="">
       <p:transition xmlns:p14="http://schemas.microsoft.com/office/powerpoint/2010/main" spd="slow"/>
     </mc:Fallback>
   </mc:AlternateContent>
@@ -43625,7 +43582,6 @@
               <a:rPr lang="en-GB" dirty="0" smtClean="0"/>
               <a:t>found</a:t>
             </a:r>
-            <a:endParaRPr lang="en-GB" dirty="0" smtClean="0"/>
           </a:p>
         </p:txBody>
       </p:sp>
@@ -43737,20 +43693,67 @@
           <a:lstStyle/>
           <a:p>
             <a:r>
-              <a:rPr lang="en-GB" dirty="0" smtClean="0"/>
-              <a:t>Comments in the code will guide you</a:t>
-            </a:r>
-          </a:p>
-          <a:p>
-            <a:r>
-              <a:rPr lang="en-GB" dirty="0" smtClean="0"/>
-              <a:t>Two routines are provided to do the heavy lifting (see comments for descriptions):</a:t>
+              <a:rPr lang="en-GB" sz="2800" dirty="0" smtClean="0"/>
+              <a:t>Comments in the code will guide </a:t>
+            </a:r>
+            <a:r>
+              <a:rPr lang="en-GB" sz="2800" dirty="0" smtClean="0"/>
+              <a:t>you</a:t>
             </a:r>
           </a:p>
           <a:p>
             <a:pPr lvl="1"/>
             <a:r>
-              <a:rPr lang="en-GB" b="1" dirty="0" smtClean="0">
+              <a:rPr lang="en-GB" sz="2400" dirty="0" smtClean="0"/>
+              <a:t>You just need to modify </a:t>
+            </a:r>
+            <a:r>
+              <a:rPr lang="en-GB" sz="2400" b="1" dirty="0" err="1" smtClean="0">
+                <a:solidFill>
+                  <a:srgbClr val="008000"/>
+                </a:solidFill>
+                <a:latin typeface="Courier New"/>
+                <a:cs typeface="Courier New"/>
+              </a:rPr>
+              <a:t>spmv.c</a:t>
+            </a:r>
+            <a:endParaRPr lang="en-GB" sz="2400" b="1" dirty="0" smtClean="0">
+              <a:solidFill>
+                <a:srgbClr val="008000"/>
+              </a:solidFill>
+              <a:latin typeface="Courier New"/>
+              <a:cs typeface="Courier New"/>
+            </a:endParaRPr>
+          </a:p>
+          <a:p>
+            <a:r>
+              <a:rPr lang="en-GB" sz="2800" dirty="0" smtClean="0"/>
+              <a:t>Two routines are provided to do the heavy lifting (see </a:t>
+            </a:r>
+            <a:r>
+              <a:rPr lang="en-GB" sz="2800" dirty="0" smtClean="0"/>
+              <a:t>comments in </a:t>
+            </a:r>
+            <a:r>
+              <a:rPr lang="en-GB" sz="2800" b="1" dirty="0" err="1" smtClean="0">
+                <a:latin typeface="Courier New"/>
+                <a:cs typeface="Courier New"/>
+              </a:rPr>
+              <a:t>common.h</a:t>
+            </a:r>
+            <a:r>
+              <a:rPr lang="en-GB" sz="2800" dirty="0" smtClean="0"/>
+              <a:t> </a:t>
+            </a:r>
+            <a:r>
+              <a:rPr lang="en-GB" sz="2800" dirty="0" smtClean="0"/>
+              <a:t>for descriptions):</a:t>
+            </a:r>
+          </a:p>
+          <a:p>
+            <a:pPr lvl="1"/>
+            <a:r>
+              <a:rPr lang="en-GB" sz="2400" b="1" dirty="0" smtClean="0">
                 <a:solidFill>
                   <a:srgbClr val="3366FF"/>
                 </a:solidFill>
@@ -43759,11 +43762,18 @@
               </a:rPr>
               <a:t>ecc_compute_col8</a:t>
             </a:r>
+            <a:endParaRPr lang="en-GB" sz="2400" b="1" dirty="0" smtClean="0">
+              <a:solidFill>
+                <a:srgbClr val="3366FF"/>
+              </a:solidFill>
+              <a:latin typeface="Courier New"/>
+              <a:cs typeface="Courier New"/>
+            </a:endParaRPr>
           </a:p>
           <a:p>
             <a:pPr lvl="1"/>
             <a:r>
-              <a:rPr lang="en-GB" b="1" dirty="0" smtClean="0">
+              <a:rPr lang="en-GB" sz="2400" b="1" dirty="0" smtClean="0">
                 <a:solidFill>
                   <a:srgbClr val="3366FF"/>
                 </a:solidFill>
@@ -43772,45 +43782,46 @@
               </a:rPr>
               <a:t>ecc_correct_col8</a:t>
             </a:r>
-          </a:p>
-          <a:p>
-            <a:r>
-              <a:rPr lang="en-GB" dirty="0"/>
+            <a:endParaRPr lang="en-GB" sz="2400" b="1" dirty="0" smtClean="0">
+              <a:solidFill>
+                <a:srgbClr val="3366FF"/>
+              </a:solidFill>
+              <a:latin typeface="Courier New"/>
+              <a:cs typeface="Courier New"/>
+            </a:endParaRPr>
+          </a:p>
+          <a:p>
+            <a:r>
+              <a:rPr lang="en-GB" sz="2800" dirty="0"/>
               <a:t>To test the code, pass the ‘</a:t>
             </a:r>
             <a:r>
-              <a:rPr lang="en-GB" dirty="0">
+              <a:rPr lang="en-GB" sz="2800" dirty="0">
                 <a:latin typeface="Courier New"/>
                 <a:cs typeface="Courier New"/>
               </a:rPr>
               <a:t>-x</a:t>
             </a:r>
             <a:r>
-              <a:rPr lang="en-GB" dirty="0"/>
-              <a:t>’ parameter to the application to inject a random bit-</a:t>
-            </a:r>
-            <a:r>
-              <a:rPr lang="en-GB" dirty="0" smtClean="0"/>
+              <a:rPr lang="en-GB" sz="2800" dirty="0"/>
+              <a:t>’ parameter to the application to inject a random bit</a:t>
+            </a:r>
+            <a:r>
+              <a:rPr lang="en-GB" sz="2800"/>
+              <a:t>-</a:t>
+            </a:r>
+            <a:r>
+              <a:rPr lang="en-GB" sz="2800" smtClean="0"/>
               <a:t>flip</a:t>
             </a:r>
-          </a:p>
-          <a:p>
-            <a:r>
-              <a:rPr lang="en-GB" dirty="0" smtClean="0"/>
-              <a:t>Use ‘</a:t>
-            </a:r>
-            <a:r>
-              <a:rPr lang="en-GB" dirty="0" smtClean="0">
-                <a:latin typeface="Courier New"/>
-                <a:cs typeface="Courier New"/>
-              </a:rPr>
-              <a:t>--help</a:t>
-            </a:r>
-            <a:r>
-              <a:rPr lang="en-GB" dirty="0" smtClean="0"/>
-              <a:t>’ to see other options</a:t>
-            </a:r>
-            <a:endParaRPr lang="en-GB" dirty="0"/>
+            <a:endParaRPr lang="en-GB" sz="2800" dirty="0" smtClean="0"/>
+          </a:p>
+          <a:p>
+            <a:r>
+              <a:rPr lang="en-GB" sz="2800" dirty="0" smtClean="0"/>
+              <a:t>Example solutions are provided</a:t>
+            </a:r>
+            <a:endParaRPr lang="en-GB" sz="2800" dirty="0"/>
           </a:p>
         </p:txBody>
       </p:sp>
@@ -43922,7 +43933,7 @@
           <a:lstStyle/>
           <a:p>
             <a:r>
-              <a:rPr lang="en-GB" b="1" dirty="0" smtClean="0">
+              <a:rPr lang="en-GB" sz="2800" b="1" dirty="0" smtClean="0">
                 <a:solidFill>
                   <a:srgbClr val="008000"/>
                 </a:solidFill>
@@ -43930,25 +43941,63 @@
               <a:t>Extras</a:t>
             </a:r>
             <a:r>
-              <a:rPr lang="en-GB" dirty="0" smtClean="0"/>
-              <a:t> (if you finish early!):</a:t>
+              <a:rPr lang="en-GB" sz="2800" dirty="0" smtClean="0"/>
+              <a:t> </a:t>
+            </a:r>
+            <a:r>
+              <a:rPr lang="en-GB" sz="2800" dirty="0" smtClean="0"/>
+              <a:t>(if you finish early!):</a:t>
             </a:r>
           </a:p>
           <a:p>
             <a:pPr lvl="1"/>
             <a:r>
-              <a:rPr lang="en-GB" dirty="0" smtClean="0"/>
-              <a:t>Add an additional overall parity bit to improve the performance of the error checking code</a:t>
-            </a:r>
+              <a:rPr lang="en-GB" sz="2400" dirty="0" smtClean="0"/>
+              <a:t>Add an additional overall parity bit to improve the performance of the error checking </a:t>
+            </a:r>
+            <a:r>
+              <a:rPr lang="en-GB" sz="2400" dirty="0" smtClean="0"/>
+              <a:t>code</a:t>
+            </a:r>
+          </a:p>
+          <a:p>
+            <a:pPr lvl="2"/>
+            <a:r>
+              <a:rPr lang="en-GB" sz="2000" dirty="0" smtClean="0"/>
+              <a:t>Use the </a:t>
+            </a:r>
+            <a:r>
+              <a:rPr lang="en-GB" sz="2000" b="1" dirty="0" err="1" smtClean="0">
+                <a:solidFill>
+                  <a:srgbClr val="3366FF"/>
+                </a:solidFill>
+                <a:latin typeface="Courier New"/>
+                <a:cs typeface="Courier New"/>
+              </a:rPr>
+              <a:t>ecc_compute_overall_partity</a:t>
+            </a:r>
+            <a:r>
+              <a:rPr lang="en-GB" sz="2000" dirty="0" smtClean="0"/>
+              <a:t> routine</a:t>
+            </a:r>
+            <a:endParaRPr lang="en-GB" sz="2000" dirty="0" smtClean="0"/>
           </a:p>
           <a:p>
             <a:pPr lvl="1"/>
             <a:r>
-              <a:rPr lang="en-GB" dirty="0" smtClean="0"/>
-              <a:t>Or use the extra parity bit implement a SECDED scheme </a:t>
-            </a:r>
-            <a:r>
-              <a:rPr lang="en-GB" b="1" dirty="0" smtClean="0">
+              <a:rPr lang="en-GB" sz="2400" dirty="0" smtClean="0"/>
+              <a:t>Or use the extra parity bit </a:t>
+            </a:r>
+            <a:r>
+              <a:rPr lang="en-GB" sz="2400" dirty="0" smtClean="0"/>
+              <a:t>to implement </a:t>
+            </a:r>
+            <a:r>
+              <a:rPr lang="en-GB" sz="2400" dirty="0" smtClean="0"/>
+              <a:t>a SECDED scheme </a:t>
+            </a:r>
+            <a:r>
+              <a:rPr lang="en-GB" sz="2400" b="1" dirty="0" smtClean="0">
                 <a:solidFill>
                   <a:srgbClr val="FF0000"/>
                 </a:solidFill>
@@ -43959,11 +44008,11 @@
           <a:p>
             <a:pPr lvl="1"/>
             <a:r>
-              <a:rPr lang="en-GB" dirty="0" smtClean="0"/>
+              <a:rPr lang="en-GB" sz="2400" dirty="0" smtClean="0"/>
               <a:t>Try other parity bit placement schemes (4 bits in row and 4 in column, or use the least significant bits of the value)</a:t>
             </a:r>
             <a:r>
-              <a:rPr lang="en-GB" b="1" dirty="0" smtClean="0">
+              <a:rPr lang="en-GB" sz="2400" b="1" dirty="0" smtClean="0">
                 <a:solidFill>
                   <a:srgbClr val="FF0000"/>
                 </a:solidFill>
@@ -44096,15 +44145,7 @@
           <a:p>
             <a:r>
               <a:rPr lang="en-GB" dirty="0" smtClean="0"/>
-              <a:t>Since most </a:t>
-            </a:r>
-            <a:r>
-              <a:rPr lang="en-GB" dirty="0" smtClean="0"/>
-              <a:t>of the matrix elements are </a:t>
-            </a:r>
-            <a:r>
-              <a:rPr lang="en-GB" dirty="0" smtClean="0"/>
-              <a:t>zero, sparse matrices are </a:t>
+              <a:t>Since most of the matrix elements are zero, sparse matrices are </a:t>
             </a:r>
             <a:r>
               <a:rPr lang="en-GB" dirty="0"/>
@@ -44112,21 +44153,13 @@
             </a:r>
             <a:r>
               <a:rPr lang="en-GB" dirty="0" smtClean="0"/>
-              <a:t>tored </a:t>
-            </a:r>
+              <a:t>tored in a compressed format</a:t>
+            </a:r>
+          </a:p>
+          <a:p>
             <a:r>
               <a:rPr lang="en-GB" dirty="0" smtClean="0"/>
-              <a:t>in a compressed format</a:t>
-            </a:r>
-          </a:p>
-          <a:p>
-            <a:r>
-              <a:rPr lang="en-GB" dirty="0" smtClean="0"/>
-              <a:t>Which elements are </a:t>
-            </a:r>
-            <a:r>
-              <a:rPr lang="en-GB" dirty="0" smtClean="0"/>
-              <a:t>non-zero may change over time</a:t>
+              <a:t>Which elements are non-zero may change over time</a:t>
             </a:r>
           </a:p>
           <a:p>

</xml_diff>

<commit_message>
Add example code for SEC8 and SECDED schemes
</commit_message>
<xml_diff>
--- a/sparse-abft.pptx
+++ b/sparse-abft.pptx
@@ -5,10 +5,10 @@
     <p:sldMasterId id="2147483649" r:id="rId3"/>
   </p:sldMasterIdLst>
   <p:notesMasterIdLst>
-    <p:notesMasterId r:id="rId53"/>
+    <p:notesMasterId r:id="rId55"/>
   </p:notesMasterIdLst>
   <p:handoutMasterIdLst>
-    <p:handoutMasterId r:id="rId54"/>
+    <p:handoutMasterId r:id="rId56"/>
   </p:handoutMasterIdLst>
   <p:sldIdLst>
     <p:sldId id="257" r:id="rId4"/>
@@ -54,12 +54,14 @@
     <p:sldId id="612" r:id="rId44"/>
     <p:sldId id="622" r:id="rId45"/>
     <p:sldId id="613" r:id="rId46"/>
-    <p:sldId id="621" r:id="rId47"/>
-    <p:sldId id="615" r:id="rId48"/>
-    <p:sldId id="620" r:id="rId49"/>
-    <p:sldId id="618" r:id="rId50"/>
-    <p:sldId id="588" r:id="rId51"/>
-    <p:sldId id="619" r:id="rId52"/>
+    <p:sldId id="625" r:id="rId47"/>
+    <p:sldId id="621" r:id="rId48"/>
+    <p:sldId id="615" r:id="rId49"/>
+    <p:sldId id="626" r:id="rId50"/>
+    <p:sldId id="620" r:id="rId51"/>
+    <p:sldId id="618" r:id="rId52"/>
+    <p:sldId id="588" r:id="rId53"/>
+    <p:sldId id="619" r:id="rId54"/>
   </p:sldIdLst>
   <p:sldSz cx="9144000" cy="6858000" type="screen4x3"/>
   <p:notesSz cx="6858000" cy="9144000"/>
@@ -3308,7 +3310,7 @@
             <a:fld id="{1C811BE7-51AF-BD41-88D3-08D74CFB37BF}" type="slidenum">
               <a:rPr lang="en-GB" smtClean="0"/>
               <a:pPr/>
-              <a:t>45</a:t>
+              <a:t>44</a:t>
             </a:fld>
             <a:endParaRPr lang="en-GB"/>
           </a:p>
@@ -3317,7 +3319,7 @@
     </p:spTree>
     <p:extLst>
       <p:ext uri="{BB962C8B-B14F-4D97-AF65-F5344CB8AC3E}">
-        <p14:creationId xmlns:p14="http://schemas.microsoft.com/office/powerpoint/2010/main" val="645188229"/>
+        <p14:creationId xmlns:p14="http://schemas.microsoft.com/office/powerpoint/2010/main" val="2174565375"/>
       </p:ext>
     </p:extLst>
   </p:cSld>
@@ -3393,7 +3395,177 @@
             <a:fld id="{1C811BE7-51AF-BD41-88D3-08D74CFB37BF}" type="slidenum">
               <a:rPr lang="en-GB" smtClean="0"/>
               <a:pPr/>
+              <a:t>46</a:t>
+            </a:fld>
+            <a:endParaRPr lang="en-GB"/>
+          </a:p>
+        </p:txBody>
+      </p:sp>
+    </p:spTree>
+    <p:extLst>
+      <p:ext uri="{BB962C8B-B14F-4D97-AF65-F5344CB8AC3E}">
+        <p14:creationId xmlns:p14="http://schemas.microsoft.com/office/powerpoint/2010/main" val="645188229"/>
+      </p:ext>
+    </p:extLst>
+  </p:cSld>
+  <p:clrMapOvr>
+    <a:masterClrMapping/>
+  </p:clrMapOvr>
+</p:notes>
+</file>
+
+<file path=ppt/notesSlides/notesSlide32.xml><?xml version="1.0" encoding="utf-8"?>
+<p:notes xmlns:a="http://schemas.openxmlformats.org/drawingml/2006/main" xmlns:r="http://schemas.openxmlformats.org/officeDocument/2006/relationships" xmlns:p="http://schemas.openxmlformats.org/presentationml/2006/main">
+  <p:cSld>
+    <p:spTree>
+      <p:nvGrpSpPr>
+        <p:cNvPr id="1" name=""/>
+        <p:cNvGrpSpPr/>
+        <p:nvPr/>
+      </p:nvGrpSpPr>
+      <p:grpSpPr>
+        <a:xfrm>
+          <a:off x="0" y="0"/>
+          <a:ext cx="0" cy="0"/>
+          <a:chOff x="0" y="0"/>
+          <a:chExt cx="0" cy="0"/>
+        </a:xfrm>
+      </p:grpSpPr>
+      <p:sp>
+        <p:nvSpPr>
+          <p:cNvPr id="2" name="Slide Image Placeholder 1"/>
+          <p:cNvSpPr>
+            <a:spLocks noGrp="1" noRot="1" noChangeAspect="1"/>
+          </p:cNvSpPr>
+          <p:nvPr>
+            <p:ph type="sldImg"/>
+          </p:nvPr>
+        </p:nvSpPr>
+        <p:spPr/>
+      </p:sp>
+      <p:sp>
+        <p:nvSpPr>
+          <p:cNvPr id="3" name="Notes Placeholder 2"/>
+          <p:cNvSpPr>
+            <a:spLocks noGrp="1"/>
+          </p:cNvSpPr>
+          <p:nvPr>
+            <p:ph type="body" idx="1"/>
+          </p:nvPr>
+        </p:nvSpPr>
+        <p:spPr/>
+        <p:txBody>
+          <a:bodyPr/>
+          <a:lstStyle/>
+          <a:p>
+            <a:endParaRPr lang="en-GB" dirty="0"/>
+          </a:p>
+        </p:txBody>
+      </p:sp>
+      <p:sp>
+        <p:nvSpPr>
+          <p:cNvPr id="4" name="Slide Number Placeholder 3"/>
+          <p:cNvSpPr>
+            <a:spLocks noGrp="1"/>
+          </p:cNvSpPr>
+          <p:nvPr>
+            <p:ph type="sldNum" sz="quarter" idx="10"/>
+          </p:nvPr>
+        </p:nvSpPr>
+        <p:spPr/>
+        <p:txBody>
+          <a:bodyPr/>
+          <a:lstStyle/>
+          <a:p>
+            <a:fld id="{1C811BE7-51AF-BD41-88D3-08D74CFB37BF}" type="slidenum">
+              <a:rPr lang="en-GB" smtClean="0"/>
+              <a:pPr/>
               <a:t>47</a:t>
+            </a:fld>
+            <a:endParaRPr lang="en-GB"/>
+          </a:p>
+        </p:txBody>
+      </p:sp>
+    </p:spTree>
+    <p:extLst>
+      <p:ext uri="{BB962C8B-B14F-4D97-AF65-F5344CB8AC3E}">
+        <p14:creationId xmlns:p14="http://schemas.microsoft.com/office/powerpoint/2010/main" val="2174565375"/>
+      </p:ext>
+    </p:extLst>
+  </p:cSld>
+  <p:clrMapOvr>
+    <a:masterClrMapping/>
+  </p:clrMapOvr>
+</p:notes>
+</file>
+
+<file path=ppt/notesSlides/notesSlide33.xml><?xml version="1.0" encoding="utf-8"?>
+<p:notes xmlns:a="http://schemas.openxmlformats.org/drawingml/2006/main" xmlns:r="http://schemas.openxmlformats.org/officeDocument/2006/relationships" xmlns:p="http://schemas.openxmlformats.org/presentationml/2006/main">
+  <p:cSld>
+    <p:spTree>
+      <p:nvGrpSpPr>
+        <p:cNvPr id="1" name=""/>
+        <p:cNvGrpSpPr/>
+        <p:nvPr/>
+      </p:nvGrpSpPr>
+      <p:grpSpPr>
+        <a:xfrm>
+          <a:off x="0" y="0"/>
+          <a:ext cx="0" cy="0"/>
+          <a:chOff x="0" y="0"/>
+          <a:chExt cx="0" cy="0"/>
+        </a:xfrm>
+      </p:grpSpPr>
+      <p:sp>
+        <p:nvSpPr>
+          <p:cNvPr id="2" name="Slide Image Placeholder 1"/>
+          <p:cNvSpPr>
+            <a:spLocks noGrp="1" noRot="1" noChangeAspect="1"/>
+          </p:cNvSpPr>
+          <p:nvPr>
+            <p:ph type="sldImg"/>
+          </p:nvPr>
+        </p:nvSpPr>
+        <p:spPr/>
+      </p:sp>
+      <p:sp>
+        <p:nvSpPr>
+          <p:cNvPr id="3" name="Notes Placeholder 2"/>
+          <p:cNvSpPr>
+            <a:spLocks noGrp="1"/>
+          </p:cNvSpPr>
+          <p:nvPr>
+            <p:ph type="body" idx="1"/>
+          </p:nvPr>
+        </p:nvSpPr>
+        <p:spPr/>
+        <p:txBody>
+          <a:bodyPr/>
+          <a:lstStyle/>
+          <a:p>
+            <a:endParaRPr lang="en-GB" dirty="0"/>
+          </a:p>
+        </p:txBody>
+      </p:sp>
+      <p:sp>
+        <p:nvSpPr>
+          <p:cNvPr id="4" name="Slide Number Placeholder 3"/>
+          <p:cNvSpPr>
+            <a:spLocks noGrp="1"/>
+          </p:cNvSpPr>
+          <p:nvPr>
+            <p:ph type="sldNum" sz="quarter" idx="10"/>
+          </p:nvPr>
+        </p:nvSpPr>
+        <p:spPr/>
+        <p:txBody>
+          <a:bodyPr/>
+          <a:lstStyle/>
+          <a:p>
+            <a:fld id="{1C811BE7-51AF-BD41-88D3-08D74CFB37BF}" type="slidenum">
+              <a:rPr lang="en-GB" smtClean="0"/>
+              <a:pPr/>
+              <a:t>49</a:t>
             </a:fld>
             <a:endParaRPr lang="en-GB"/>
           </a:p>
@@ -42966,47 +43138,47 @@
           <a:lstStyle/>
           <a:p>
             <a:r>
-              <a:rPr lang="en-GB" sz="2800" dirty="0" smtClean="0"/>
+              <a:rPr lang="en-GB" sz="2600" dirty="0" smtClean="0"/>
               <a:t>Interleaving the parity bits with the data will be very expensive</a:t>
             </a:r>
           </a:p>
           <a:p>
             <a:r>
-              <a:rPr lang="en-GB" sz="2800" dirty="0" smtClean="0"/>
+              <a:rPr lang="en-GB" sz="2600" dirty="0" smtClean="0"/>
               <a:t>Instead, we can store the parity bits somewhere else, and just perform the hamming code operations </a:t>
             </a:r>
             <a:r>
-              <a:rPr lang="en-GB" sz="2800" b="1" i="1" dirty="0" smtClean="0"/>
+              <a:rPr lang="en-GB" sz="2600" b="1" i="1" dirty="0" smtClean="0"/>
               <a:t>as if</a:t>
             </a:r>
             <a:r>
-              <a:rPr lang="en-GB" sz="2800" dirty="0" smtClean="0"/>
+              <a:rPr lang="en-GB" sz="2600" dirty="0" smtClean="0"/>
               <a:t> they were in the correct (power-of-two) positions</a:t>
             </a:r>
           </a:p>
           <a:p>
             <a:r>
-              <a:rPr lang="en-GB" sz="2800" dirty="0" smtClean="0"/>
+              <a:rPr lang="en-GB" sz="2600" dirty="0" smtClean="0"/>
               <a:t>If we store the parity bits in the </a:t>
             </a:r>
             <a:r>
-              <a:rPr lang="en-GB" sz="2800" dirty="0"/>
+              <a:rPr lang="en-GB" sz="2600" dirty="0"/>
               <a:t>unused </a:t>
             </a:r>
             <a:r>
-              <a:rPr lang="en-GB" sz="2800" dirty="0" smtClean="0"/>
+              <a:rPr lang="en-GB" sz="2600" dirty="0" smtClean="0"/>
               <a:t>high-order bits </a:t>
             </a:r>
             <a:r>
-              <a:rPr lang="en-GB" sz="2800" dirty="0"/>
+              <a:rPr lang="en-GB" sz="2600" dirty="0"/>
               <a:t>of the matrix </a:t>
             </a:r>
             <a:r>
-              <a:rPr lang="en-GB" sz="2800" dirty="0" smtClean="0"/>
+              <a:rPr lang="en-GB" sz="2600" dirty="0" smtClean="0"/>
               <a:t>indices, masking them out becomes a simple bitwise </a:t>
             </a:r>
             <a:r>
-              <a:rPr lang="en-GB" sz="2800" b="1" dirty="0" smtClean="0">
+              <a:rPr lang="en-GB" sz="2600" b="1" dirty="0" smtClean="0">
                 <a:solidFill>
                   <a:srgbClr val="0000FF"/>
                 </a:solidFill>
@@ -43014,9 +43186,38 @@
               <a:t>AND</a:t>
             </a:r>
             <a:r>
-              <a:rPr lang="en-GB" sz="2800" dirty="0" smtClean="0"/>
-              <a:t> operation</a:t>
-            </a:r>
+              <a:rPr lang="en-GB" sz="2600" dirty="0" smtClean="0"/>
+              <a:t> </a:t>
+            </a:r>
+            <a:r>
+              <a:rPr lang="en-GB" sz="2600" dirty="0" smtClean="0"/>
+              <a:t>operation</a:t>
+            </a:r>
+          </a:p>
+          <a:p>
+            <a:r>
+              <a:rPr lang="en-GB" sz="2600" dirty="0"/>
+              <a:t>We can </a:t>
+            </a:r>
+            <a:r>
+              <a:rPr lang="en-GB" sz="2600" dirty="0" err="1"/>
+              <a:t>precompute</a:t>
+            </a:r>
+            <a:r>
+              <a:rPr lang="en-GB" sz="2600" dirty="0"/>
+              <a:t> </a:t>
+            </a:r>
+            <a:r>
+              <a:rPr lang="en-GB" sz="2600" dirty="0" smtClean="0"/>
+              <a:t>some masks </a:t>
+            </a:r>
+            <a:r>
+              <a:rPr lang="en-GB" sz="2600" dirty="0"/>
+              <a:t>for efficient extraction of the correct bits</a:t>
+            </a:r>
+          </a:p>
+          <a:p>
+            <a:endParaRPr lang="en-GB" sz="2600" dirty="0" smtClean="0"/>
           </a:p>
         </p:txBody>
       </p:sp>
@@ -43114,41 +43315,6 @@
       </p:sp>
       <p:sp>
         <p:nvSpPr>
-          <p:cNvPr id="3" name="Content Placeholder 2"/>
-          <p:cNvSpPr>
-            <a:spLocks noGrp="1"/>
-          </p:cNvSpPr>
-          <p:nvPr>
-            <p:ph idx="1"/>
-          </p:nvPr>
-        </p:nvSpPr>
-        <p:spPr>
-          <a:xfrm>
-            <a:off x="457200" y="1054100"/>
-            <a:ext cx="8229600" cy="1066800"/>
-          </a:xfrm>
-        </p:spPr>
-        <p:txBody>
-          <a:bodyPr/>
-          <a:lstStyle/>
-          <a:p>
-            <a:r>
-              <a:rPr lang="en-GB" sz="2400" dirty="0" smtClean="0"/>
-              <a:t>We can </a:t>
-            </a:r>
-            <a:r>
-              <a:rPr lang="en-GB" sz="2400" dirty="0" err="1" smtClean="0"/>
-              <a:t>precompute</a:t>
-            </a:r>
-            <a:r>
-              <a:rPr lang="en-GB" sz="2400" dirty="0" smtClean="0"/>
-              <a:t> some masks for efficient extraction of the correct bits</a:t>
-            </a:r>
-          </a:p>
-        </p:txBody>
-      </p:sp>
-      <p:sp>
-        <p:nvSpPr>
           <p:cNvPr id="4" name="Slide Number Placeholder 3"/>
           <p:cNvSpPr>
             <a:spLocks noGrp="1"/>
@@ -43181,8 +43347,8 @@
         </p:nvSpPr>
         <p:spPr bwMode="auto">
           <a:xfrm>
-            <a:off x="1168400" y="1905000"/>
-            <a:ext cx="7670800" cy="4330700"/>
+            <a:off x="584200" y="1206500"/>
+            <a:ext cx="8255000" cy="5029200"/>
           </a:xfrm>
           <a:prstGeom prst="rect">
             <a:avLst/>
@@ -44461,7 +44627,11 @@
           <a:p>
             <a:r>
               <a:rPr lang="en-GB" sz="4000" dirty="0" smtClean="0"/>
-              <a:t>Hamming codes - implementation</a:t>
+              <a:t>Hamming codes - </a:t>
+            </a:r>
+            <a:r>
+              <a:rPr lang="en-GB" sz="4000" dirty="0" smtClean="0"/>
+              <a:t>optimisation</a:t>
             </a:r>
             <a:endParaRPr lang="en-GB" sz="4000" dirty="0"/>
           </a:p>
@@ -44611,6 +44781,759 @@
           <a:lstStyle/>
           <a:p>
             <a:r>
+              <a:rPr lang="en-GB" sz="4000" dirty="0" smtClean="0"/>
+              <a:t>Hamming codes - </a:t>
+            </a:r>
+            <a:r>
+              <a:rPr lang="en-GB" sz="4000" dirty="0"/>
+              <a:t>optimisation</a:t>
+            </a:r>
+            <a:endParaRPr lang="en-GB" sz="4000" dirty="0"/>
+          </a:p>
+        </p:txBody>
+      </p:sp>
+      <p:sp>
+        <p:nvSpPr>
+          <p:cNvPr id="4" name="Slide Number Placeholder 3"/>
+          <p:cNvSpPr>
+            <a:spLocks noGrp="1"/>
+          </p:cNvSpPr>
+          <p:nvPr>
+            <p:ph type="sldNum" sz="quarter" idx="10"/>
+          </p:nvPr>
+        </p:nvSpPr>
+        <p:spPr/>
+        <p:txBody>
+          <a:bodyPr/>
+          <a:lstStyle/>
+          <a:p>
+            <a:fld id="{D9B8CB04-7B95-2844-BD15-B133C35E4786}" type="slidenum">
+              <a:rPr lang="en-GB" smtClean="0"/>
+              <a:pPr/>
+              <a:t>44</a:t>
+            </a:fld>
+            <a:endParaRPr lang="en-GB"/>
+          </a:p>
+        </p:txBody>
+      </p:sp>
+      <p:sp>
+        <p:nvSpPr>
+          <p:cNvPr id="5" name="Content Placeholder 2"/>
+          <p:cNvSpPr txBox="1">
+            <a:spLocks/>
+          </p:cNvSpPr>
+          <p:nvPr/>
+        </p:nvSpPr>
+        <p:spPr bwMode="auto">
+          <a:xfrm>
+            <a:off x="457200" y="1079500"/>
+            <a:ext cx="8382000" cy="5156200"/>
+          </a:xfrm>
+          <a:prstGeom prst="rect">
+            <a:avLst/>
+          </a:prstGeom>
+          <a:noFill/>
+          <a:ln>
+            <a:noFill/>
+          </a:ln>
+          <a:extLst>
+            <a:ext uri="{909E8E84-426E-40dd-AFC4-6F175D3DCCD1}">
+              <a14:hiddenFill xmlns:a14="http://schemas.microsoft.com/office/drawing/2010/main">
+                <a:solidFill>
+                  <a:srgbClr val="FFFFFF"/>
+                </a:solidFill>
+              </a14:hiddenFill>
+            </a:ext>
+            <a:ext uri="{91240B29-F687-4f45-9708-019B960494DF}">
+              <a14:hiddenLine xmlns:a14="http://schemas.microsoft.com/office/drawing/2010/main" w="9525">
+                <a:solidFill>
+                  <a:srgbClr val="000000"/>
+                </a:solidFill>
+                <a:miter lim="800000"/>
+                <a:headEnd/>
+                <a:tailEnd/>
+              </a14:hiddenLine>
+            </a:ext>
+            <a:ext uri="{FAA26D3D-D897-4be2-8F04-BA451C77F1D7}">
+              <ma14:placeholderFlag xmlns:ma14="http://schemas.microsoft.com/office/mac/drawingml/2011/main" val="1"/>
+            </a:ext>
+          </a:extLst>
+        </p:spPr>
+        <p:txBody>
+          <a:bodyPr vert="horz" wrap="square" lIns="91440" tIns="45720" rIns="91440" bIns="45720" numCol="1" anchor="t" anchorCtr="0" compatLnSpc="1">
+            <a:prstTxWarp prst="textNoShape">
+              <a:avLst/>
+            </a:prstTxWarp>
+          </a:bodyPr>
+          <a:lstStyle>
+            <a:lvl1pPr marL="342900" indent="-342900" algn="l" rtl="0" eaLnBrk="0" fontAlgn="base" hangingPunct="0">
+              <a:spcBef>
+                <a:spcPct val="20000"/>
+              </a:spcBef>
+              <a:spcAft>
+                <a:spcPct val="0"/>
+              </a:spcAft>
+              <a:buClr>
+                <a:srgbClr val="2858BB"/>
+              </a:buClr>
+              <a:buChar char="•"/>
+              <a:defRPr sz="3200">
+                <a:solidFill>
+                  <a:schemeClr val="tx1"/>
+                </a:solidFill>
+                <a:latin typeface="+mn-lt"/>
+                <a:ea typeface="ＭＳ Ｐゴシック" charset="-128"/>
+                <a:cs typeface="ＭＳ Ｐゴシック" charset="-128"/>
+              </a:defRPr>
+            </a:lvl1pPr>
+            <a:lvl2pPr marL="742950" indent="-285750" algn="l" rtl="0" eaLnBrk="0" fontAlgn="base" hangingPunct="0">
+              <a:spcBef>
+                <a:spcPct val="20000"/>
+              </a:spcBef>
+              <a:spcAft>
+                <a:spcPct val="0"/>
+              </a:spcAft>
+              <a:buClr>
+                <a:srgbClr val="2858BB"/>
+              </a:buClr>
+              <a:buChar char="•"/>
+              <a:defRPr sz="2800">
+                <a:solidFill>
+                  <a:schemeClr val="tx1"/>
+                </a:solidFill>
+                <a:latin typeface="+mn-lt"/>
+                <a:ea typeface="ＭＳ Ｐゴシック" charset="-128"/>
+              </a:defRPr>
+            </a:lvl2pPr>
+            <a:lvl3pPr marL="1143000" indent="-228600" algn="l" rtl="0" eaLnBrk="0" fontAlgn="base" hangingPunct="0">
+              <a:spcBef>
+                <a:spcPct val="20000"/>
+              </a:spcBef>
+              <a:spcAft>
+                <a:spcPct val="0"/>
+              </a:spcAft>
+              <a:buClr>
+                <a:srgbClr val="2858BB"/>
+              </a:buClr>
+              <a:buChar char="•"/>
+              <a:defRPr sz="2400">
+                <a:solidFill>
+                  <a:schemeClr val="tx1"/>
+                </a:solidFill>
+                <a:latin typeface="+mn-lt"/>
+                <a:ea typeface="ＭＳ Ｐゴシック" charset="-128"/>
+              </a:defRPr>
+            </a:lvl3pPr>
+            <a:lvl4pPr marL="1600200" indent="-228600" algn="l" rtl="0" eaLnBrk="0" fontAlgn="base" hangingPunct="0">
+              <a:spcBef>
+                <a:spcPct val="20000"/>
+              </a:spcBef>
+              <a:spcAft>
+                <a:spcPct val="0"/>
+              </a:spcAft>
+              <a:buChar char="–"/>
+              <a:defRPr sz="2000">
+                <a:solidFill>
+                  <a:schemeClr val="tx1"/>
+                </a:solidFill>
+                <a:latin typeface="+mn-lt"/>
+                <a:ea typeface="ＭＳ Ｐゴシック" charset="-128"/>
+              </a:defRPr>
+            </a:lvl4pPr>
+            <a:lvl5pPr marL="2057400" indent="-228600" algn="l" rtl="0" eaLnBrk="0" fontAlgn="base" hangingPunct="0">
+              <a:spcBef>
+                <a:spcPct val="20000"/>
+              </a:spcBef>
+              <a:spcAft>
+                <a:spcPct val="0"/>
+              </a:spcAft>
+              <a:buChar char="»"/>
+              <a:defRPr sz="2000">
+                <a:solidFill>
+                  <a:schemeClr val="tx1"/>
+                </a:solidFill>
+                <a:latin typeface="+mn-lt"/>
+                <a:ea typeface="ＭＳ Ｐゴシック" charset="-128"/>
+              </a:defRPr>
+            </a:lvl5pPr>
+            <a:lvl6pPr marL="2514600" indent="-228600" algn="l" rtl="0" fontAlgn="base">
+              <a:spcBef>
+                <a:spcPct val="20000"/>
+              </a:spcBef>
+              <a:spcAft>
+                <a:spcPct val="0"/>
+              </a:spcAft>
+              <a:buChar char="»"/>
+              <a:defRPr sz="2000">
+                <a:solidFill>
+                  <a:schemeClr val="tx1"/>
+                </a:solidFill>
+                <a:latin typeface="+mn-lt"/>
+                <a:ea typeface="ＭＳ Ｐゴシック" charset="-128"/>
+              </a:defRPr>
+            </a:lvl6pPr>
+            <a:lvl7pPr marL="2971800" indent="-228600" algn="l" rtl="0" fontAlgn="base">
+              <a:spcBef>
+                <a:spcPct val="20000"/>
+              </a:spcBef>
+              <a:spcAft>
+                <a:spcPct val="0"/>
+              </a:spcAft>
+              <a:buChar char="»"/>
+              <a:defRPr sz="2000">
+                <a:solidFill>
+                  <a:schemeClr val="tx1"/>
+                </a:solidFill>
+                <a:latin typeface="+mn-lt"/>
+                <a:ea typeface="ＭＳ Ｐゴシック" charset="-128"/>
+              </a:defRPr>
+            </a:lvl7pPr>
+            <a:lvl8pPr marL="3429000" indent="-228600" algn="l" rtl="0" fontAlgn="base">
+              <a:spcBef>
+                <a:spcPct val="20000"/>
+              </a:spcBef>
+              <a:spcAft>
+                <a:spcPct val="0"/>
+              </a:spcAft>
+              <a:buChar char="»"/>
+              <a:defRPr sz="2000">
+                <a:solidFill>
+                  <a:schemeClr val="tx1"/>
+                </a:solidFill>
+                <a:latin typeface="+mn-lt"/>
+                <a:ea typeface="ＭＳ Ｐゴシック" charset="-128"/>
+              </a:defRPr>
+            </a:lvl8pPr>
+            <a:lvl9pPr marL="3886200" indent="-228600" algn="l" rtl="0" fontAlgn="base">
+              <a:spcBef>
+                <a:spcPct val="20000"/>
+              </a:spcBef>
+              <a:spcAft>
+                <a:spcPct val="0"/>
+              </a:spcAft>
+              <a:buChar char="»"/>
+              <a:defRPr sz="2000">
+                <a:solidFill>
+                  <a:schemeClr val="tx1"/>
+                </a:solidFill>
+                <a:latin typeface="+mn-lt"/>
+                <a:ea typeface="ＭＳ Ｐゴシック" charset="-128"/>
+              </a:defRPr>
+            </a:lvl9pPr>
+          </a:lstStyle>
+          <a:p>
+            <a:pPr marL="0" indent="0">
+              <a:buFontTx/>
+              <a:buNone/>
+            </a:pPr>
+            <a:r>
+              <a:rPr lang="en-GB" sz="1800" b="1" i="1" dirty="0" smtClean="0">
+                <a:solidFill>
+                  <a:srgbClr val="3366FF"/>
+                </a:solidFill>
+                <a:latin typeface="Courier New"/>
+                <a:cs typeface="Courier New"/>
+              </a:rPr>
+              <a:t>uint32_t</a:t>
+            </a:r>
+            <a:r>
+              <a:rPr lang="en-GB" sz="1800" b="1" dirty="0" smtClean="0">
+                <a:latin typeface="Courier New"/>
+                <a:cs typeface="Courier New"/>
+              </a:rPr>
+              <a:t> data[</a:t>
+            </a:r>
+            <a:r>
+              <a:rPr lang="en-GB" sz="1800" b="1" dirty="0" smtClean="0">
+                <a:solidFill>
+                  <a:srgbClr val="6117C1"/>
+                </a:solidFill>
+                <a:latin typeface="Courier New"/>
+                <a:cs typeface="Courier New"/>
+              </a:rPr>
+              <a:t>4</a:t>
+            </a:r>
+            <a:r>
+              <a:rPr lang="en-GB" sz="1800" b="1" dirty="0" smtClean="0">
+                <a:latin typeface="Courier New"/>
+                <a:cs typeface="Courier New"/>
+              </a:rPr>
+              <a:t>]; </a:t>
+            </a:r>
+            <a:r>
+              <a:rPr lang="en-GB" sz="1800" b="1" dirty="0" smtClean="0">
+                <a:solidFill>
+                  <a:srgbClr val="008000"/>
+                </a:solidFill>
+                <a:latin typeface="Courier New"/>
+                <a:cs typeface="Courier New"/>
+              </a:rPr>
+              <a:t>// 128 bits of data</a:t>
+            </a:r>
+          </a:p>
+          <a:p>
+            <a:pPr marL="0" indent="0">
+              <a:buFontTx/>
+              <a:buNone/>
+            </a:pPr>
+            <a:endParaRPr lang="en-US" sz="1800" b="1" dirty="0" smtClean="0">
+              <a:latin typeface="Courier New"/>
+              <a:cs typeface="Courier New"/>
+            </a:endParaRPr>
+          </a:p>
+          <a:p>
+            <a:pPr marL="0" indent="0">
+              <a:buFontTx/>
+              <a:buNone/>
+            </a:pPr>
+            <a:r>
+              <a:rPr lang="en-US" sz="1800" b="1" dirty="0" err="1" smtClean="0">
+                <a:latin typeface="Courier New"/>
+                <a:cs typeface="Courier New"/>
+              </a:rPr>
+              <a:t>overall_parity</a:t>
+            </a:r>
+            <a:r>
+              <a:rPr lang="en-US" sz="1800" b="1" dirty="0" smtClean="0">
+                <a:latin typeface="Courier New"/>
+                <a:cs typeface="Courier New"/>
+              </a:rPr>
+              <a:t> = </a:t>
+            </a:r>
+            <a:r>
+              <a:rPr lang="en-US" sz="1800" b="1" dirty="0" err="1" smtClean="0">
+                <a:solidFill>
+                  <a:srgbClr val="3366FF"/>
+                </a:solidFill>
+                <a:latin typeface="Courier New"/>
+                <a:cs typeface="Courier New"/>
+              </a:rPr>
+              <a:t>compute_overall_parity</a:t>
+            </a:r>
+            <a:r>
+              <a:rPr lang="en-US" sz="1800" b="1" dirty="0" smtClean="0">
+                <a:latin typeface="Courier New"/>
+                <a:cs typeface="Courier New"/>
+              </a:rPr>
+              <a:t>(data);</a:t>
+            </a:r>
+            <a:endParaRPr lang="en-US" sz="1800" b="1" dirty="0" smtClean="0">
+              <a:latin typeface="Courier New"/>
+              <a:cs typeface="Courier New"/>
+            </a:endParaRPr>
+          </a:p>
+          <a:p>
+            <a:pPr marL="0" indent="0">
+              <a:buFontTx/>
+              <a:buNone/>
+            </a:pPr>
+            <a:r>
+              <a:rPr lang="en-US" sz="1800" b="1" dirty="0" smtClean="0">
+                <a:solidFill>
+                  <a:srgbClr val="FF6600"/>
+                </a:solidFill>
+                <a:latin typeface="Courier New"/>
+                <a:cs typeface="Courier New"/>
+              </a:rPr>
+              <a:t>if</a:t>
+            </a:r>
+            <a:r>
+              <a:rPr lang="en-US" sz="1800" b="1" dirty="0" smtClean="0">
+                <a:latin typeface="Courier New"/>
+                <a:cs typeface="Courier New"/>
+              </a:rPr>
+              <a:t> (</a:t>
+            </a:r>
+            <a:r>
+              <a:rPr lang="en-US" sz="1800" b="1" dirty="0" err="1" smtClean="0">
+                <a:latin typeface="Courier New"/>
+                <a:cs typeface="Courier New"/>
+              </a:rPr>
+              <a:t>overall_parity</a:t>
+            </a:r>
+            <a:r>
+              <a:rPr lang="en-US" sz="1800" b="1" dirty="0" smtClean="0">
+                <a:latin typeface="Courier New"/>
+                <a:cs typeface="Courier New"/>
+              </a:rPr>
+              <a:t> != </a:t>
+            </a:r>
+            <a:r>
+              <a:rPr lang="en-US" sz="1800" b="1" dirty="0" smtClean="0">
+                <a:solidFill>
+                  <a:srgbClr val="6117C1"/>
+                </a:solidFill>
+                <a:latin typeface="Courier New"/>
+                <a:cs typeface="Courier New"/>
+              </a:rPr>
+              <a:t>0</a:t>
+            </a:r>
+            <a:r>
+              <a:rPr lang="en-US" sz="1800" b="1" dirty="0" smtClean="0">
+                <a:latin typeface="Courier New"/>
+                <a:cs typeface="Courier New"/>
+              </a:rPr>
+              <a:t>)</a:t>
+            </a:r>
+          </a:p>
+          <a:p>
+            <a:pPr marL="0" indent="0">
+              <a:buFontTx/>
+              <a:buNone/>
+            </a:pPr>
+            <a:r>
+              <a:rPr lang="en-US" sz="1800" b="1" dirty="0" smtClean="0">
+                <a:latin typeface="Courier New"/>
+                <a:cs typeface="Courier New"/>
+              </a:rPr>
+              <a:t>{</a:t>
+            </a:r>
+          </a:p>
+          <a:p>
+            <a:pPr marL="0" indent="0">
+              <a:buFontTx/>
+              <a:buNone/>
+            </a:pPr>
+            <a:r>
+              <a:rPr lang="en-US" sz="1800" b="1" dirty="0">
+                <a:latin typeface="Courier New"/>
+                <a:cs typeface="Courier New"/>
+              </a:rPr>
+              <a:t> </a:t>
+            </a:r>
+            <a:r>
+              <a:rPr lang="en-US" sz="1800" b="1" dirty="0" smtClean="0">
+                <a:latin typeface="Courier New"/>
+                <a:cs typeface="Courier New"/>
+              </a:rPr>
+              <a:t> syndrome = </a:t>
+            </a:r>
+            <a:r>
+              <a:rPr lang="en-US" sz="1800" b="1" dirty="0" err="1" smtClean="0">
+                <a:solidFill>
+                  <a:srgbClr val="3366FF"/>
+                </a:solidFill>
+                <a:latin typeface="Courier New"/>
+                <a:cs typeface="Courier New"/>
+              </a:rPr>
+              <a:t>compute_hamming_bits</a:t>
+            </a:r>
+            <a:r>
+              <a:rPr lang="en-US" sz="1800" b="1" dirty="0" smtClean="0">
+                <a:latin typeface="Courier New"/>
+                <a:cs typeface="Courier New"/>
+              </a:rPr>
+              <a:t>(data);</a:t>
+            </a:r>
+          </a:p>
+          <a:p>
+            <a:pPr marL="0" indent="0">
+              <a:buFontTx/>
+              <a:buNone/>
+            </a:pPr>
+            <a:r>
+              <a:rPr lang="en-US" sz="1800" b="1" dirty="0">
+                <a:latin typeface="Courier New"/>
+                <a:cs typeface="Courier New"/>
+              </a:rPr>
+              <a:t> </a:t>
+            </a:r>
+            <a:r>
+              <a:rPr lang="en-US" sz="1800" b="1" dirty="0" smtClean="0">
+                <a:latin typeface="Courier New"/>
+                <a:cs typeface="Courier New"/>
+              </a:rPr>
+              <a:t> </a:t>
+            </a:r>
+            <a:r>
+              <a:rPr lang="en-US" sz="1800" b="1" dirty="0" smtClean="0">
+                <a:solidFill>
+                  <a:srgbClr val="FF6600"/>
+                </a:solidFill>
+                <a:latin typeface="Courier New"/>
+                <a:cs typeface="Courier New"/>
+              </a:rPr>
+              <a:t>if</a:t>
+            </a:r>
+            <a:r>
+              <a:rPr lang="en-US" sz="1800" b="1" dirty="0" smtClean="0">
+                <a:latin typeface="Courier New"/>
+                <a:cs typeface="Courier New"/>
+              </a:rPr>
+              <a:t> (syndrome != </a:t>
+            </a:r>
+            <a:r>
+              <a:rPr lang="en-US" sz="1800" b="1" dirty="0" smtClean="0">
+                <a:solidFill>
+                  <a:srgbClr val="6117C1"/>
+                </a:solidFill>
+                <a:latin typeface="Courier New"/>
+                <a:cs typeface="Courier New"/>
+              </a:rPr>
+              <a:t>0</a:t>
+            </a:r>
+            <a:r>
+              <a:rPr lang="en-US" sz="1800" b="1" dirty="0" smtClean="0">
+                <a:latin typeface="Courier New"/>
+                <a:cs typeface="Courier New"/>
+              </a:rPr>
+              <a:t>)</a:t>
+            </a:r>
+          </a:p>
+          <a:p>
+            <a:pPr marL="0" indent="0">
+              <a:buFontTx/>
+              <a:buNone/>
+            </a:pPr>
+            <a:r>
+              <a:rPr lang="en-US" sz="1800" b="1" dirty="0" smtClean="0">
+                <a:latin typeface="Courier New"/>
+                <a:cs typeface="Courier New"/>
+              </a:rPr>
+              <a:t>  {</a:t>
+            </a:r>
+          </a:p>
+          <a:p>
+            <a:pPr marL="0" indent="0">
+              <a:buFontTx/>
+              <a:buNone/>
+            </a:pPr>
+            <a:r>
+              <a:rPr lang="en-US" sz="1800" b="1" dirty="0">
+                <a:latin typeface="Courier New"/>
+                <a:cs typeface="Courier New"/>
+              </a:rPr>
+              <a:t> </a:t>
+            </a:r>
+            <a:r>
+              <a:rPr lang="en-US" sz="1800" b="1" dirty="0" smtClean="0">
+                <a:latin typeface="Courier New"/>
+                <a:cs typeface="Courier New"/>
+              </a:rPr>
+              <a:t>   </a:t>
+            </a:r>
+            <a:r>
+              <a:rPr lang="en-US" sz="1800" b="1" dirty="0" smtClean="0">
+                <a:solidFill>
+                  <a:srgbClr val="008000"/>
+                </a:solidFill>
+                <a:latin typeface="Courier New"/>
+                <a:cs typeface="Courier New"/>
+              </a:rPr>
+              <a:t>// correct </a:t>
+            </a:r>
+            <a:r>
+              <a:rPr lang="en-US" sz="1800" b="1" dirty="0" smtClean="0">
+                <a:solidFill>
+                  <a:srgbClr val="008000"/>
+                </a:solidFill>
+                <a:latin typeface="Courier New"/>
+                <a:cs typeface="Courier New"/>
+              </a:rPr>
+              <a:t>flipped bit</a:t>
+            </a:r>
+          </a:p>
+          <a:p>
+            <a:pPr marL="0" indent="0">
+              <a:buFontTx/>
+              <a:buNone/>
+            </a:pPr>
+            <a:r>
+              <a:rPr lang="en-US" sz="1800" b="1" dirty="0">
+                <a:latin typeface="Courier New"/>
+                <a:cs typeface="Courier New"/>
+              </a:rPr>
+              <a:t> </a:t>
+            </a:r>
+            <a:r>
+              <a:rPr lang="en-US" sz="1800" b="1" dirty="0" smtClean="0">
+                <a:latin typeface="Courier New"/>
+                <a:cs typeface="Courier New"/>
+              </a:rPr>
+              <a:t> </a:t>
+            </a:r>
+            <a:r>
+              <a:rPr lang="en-US" sz="1800" b="1" dirty="0" smtClean="0">
+                <a:latin typeface="Courier New"/>
+                <a:cs typeface="Courier New"/>
+              </a:rPr>
+              <a:t>}</a:t>
+            </a:r>
+          </a:p>
+          <a:p>
+            <a:pPr marL="0" indent="0">
+              <a:buFontTx/>
+              <a:buNone/>
+            </a:pPr>
+            <a:r>
+              <a:rPr lang="en-US" sz="1800" b="1" dirty="0">
+                <a:latin typeface="Courier New"/>
+                <a:cs typeface="Courier New"/>
+              </a:rPr>
+              <a:t> </a:t>
+            </a:r>
+            <a:r>
+              <a:rPr lang="en-US" sz="1800" b="1" dirty="0" smtClean="0">
+                <a:latin typeface="Courier New"/>
+                <a:cs typeface="Courier New"/>
+              </a:rPr>
+              <a:t> </a:t>
+            </a:r>
+            <a:r>
+              <a:rPr lang="en-US" sz="1800" b="1" dirty="0" smtClean="0">
+                <a:solidFill>
+                  <a:srgbClr val="FF6600"/>
+                </a:solidFill>
+                <a:latin typeface="Courier New"/>
+                <a:cs typeface="Courier New"/>
+              </a:rPr>
+              <a:t>else</a:t>
+            </a:r>
+          </a:p>
+          <a:p>
+            <a:pPr marL="0" indent="0">
+              <a:buFontTx/>
+              <a:buNone/>
+            </a:pPr>
+            <a:r>
+              <a:rPr lang="en-US" sz="1800" b="1" dirty="0" smtClean="0">
+                <a:latin typeface="Courier New"/>
+                <a:cs typeface="Courier New"/>
+              </a:rPr>
+              <a:t>  {</a:t>
+            </a:r>
+          </a:p>
+          <a:p>
+            <a:pPr marL="0" indent="0">
+              <a:buFontTx/>
+              <a:buNone/>
+            </a:pPr>
+            <a:r>
+              <a:rPr lang="en-US" sz="1800" b="1" dirty="0">
+                <a:latin typeface="Courier New"/>
+                <a:cs typeface="Courier New"/>
+              </a:rPr>
+              <a:t> </a:t>
+            </a:r>
+            <a:r>
+              <a:rPr lang="en-US" sz="1800" b="1" dirty="0" smtClean="0">
+                <a:latin typeface="Courier New"/>
+                <a:cs typeface="Courier New"/>
+              </a:rPr>
+              <a:t>   </a:t>
+            </a:r>
+            <a:r>
+              <a:rPr lang="en-US" sz="1800" b="1" dirty="0" smtClean="0">
+                <a:solidFill>
+                  <a:srgbClr val="008000"/>
+                </a:solidFill>
+                <a:latin typeface="Courier New"/>
+                <a:cs typeface="Courier New"/>
+              </a:rPr>
+              <a:t>// correct overall parity bit</a:t>
+            </a:r>
+            <a:endParaRPr lang="en-US" sz="1800" b="1" dirty="0" smtClean="0">
+              <a:solidFill>
+                <a:srgbClr val="008000"/>
+              </a:solidFill>
+              <a:latin typeface="Courier New"/>
+              <a:cs typeface="Courier New"/>
+            </a:endParaRPr>
+          </a:p>
+          <a:p>
+            <a:pPr marL="0" indent="0">
+              <a:buFontTx/>
+              <a:buNone/>
+            </a:pPr>
+            <a:r>
+              <a:rPr lang="en-US" sz="1800" b="1" dirty="0" smtClean="0">
+                <a:latin typeface="Courier New"/>
+                <a:cs typeface="Courier New"/>
+              </a:rPr>
+              <a:t>  }</a:t>
+            </a:r>
+            <a:endParaRPr lang="en-US" sz="1800" b="1" dirty="0" smtClean="0">
+              <a:latin typeface="Courier New"/>
+              <a:cs typeface="Courier New"/>
+            </a:endParaRPr>
+          </a:p>
+          <a:p>
+            <a:pPr marL="0" indent="0">
+              <a:buFontTx/>
+              <a:buNone/>
+            </a:pPr>
+            <a:r>
+              <a:rPr lang="en-US" sz="1800" b="1" dirty="0" smtClean="0">
+                <a:latin typeface="Courier New"/>
+                <a:cs typeface="Courier New"/>
+              </a:rPr>
+              <a:t>}</a:t>
+            </a:r>
+            <a:endParaRPr lang="en-GB" sz="1800" b="1" dirty="0"/>
+          </a:p>
+        </p:txBody>
+      </p:sp>
+    </p:spTree>
+    <p:extLst>
+      <p:ext uri="{BB962C8B-B14F-4D97-AF65-F5344CB8AC3E}">
+        <p14:creationId xmlns:p14="http://schemas.microsoft.com/office/powerpoint/2010/main" val="4233116993"/>
+      </p:ext>
+    </p:extLst>
+  </p:cSld>
+  <p:clrMapOvr>
+    <a:masterClrMapping/>
+  </p:clrMapOvr>
+  <mc:AlternateContent xmlns:mc="http://schemas.openxmlformats.org/markup-compatibility/2006" xmlns:p14="http://schemas.microsoft.com/office/powerpoint/2010/main">
+    <mc:Choice Requires="p14">
+      <p:transition spd="slow" p14:dur="2000"/>
+    </mc:Choice>
+    <mc:Fallback xmlns="">
+      <p:transition xmlns:p14="http://schemas.microsoft.com/office/powerpoint/2010/main" spd="slow"/>
+    </mc:Fallback>
+  </mc:AlternateContent>
+  <p:timing>
+    <p:tnLst>
+      <p:par>
+        <p:cTn xmlns:p14="http://schemas.microsoft.com/office/powerpoint/2010/main" id="1" dur="indefinite" restart="never" nodeType="tmRoot"/>
+      </p:par>
+    </p:tnLst>
+  </p:timing>
+</p:sld>
+</file>
+
+<file path=ppt/slides/slide45.xml><?xml version="1.0" encoding="utf-8"?>
+<p:sld xmlns:a="http://schemas.openxmlformats.org/drawingml/2006/main" xmlns:r="http://schemas.openxmlformats.org/officeDocument/2006/relationships" xmlns:p="http://schemas.openxmlformats.org/presentationml/2006/main">
+  <p:cSld>
+    <p:spTree>
+      <p:nvGrpSpPr>
+        <p:cNvPr id="1" name=""/>
+        <p:cNvGrpSpPr/>
+        <p:nvPr/>
+      </p:nvGrpSpPr>
+      <p:grpSpPr>
+        <a:xfrm>
+          <a:off x="0" y="0"/>
+          <a:ext cx="0" cy="0"/>
+          <a:chOff x="0" y="0"/>
+          <a:chExt cx="0" cy="0"/>
+        </a:xfrm>
+      </p:grpSpPr>
+      <p:sp>
+        <p:nvSpPr>
+          <p:cNvPr id="2" name="Title 1"/>
+          <p:cNvSpPr>
+            <a:spLocks noGrp="1"/>
+          </p:cNvSpPr>
+          <p:nvPr>
+            <p:ph type="title"/>
+          </p:nvPr>
+        </p:nvSpPr>
+        <p:spPr/>
+        <p:txBody>
+          <a:bodyPr/>
+          <a:lstStyle/>
+          <a:p>
+            <a:r>
               <a:rPr lang="en-GB" dirty="0" smtClean="0"/>
               <a:t>Sparse matrix ABFT Results</a:t>
             </a:r>
@@ -44708,7 +45631,7 @@
             <a:fld id="{D9B8CB04-7B95-2844-BD15-B133C35E4786}" type="slidenum">
               <a:rPr lang="en-GB" smtClean="0"/>
               <a:pPr/>
-              <a:t>44</a:t>
+              <a:t>45</a:t>
             </a:fld>
             <a:endParaRPr lang="en-GB"/>
           </a:p>
@@ -45210,10 +46133,17 @@
       <p:transition xmlns:p14="http://schemas.microsoft.com/office/powerpoint/2010/main" spd="slow"/>
     </mc:Fallback>
   </mc:AlternateContent>
+  <p:timing>
+    <p:tnLst>
+      <p:par>
+        <p:cTn xmlns:p14="http://schemas.microsoft.com/office/powerpoint/2010/main" id="1" dur="indefinite" restart="never" nodeType="tmRoot"/>
+      </p:par>
+    </p:tnLst>
+  </p:timing>
 </p:sld>
 </file>
 
-<file path=ppt/slides/slide45.xml><?xml version="1.0" encoding="utf-8"?>
+<file path=ppt/slides/slide46.xml><?xml version="1.0" encoding="utf-8"?>
 <p:sld xmlns:a="http://schemas.openxmlformats.org/drawingml/2006/main" xmlns:r="http://schemas.openxmlformats.org/officeDocument/2006/relationships" xmlns:p="http://schemas.openxmlformats.org/presentationml/2006/main">
   <p:cSld>
     <p:spTree>
@@ -45345,7 +46275,7 @@
             <a:fld id="{D9B8CB04-7B95-2844-BD15-B133C35E4786}" type="slidenum">
               <a:rPr lang="en-GB" smtClean="0"/>
               <a:pPr/>
-              <a:t>45</a:t>
+              <a:t>46</a:t>
             </a:fld>
             <a:endParaRPr lang="en-GB"/>
           </a:p>
@@ -45379,7 +46309,7 @@
 </p:sld>
 </file>
 
-<file path=ppt/slides/slide46.xml><?xml version="1.0" encoding="utf-8"?>
+<file path=ppt/slides/slide47.xml><?xml version="1.0" encoding="utf-8"?>
 <p:sld xmlns:a="http://schemas.openxmlformats.org/drawingml/2006/main" xmlns:r="http://schemas.openxmlformats.org/officeDocument/2006/relationships" xmlns:p="http://schemas.openxmlformats.org/presentationml/2006/main">
   <p:cSld>
     <p:spTree>
@@ -45412,6 +46342,789 @@
           <a:lstStyle/>
           <a:p>
             <a:r>
+              <a:rPr lang="en-GB" sz="4000" dirty="0" smtClean="0"/>
+              <a:t>Hamming codes - </a:t>
+            </a:r>
+            <a:r>
+              <a:rPr lang="en-GB" sz="4000" dirty="0" smtClean="0"/>
+              <a:t>SECDED</a:t>
+            </a:r>
+            <a:endParaRPr lang="en-GB" sz="4000" dirty="0"/>
+          </a:p>
+        </p:txBody>
+      </p:sp>
+      <p:sp>
+        <p:nvSpPr>
+          <p:cNvPr id="4" name="Slide Number Placeholder 3"/>
+          <p:cNvSpPr>
+            <a:spLocks noGrp="1"/>
+          </p:cNvSpPr>
+          <p:nvPr>
+            <p:ph type="sldNum" sz="quarter" idx="10"/>
+          </p:nvPr>
+        </p:nvSpPr>
+        <p:spPr/>
+        <p:txBody>
+          <a:bodyPr/>
+          <a:lstStyle/>
+          <a:p>
+            <a:fld id="{D9B8CB04-7B95-2844-BD15-B133C35E4786}" type="slidenum">
+              <a:rPr lang="en-GB" smtClean="0"/>
+              <a:pPr/>
+              <a:t>47</a:t>
+            </a:fld>
+            <a:endParaRPr lang="en-GB"/>
+          </a:p>
+        </p:txBody>
+      </p:sp>
+      <p:sp>
+        <p:nvSpPr>
+          <p:cNvPr id="5" name="Content Placeholder 2"/>
+          <p:cNvSpPr txBox="1">
+            <a:spLocks/>
+          </p:cNvSpPr>
+          <p:nvPr/>
+        </p:nvSpPr>
+        <p:spPr bwMode="auto">
+          <a:xfrm>
+            <a:off x="495300" y="1016000"/>
+            <a:ext cx="8343900" cy="4965700"/>
+          </a:xfrm>
+          <a:prstGeom prst="rect">
+            <a:avLst/>
+          </a:prstGeom>
+          <a:noFill/>
+          <a:ln>
+            <a:noFill/>
+          </a:ln>
+          <a:extLst>
+            <a:ext uri="{909E8E84-426E-40dd-AFC4-6F175D3DCCD1}">
+              <a14:hiddenFill xmlns:a14="http://schemas.microsoft.com/office/drawing/2010/main">
+                <a:solidFill>
+                  <a:srgbClr val="FFFFFF"/>
+                </a:solidFill>
+              </a14:hiddenFill>
+            </a:ext>
+            <a:ext uri="{91240B29-F687-4f45-9708-019B960494DF}">
+              <a14:hiddenLine xmlns:a14="http://schemas.microsoft.com/office/drawing/2010/main" w="9525">
+                <a:solidFill>
+                  <a:srgbClr val="000000"/>
+                </a:solidFill>
+                <a:miter lim="800000"/>
+                <a:headEnd/>
+                <a:tailEnd/>
+              </a14:hiddenLine>
+            </a:ext>
+            <a:ext uri="{FAA26D3D-D897-4be2-8F04-BA451C77F1D7}">
+              <ma14:placeholderFlag xmlns:ma14="http://schemas.microsoft.com/office/mac/drawingml/2011/main" val="1"/>
+            </a:ext>
+          </a:extLst>
+        </p:spPr>
+        <p:txBody>
+          <a:bodyPr vert="horz" wrap="square" lIns="91440" tIns="45720" rIns="91440" bIns="45720" numCol="1" anchor="t" anchorCtr="0" compatLnSpc="1">
+            <a:prstTxWarp prst="textNoShape">
+              <a:avLst/>
+            </a:prstTxWarp>
+          </a:bodyPr>
+          <a:lstStyle>
+            <a:lvl1pPr marL="342900" indent="-342900" algn="l" rtl="0" eaLnBrk="0" fontAlgn="base" hangingPunct="0">
+              <a:spcBef>
+                <a:spcPct val="20000"/>
+              </a:spcBef>
+              <a:spcAft>
+                <a:spcPct val="0"/>
+              </a:spcAft>
+              <a:buClr>
+                <a:srgbClr val="2858BB"/>
+              </a:buClr>
+              <a:buChar char="•"/>
+              <a:defRPr sz="3200">
+                <a:solidFill>
+                  <a:schemeClr val="tx1"/>
+                </a:solidFill>
+                <a:latin typeface="+mn-lt"/>
+                <a:ea typeface="ＭＳ Ｐゴシック" charset="-128"/>
+                <a:cs typeface="ＭＳ Ｐゴシック" charset="-128"/>
+              </a:defRPr>
+            </a:lvl1pPr>
+            <a:lvl2pPr marL="742950" indent="-285750" algn="l" rtl="0" eaLnBrk="0" fontAlgn="base" hangingPunct="0">
+              <a:spcBef>
+                <a:spcPct val="20000"/>
+              </a:spcBef>
+              <a:spcAft>
+                <a:spcPct val="0"/>
+              </a:spcAft>
+              <a:buClr>
+                <a:srgbClr val="2858BB"/>
+              </a:buClr>
+              <a:buChar char="•"/>
+              <a:defRPr sz="2800">
+                <a:solidFill>
+                  <a:schemeClr val="tx1"/>
+                </a:solidFill>
+                <a:latin typeface="+mn-lt"/>
+                <a:ea typeface="ＭＳ Ｐゴシック" charset="-128"/>
+              </a:defRPr>
+            </a:lvl2pPr>
+            <a:lvl3pPr marL="1143000" indent="-228600" algn="l" rtl="0" eaLnBrk="0" fontAlgn="base" hangingPunct="0">
+              <a:spcBef>
+                <a:spcPct val="20000"/>
+              </a:spcBef>
+              <a:spcAft>
+                <a:spcPct val="0"/>
+              </a:spcAft>
+              <a:buClr>
+                <a:srgbClr val="2858BB"/>
+              </a:buClr>
+              <a:buChar char="•"/>
+              <a:defRPr sz="2400">
+                <a:solidFill>
+                  <a:schemeClr val="tx1"/>
+                </a:solidFill>
+                <a:latin typeface="+mn-lt"/>
+                <a:ea typeface="ＭＳ Ｐゴシック" charset="-128"/>
+              </a:defRPr>
+            </a:lvl3pPr>
+            <a:lvl4pPr marL="1600200" indent="-228600" algn="l" rtl="0" eaLnBrk="0" fontAlgn="base" hangingPunct="0">
+              <a:spcBef>
+                <a:spcPct val="20000"/>
+              </a:spcBef>
+              <a:spcAft>
+                <a:spcPct val="0"/>
+              </a:spcAft>
+              <a:buChar char="–"/>
+              <a:defRPr sz="2000">
+                <a:solidFill>
+                  <a:schemeClr val="tx1"/>
+                </a:solidFill>
+                <a:latin typeface="+mn-lt"/>
+                <a:ea typeface="ＭＳ Ｐゴシック" charset="-128"/>
+              </a:defRPr>
+            </a:lvl4pPr>
+            <a:lvl5pPr marL="2057400" indent="-228600" algn="l" rtl="0" eaLnBrk="0" fontAlgn="base" hangingPunct="0">
+              <a:spcBef>
+                <a:spcPct val="20000"/>
+              </a:spcBef>
+              <a:spcAft>
+                <a:spcPct val="0"/>
+              </a:spcAft>
+              <a:buChar char="»"/>
+              <a:defRPr sz="2000">
+                <a:solidFill>
+                  <a:schemeClr val="tx1"/>
+                </a:solidFill>
+                <a:latin typeface="+mn-lt"/>
+                <a:ea typeface="ＭＳ Ｐゴシック" charset="-128"/>
+              </a:defRPr>
+            </a:lvl5pPr>
+            <a:lvl6pPr marL="2514600" indent="-228600" algn="l" rtl="0" fontAlgn="base">
+              <a:spcBef>
+                <a:spcPct val="20000"/>
+              </a:spcBef>
+              <a:spcAft>
+                <a:spcPct val="0"/>
+              </a:spcAft>
+              <a:buChar char="»"/>
+              <a:defRPr sz="2000">
+                <a:solidFill>
+                  <a:schemeClr val="tx1"/>
+                </a:solidFill>
+                <a:latin typeface="+mn-lt"/>
+                <a:ea typeface="ＭＳ Ｐゴシック" charset="-128"/>
+              </a:defRPr>
+            </a:lvl6pPr>
+            <a:lvl7pPr marL="2971800" indent="-228600" algn="l" rtl="0" fontAlgn="base">
+              <a:spcBef>
+                <a:spcPct val="20000"/>
+              </a:spcBef>
+              <a:spcAft>
+                <a:spcPct val="0"/>
+              </a:spcAft>
+              <a:buChar char="»"/>
+              <a:defRPr sz="2000">
+                <a:solidFill>
+                  <a:schemeClr val="tx1"/>
+                </a:solidFill>
+                <a:latin typeface="+mn-lt"/>
+                <a:ea typeface="ＭＳ Ｐゴシック" charset="-128"/>
+              </a:defRPr>
+            </a:lvl7pPr>
+            <a:lvl8pPr marL="3429000" indent="-228600" algn="l" rtl="0" fontAlgn="base">
+              <a:spcBef>
+                <a:spcPct val="20000"/>
+              </a:spcBef>
+              <a:spcAft>
+                <a:spcPct val="0"/>
+              </a:spcAft>
+              <a:buChar char="»"/>
+              <a:defRPr sz="2000">
+                <a:solidFill>
+                  <a:schemeClr val="tx1"/>
+                </a:solidFill>
+                <a:latin typeface="+mn-lt"/>
+                <a:ea typeface="ＭＳ Ｐゴシック" charset="-128"/>
+              </a:defRPr>
+            </a:lvl8pPr>
+            <a:lvl9pPr marL="3886200" indent="-228600" algn="l" rtl="0" fontAlgn="base">
+              <a:spcBef>
+                <a:spcPct val="20000"/>
+              </a:spcBef>
+              <a:spcAft>
+                <a:spcPct val="0"/>
+              </a:spcAft>
+              <a:buChar char="»"/>
+              <a:defRPr sz="2000">
+                <a:solidFill>
+                  <a:schemeClr val="tx1"/>
+                </a:solidFill>
+                <a:latin typeface="+mn-lt"/>
+                <a:ea typeface="ＭＳ Ｐゴシック" charset="-128"/>
+              </a:defRPr>
+            </a:lvl9pPr>
+          </a:lstStyle>
+          <a:p>
+            <a:pPr marL="0" indent="0">
+              <a:buFontTx/>
+              <a:buNone/>
+            </a:pPr>
+            <a:r>
+              <a:rPr lang="en-GB" sz="1800" b="1" i="1" dirty="0" smtClean="0">
+                <a:solidFill>
+                  <a:srgbClr val="3366FF"/>
+                </a:solidFill>
+                <a:latin typeface="Courier New"/>
+                <a:cs typeface="Courier New"/>
+              </a:rPr>
+              <a:t>uint32_t</a:t>
+            </a:r>
+            <a:r>
+              <a:rPr lang="en-GB" sz="1800" b="1" dirty="0" smtClean="0">
+                <a:latin typeface="Courier New"/>
+                <a:cs typeface="Courier New"/>
+              </a:rPr>
+              <a:t> data[</a:t>
+            </a:r>
+            <a:r>
+              <a:rPr lang="en-GB" sz="1800" b="1" dirty="0" smtClean="0">
+                <a:solidFill>
+                  <a:srgbClr val="6117C1"/>
+                </a:solidFill>
+                <a:latin typeface="Courier New"/>
+                <a:cs typeface="Courier New"/>
+              </a:rPr>
+              <a:t>4</a:t>
+            </a:r>
+            <a:r>
+              <a:rPr lang="en-GB" sz="1800" b="1" dirty="0" smtClean="0">
+                <a:latin typeface="Courier New"/>
+                <a:cs typeface="Courier New"/>
+              </a:rPr>
+              <a:t>]; </a:t>
+            </a:r>
+            <a:r>
+              <a:rPr lang="en-GB" sz="1800" b="1" dirty="0" smtClean="0">
+                <a:solidFill>
+                  <a:srgbClr val="008000"/>
+                </a:solidFill>
+                <a:latin typeface="Courier New"/>
+                <a:cs typeface="Courier New"/>
+              </a:rPr>
+              <a:t>// 128 bits of data</a:t>
+            </a:r>
+          </a:p>
+          <a:p>
+            <a:pPr marL="0" indent="0">
+              <a:buFontTx/>
+              <a:buNone/>
+            </a:pPr>
+            <a:endParaRPr lang="en-US" sz="1800" b="1" dirty="0" smtClean="0">
+              <a:latin typeface="Courier New"/>
+              <a:cs typeface="Courier New"/>
+            </a:endParaRPr>
+          </a:p>
+          <a:p>
+            <a:pPr marL="0" indent="0">
+              <a:buFontTx/>
+              <a:buNone/>
+            </a:pPr>
+            <a:r>
+              <a:rPr lang="en-US" sz="1800" b="1" dirty="0" err="1" smtClean="0">
+                <a:latin typeface="Courier New"/>
+                <a:cs typeface="Courier New"/>
+              </a:rPr>
+              <a:t>overall_parity</a:t>
+            </a:r>
+            <a:r>
+              <a:rPr lang="en-US" sz="1800" b="1" dirty="0" smtClean="0">
+                <a:latin typeface="Courier New"/>
+                <a:cs typeface="Courier New"/>
+              </a:rPr>
+              <a:t> = </a:t>
+            </a:r>
+            <a:r>
+              <a:rPr lang="en-US" sz="1800" b="1" dirty="0" err="1" smtClean="0">
+                <a:solidFill>
+                  <a:srgbClr val="3366FF"/>
+                </a:solidFill>
+                <a:latin typeface="Courier New"/>
+                <a:cs typeface="Courier New"/>
+              </a:rPr>
+              <a:t>compute_overall_parity</a:t>
+            </a:r>
+            <a:r>
+              <a:rPr lang="en-US" sz="1800" b="1" dirty="0" smtClean="0">
+                <a:latin typeface="Courier New"/>
+                <a:cs typeface="Courier New"/>
+              </a:rPr>
+              <a:t>(data);</a:t>
+            </a:r>
+          </a:p>
+          <a:p>
+            <a:pPr marL="0" indent="0">
+              <a:buNone/>
+            </a:pPr>
+            <a:r>
+              <a:rPr lang="en-US" sz="1800" b="1" dirty="0" smtClean="0">
+                <a:latin typeface="Courier New"/>
+                <a:cs typeface="Courier New"/>
+              </a:rPr>
+              <a:t>syndrome       </a:t>
+            </a:r>
+            <a:r>
+              <a:rPr lang="en-US" sz="1800" b="1" dirty="0">
+                <a:latin typeface="Courier New"/>
+                <a:cs typeface="Courier New"/>
+              </a:rPr>
+              <a:t>= </a:t>
+            </a:r>
+            <a:r>
+              <a:rPr lang="en-US" sz="1800" b="1" dirty="0" err="1">
+                <a:solidFill>
+                  <a:srgbClr val="3366FF"/>
+                </a:solidFill>
+                <a:latin typeface="Courier New"/>
+                <a:cs typeface="Courier New"/>
+              </a:rPr>
+              <a:t>compute_hamming_bits</a:t>
+            </a:r>
+            <a:r>
+              <a:rPr lang="en-US" sz="1800" b="1" dirty="0">
+                <a:latin typeface="Courier New"/>
+                <a:cs typeface="Courier New"/>
+              </a:rPr>
+              <a:t>(data)</a:t>
+            </a:r>
+            <a:r>
+              <a:rPr lang="en-US" sz="1800" b="1" dirty="0" smtClean="0">
+                <a:latin typeface="Courier New"/>
+                <a:cs typeface="Courier New"/>
+              </a:rPr>
+              <a:t>;</a:t>
+            </a:r>
+            <a:endParaRPr lang="en-US" sz="1800" b="1" dirty="0" smtClean="0">
+              <a:latin typeface="Courier New"/>
+              <a:cs typeface="Courier New"/>
+            </a:endParaRPr>
+          </a:p>
+          <a:p>
+            <a:pPr marL="0" indent="0">
+              <a:buFontTx/>
+              <a:buNone/>
+            </a:pPr>
+            <a:r>
+              <a:rPr lang="en-US" sz="1800" b="1" dirty="0" smtClean="0">
+                <a:solidFill>
+                  <a:srgbClr val="FF6600"/>
+                </a:solidFill>
+                <a:latin typeface="Courier New"/>
+                <a:cs typeface="Courier New"/>
+              </a:rPr>
+              <a:t>if</a:t>
+            </a:r>
+            <a:r>
+              <a:rPr lang="en-US" sz="1800" b="1" dirty="0" smtClean="0">
+                <a:latin typeface="Courier New"/>
+                <a:cs typeface="Courier New"/>
+              </a:rPr>
+              <a:t> (</a:t>
+            </a:r>
+            <a:r>
+              <a:rPr lang="en-US" sz="1800" b="1" dirty="0" err="1" smtClean="0">
+                <a:latin typeface="Courier New"/>
+                <a:cs typeface="Courier New"/>
+              </a:rPr>
+              <a:t>overall_parity</a:t>
+            </a:r>
+            <a:r>
+              <a:rPr lang="en-US" sz="1800" b="1" dirty="0" smtClean="0">
+                <a:latin typeface="Courier New"/>
+                <a:cs typeface="Courier New"/>
+              </a:rPr>
+              <a:t> != </a:t>
+            </a:r>
+            <a:r>
+              <a:rPr lang="en-US" sz="1800" b="1" dirty="0" smtClean="0">
+                <a:solidFill>
+                  <a:srgbClr val="6117C1"/>
+                </a:solidFill>
+                <a:latin typeface="Courier New"/>
+                <a:cs typeface="Courier New"/>
+              </a:rPr>
+              <a:t>0</a:t>
+            </a:r>
+            <a:r>
+              <a:rPr lang="en-US" sz="1800" b="1" dirty="0" smtClean="0">
+                <a:latin typeface="Courier New"/>
+                <a:cs typeface="Courier New"/>
+              </a:rPr>
+              <a:t>)</a:t>
+            </a:r>
+          </a:p>
+          <a:p>
+            <a:pPr marL="0" indent="0">
+              <a:buFontTx/>
+              <a:buNone/>
+            </a:pPr>
+            <a:r>
+              <a:rPr lang="en-US" sz="1800" b="1" dirty="0" smtClean="0">
+                <a:latin typeface="Courier New"/>
+                <a:cs typeface="Courier New"/>
+              </a:rPr>
+              <a:t>{</a:t>
+            </a:r>
+          </a:p>
+          <a:p>
+            <a:pPr marL="0" indent="0">
+              <a:buFontTx/>
+              <a:buNone/>
+            </a:pPr>
+            <a:r>
+              <a:rPr lang="en-US" sz="1800" b="1" dirty="0" smtClean="0">
+                <a:solidFill>
+                  <a:srgbClr val="FF6600"/>
+                </a:solidFill>
+                <a:latin typeface="Courier New"/>
+                <a:cs typeface="Courier New"/>
+              </a:rPr>
+              <a:t>  if</a:t>
+            </a:r>
+            <a:r>
+              <a:rPr lang="en-US" sz="1800" b="1" dirty="0" smtClean="0">
+                <a:latin typeface="Courier New"/>
+                <a:cs typeface="Courier New"/>
+              </a:rPr>
+              <a:t> (syndrome != </a:t>
+            </a:r>
+            <a:r>
+              <a:rPr lang="en-US" sz="1800" b="1" dirty="0" smtClean="0">
+                <a:solidFill>
+                  <a:srgbClr val="6117C1"/>
+                </a:solidFill>
+                <a:latin typeface="Courier New"/>
+                <a:cs typeface="Courier New"/>
+              </a:rPr>
+              <a:t>0</a:t>
+            </a:r>
+            <a:r>
+              <a:rPr lang="en-US" sz="1800" b="1" dirty="0" smtClean="0">
+                <a:latin typeface="Courier New"/>
+                <a:cs typeface="Courier New"/>
+              </a:rPr>
+              <a:t>)</a:t>
+            </a:r>
+            <a:endParaRPr lang="en-US" sz="1800" b="1" dirty="0" smtClean="0">
+              <a:latin typeface="Courier New"/>
+              <a:cs typeface="Courier New"/>
+            </a:endParaRPr>
+          </a:p>
+          <a:p>
+            <a:pPr marL="0" indent="0">
+              <a:buFontTx/>
+              <a:buNone/>
+            </a:pPr>
+            <a:r>
+              <a:rPr lang="en-US" sz="1800" b="1" dirty="0">
+                <a:latin typeface="Courier New"/>
+                <a:cs typeface="Courier New"/>
+              </a:rPr>
+              <a:t> </a:t>
+            </a:r>
+            <a:r>
+              <a:rPr lang="en-US" sz="1800" b="1" dirty="0" smtClean="0">
+                <a:latin typeface="Courier New"/>
+                <a:cs typeface="Courier New"/>
+              </a:rPr>
+              <a:t>   </a:t>
+            </a:r>
+            <a:r>
+              <a:rPr lang="en-US" sz="1800" b="1" dirty="0" smtClean="0">
+                <a:solidFill>
+                  <a:srgbClr val="008000"/>
+                </a:solidFill>
+                <a:latin typeface="Courier New"/>
+                <a:cs typeface="Courier New"/>
+              </a:rPr>
+              <a:t>// correct </a:t>
+            </a:r>
+            <a:r>
+              <a:rPr lang="en-US" sz="1800" b="1" dirty="0" smtClean="0">
+                <a:solidFill>
+                  <a:srgbClr val="008000"/>
+                </a:solidFill>
+                <a:latin typeface="Courier New"/>
+                <a:cs typeface="Courier New"/>
+              </a:rPr>
+              <a:t>flipped bit with hamming codes</a:t>
+            </a:r>
+            <a:r>
+              <a:rPr lang="en-US" sz="1800" b="1" dirty="0" smtClean="0">
+                <a:latin typeface="Courier New"/>
+                <a:cs typeface="Courier New"/>
+              </a:rPr>
+              <a:t/>
+            </a:r>
+            <a:br>
+              <a:rPr lang="en-US" sz="1800" b="1" dirty="0" smtClean="0">
+                <a:latin typeface="Courier New"/>
+                <a:cs typeface="Courier New"/>
+              </a:rPr>
+            </a:br>
+            <a:r>
+              <a:rPr lang="en-US" sz="1800" b="1" dirty="0" smtClean="0">
+                <a:latin typeface="Courier New"/>
+                <a:cs typeface="Courier New"/>
+              </a:rPr>
+              <a:t>  </a:t>
+            </a:r>
+            <a:r>
+              <a:rPr lang="en-US" sz="1800" b="1" dirty="0" smtClean="0">
+                <a:solidFill>
+                  <a:srgbClr val="FF6600"/>
+                </a:solidFill>
+                <a:latin typeface="Courier New"/>
+                <a:cs typeface="Courier New"/>
+              </a:rPr>
+              <a:t>else</a:t>
+            </a:r>
+            <a:endParaRPr lang="en-US" sz="1800" b="1" dirty="0" smtClean="0">
+              <a:latin typeface="Courier New"/>
+              <a:cs typeface="Courier New"/>
+            </a:endParaRPr>
+          </a:p>
+          <a:p>
+            <a:pPr marL="0" indent="0">
+              <a:buFontTx/>
+              <a:buNone/>
+            </a:pPr>
+            <a:r>
+              <a:rPr lang="en-US" sz="1800" b="1" dirty="0">
+                <a:latin typeface="Courier New"/>
+                <a:cs typeface="Courier New"/>
+              </a:rPr>
+              <a:t> </a:t>
+            </a:r>
+            <a:r>
+              <a:rPr lang="en-US" sz="1800" b="1" dirty="0" smtClean="0">
+                <a:latin typeface="Courier New"/>
+                <a:cs typeface="Courier New"/>
+              </a:rPr>
+              <a:t>   </a:t>
+            </a:r>
+            <a:r>
+              <a:rPr lang="en-US" sz="1800" b="1" dirty="0" smtClean="0">
+                <a:solidFill>
+                  <a:srgbClr val="008000"/>
+                </a:solidFill>
+                <a:latin typeface="Courier New"/>
+                <a:cs typeface="Courier New"/>
+              </a:rPr>
+              <a:t>// correct overall parity bit</a:t>
+            </a:r>
+            <a:endParaRPr lang="en-US" sz="1800" b="1" dirty="0" smtClean="0">
+              <a:latin typeface="Courier New"/>
+              <a:cs typeface="Courier New"/>
+            </a:endParaRPr>
+          </a:p>
+          <a:p>
+            <a:pPr marL="0" indent="0">
+              <a:buFontTx/>
+              <a:buNone/>
+            </a:pPr>
+            <a:r>
+              <a:rPr lang="en-US" sz="1800" b="1" dirty="0" smtClean="0">
+                <a:latin typeface="Courier New"/>
+                <a:cs typeface="Courier New"/>
+              </a:rPr>
+              <a:t>}</a:t>
+            </a:r>
+          </a:p>
+          <a:p>
+            <a:pPr marL="0" indent="0">
+              <a:buFontTx/>
+              <a:buNone/>
+            </a:pPr>
+            <a:r>
+              <a:rPr lang="en-US" sz="1800" b="1" dirty="0" smtClean="0">
+                <a:solidFill>
+                  <a:srgbClr val="FF6600"/>
+                </a:solidFill>
+                <a:latin typeface="Courier New"/>
+                <a:cs typeface="Courier New"/>
+              </a:rPr>
+              <a:t>else if</a:t>
+            </a:r>
+            <a:r>
+              <a:rPr lang="en-US" sz="1800" b="1" dirty="0" smtClean="0">
+                <a:latin typeface="Courier New"/>
+                <a:cs typeface="Courier New"/>
+              </a:rPr>
+              <a:t> (syndrome != </a:t>
+            </a:r>
+            <a:r>
+              <a:rPr lang="en-US" sz="1800" b="1" dirty="0" smtClean="0">
+                <a:solidFill>
+                  <a:srgbClr val="6117C1"/>
+                </a:solidFill>
+                <a:latin typeface="Courier New"/>
+                <a:cs typeface="Courier New"/>
+              </a:rPr>
+              <a:t>0</a:t>
+            </a:r>
+            <a:r>
+              <a:rPr lang="en-US" sz="1800" b="1" dirty="0" smtClean="0">
+                <a:latin typeface="Courier New"/>
+                <a:cs typeface="Courier New"/>
+              </a:rPr>
+              <a:t>)</a:t>
+            </a:r>
+          </a:p>
+          <a:p>
+            <a:pPr marL="0" indent="0">
+              <a:buFontTx/>
+              <a:buNone/>
+            </a:pPr>
+            <a:r>
+              <a:rPr lang="en-US" sz="1800" b="1" dirty="0" smtClean="0">
+                <a:latin typeface="Courier New"/>
+                <a:cs typeface="Courier New"/>
+              </a:rPr>
+              <a:t>{</a:t>
+            </a:r>
+          </a:p>
+          <a:p>
+            <a:pPr marL="0" indent="0">
+              <a:buFontTx/>
+              <a:buNone/>
+            </a:pPr>
+            <a:r>
+              <a:rPr lang="en-US" sz="1800" b="1" dirty="0">
+                <a:latin typeface="Courier New"/>
+                <a:cs typeface="Courier New"/>
+              </a:rPr>
+              <a:t> </a:t>
+            </a:r>
+            <a:r>
+              <a:rPr lang="en-US" sz="1800" b="1" dirty="0" smtClean="0">
+                <a:latin typeface="Courier New"/>
+                <a:cs typeface="Courier New"/>
+              </a:rPr>
+              <a:t> </a:t>
+            </a:r>
+            <a:r>
+              <a:rPr lang="en-US" sz="1800" b="1" dirty="0" smtClean="0">
+                <a:solidFill>
+                  <a:srgbClr val="008000"/>
+                </a:solidFill>
+                <a:latin typeface="Courier New"/>
+                <a:cs typeface="Courier New"/>
+              </a:rPr>
+              <a:t>// report double-bit error</a:t>
+            </a:r>
+            <a:endParaRPr lang="en-US" sz="1800" b="1" dirty="0" smtClean="0">
+              <a:solidFill>
+                <a:srgbClr val="008000"/>
+              </a:solidFill>
+              <a:latin typeface="Courier New"/>
+              <a:cs typeface="Courier New"/>
+            </a:endParaRPr>
+          </a:p>
+          <a:p>
+            <a:pPr marL="0" indent="0">
+              <a:buFontTx/>
+              <a:buNone/>
+            </a:pPr>
+            <a:r>
+              <a:rPr lang="en-US" sz="1800" b="1" dirty="0">
+                <a:latin typeface="Courier New"/>
+                <a:cs typeface="Courier New"/>
+              </a:rPr>
+              <a:t>}</a:t>
+            </a:r>
+            <a:endParaRPr lang="en-GB" sz="1800" b="1" dirty="0"/>
+          </a:p>
+        </p:txBody>
+      </p:sp>
+    </p:spTree>
+    <p:extLst>
+      <p:ext uri="{BB962C8B-B14F-4D97-AF65-F5344CB8AC3E}">
+        <p14:creationId xmlns:p14="http://schemas.microsoft.com/office/powerpoint/2010/main" val="206406442"/>
+      </p:ext>
+    </p:extLst>
+  </p:cSld>
+  <p:clrMapOvr>
+    <a:masterClrMapping/>
+  </p:clrMapOvr>
+  <mc:AlternateContent xmlns:mc="http://schemas.openxmlformats.org/markup-compatibility/2006" xmlns:p14="http://schemas.microsoft.com/office/powerpoint/2010/main">
+    <mc:Choice Requires="p14">
+      <p:transition spd="slow" p14:dur="2000"/>
+    </mc:Choice>
+    <mc:Fallback xmlns="">
+      <p:transition xmlns:p14="http://schemas.microsoft.com/office/powerpoint/2010/main" spd="slow"/>
+    </mc:Fallback>
+  </mc:AlternateContent>
+  <p:timing>
+    <p:tnLst>
+      <p:par>
+        <p:cTn xmlns:p14="http://schemas.microsoft.com/office/powerpoint/2010/main" id="1" dur="indefinite" restart="never" nodeType="tmRoot"/>
+      </p:par>
+    </p:tnLst>
+  </p:timing>
+</p:sld>
+</file>
+
+<file path=ppt/slides/slide48.xml><?xml version="1.0" encoding="utf-8"?>
+<p:sld xmlns:a="http://schemas.openxmlformats.org/drawingml/2006/main" xmlns:r="http://schemas.openxmlformats.org/officeDocument/2006/relationships" xmlns:p="http://schemas.openxmlformats.org/presentationml/2006/main">
+  <p:cSld>
+    <p:spTree>
+      <p:nvGrpSpPr>
+        <p:cNvPr id="1" name=""/>
+        <p:cNvGrpSpPr/>
+        <p:nvPr/>
+      </p:nvGrpSpPr>
+      <p:grpSpPr>
+        <a:xfrm>
+          <a:off x="0" y="0"/>
+          <a:ext cx="0" cy="0"/>
+          <a:chOff x="0" y="0"/>
+          <a:chExt cx="0" cy="0"/>
+        </a:xfrm>
+      </p:grpSpPr>
+      <p:sp>
+        <p:nvSpPr>
+          <p:cNvPr id="2" name="Title 1"/>
+          <p:cNvSpPr>
+            <a:spLocks noGrp="1"/>
+          </p:cNvSpPr>
+          <p:nvPr>
+            <p:ph type="title"/>
+          </p:nvPr>
+        </p:nvSpPr>
+        <p:spPr/>
+        <p:txBody>
+          <a:bodyPr/>
+          <a:lstStyle/>
+          <a:p>
+            <a:r>
               <a:rPr lang="en-GB" dirty="0" smtClean="0"/>
               <a:t>Sparse matrix ABFT Results</a:t>
             </a:r>
@@ -45509,7 +47222,7 @@
             <a:fld id="{D9B8CB04-7B95-2844-BD15-B133C35E4786}" type="slidenum">
               <a:rPr lang="en-GB" smtClean="0"/>
               <a:pPr/>
-              <a:t>46</a:t>
+              <a:t>48</a:t>
             </a:fld>
             <a:endParaRPr lang="en-GB"/>
           </a:p>
@@ -46099,376 +47812,6 @@
 </p:sld>
 </file>
 
-<file path=ppt/slides/slide47.xml><?xml version="1.0" encoding="utf-8"?>
-<p:sld xmlns:a="http://schemas.openxmlformats.org/drawingml/2006/main" xmlns:r="http://schemas.openxmlformats.org/officeDocument/2006/relationships" xmlns:p="http://schemas.openxmlformats.org/presentationml/2006/main">
-  <p:cSld>
-    <p:spTree>
-      <p:nvGrpSpPr>
-        <p:cNvPr id="1" name=""/>
-        <p:cNvGrpSpPr/>
-        <p:nvPr/>
-      </p:nvGrpSpPr>
-      <p:grpSpPr>
-        <a:xfrm>
-          <a:off x="0" y="0"/>
-          <a:ext cx="0" cy="0"/>
-          <a:chOff x="0" y="0"/>
-          <a:chExt cx="0" cy="0"/>
-        </a:xfrm>
-      </p:grpSpPr>
-      <p:sp>
-        <p:nvSpPr>
-          <p:cNvPr id="2" name="Title 1"/>
-          <p:cNvSpPr>
-            <a:spLocks noGrp="1"/>
-          </p:cNvSpPr>
-          <p:nvPr>
-            <p:ph type="title"/>
-          </p:nvPr>
-        </p:nvSpPr>
-        <p:spPr/>
-        <p:txBody>
-          <a:bodyPr/>
-          <a:lstStyle/>
-          <a:p>
-            <a:r>
-              <a:rPr lang="en-GB" dirty="0" smtClean="0"/>
-              <a:t>Software ECC exercise</a:t>
-            </a:r>
-            <a:endParaRPr lang="en-GB" dirty="0"/>
-          </a:p>
-        </p:txBody>
-      </p:sp>
-      <p:sp>
-        <p:nvSpPr>
-          <p:cNvPr id="3" name="Content Placeholder 2"/>
-          <p:cNvSpPr>
-            <a:spLocks noGrp="1"/>
-          </p:cNvSpPr>
-          <p:nvPr>
-            <p:ph idx="1"/>
-          </p:nvPr>
-        </p:nvSpPr>
-        <p:spPr/>
-        <p:txBody>
-          <a:bodyPr/>
-          <a:lstStyle/>
-          <a:p>
-            <a:r>
-              <a:rPr lang="en-GB" dirty="0" smtClean="0"/>
-              <a:t>Using the provided CG code as a starting point, add ECC to make the code more tolerant to silent data corruption</a:t>
-            </a:r>
-          </a:p>
-          <a:p>
-            <a:r>
-              <a:rPr lang="en-GB" dirty="0" smtClean="0"/>
-              <a:t>There </a:t>
-            </a:r>
-            <a:r>
-              <a:rPr lang="en-GB" dirty="0"/>
-              <a:t>are two changes to make:</a:t>
-            </a:r>
-          </a:p>
-          <a:p>
-            <a:pPr marL="971550" lvl="1" indent="-514350">
-              <a:buFont typeface="+mj-lt"/>
-              <a:buAutoNum type="arabicPeriod"/>
-            </a:pPr>
-            <a:r>
-              <a:rPr lang="en-GB" dirty="0"/>
-              <a:t>Generate parity bits for each matrix element and store them in the high order bits of the column index</a:t>
-            </a:r>
-          </a:p>
-          <a:p>
-            <a:pPr marL="971550" lvl="1" indent="-514350">
-              <a:buFont typeface="+mj-lt"/>
-              <a:buAutoNum type="arabicPeriod"/>
-            </a:pPr>
-            <a:r>
-              <a:rPr lang="en-GB" dirty="0"/>
-              <a:t>Modify the </a:t>
-            </a:r>
-            <a:r>
-              <a:rPr lang="en-GB" dirty="0" err="1"/>
-              <a:t>SpMV</a:t>
-            </a:r>
-            <a:r>
-              <a:rPr lang="en-GB" dirty="0"/>
-              <a:t> function to check the parity bits and then correct any errors that are </a:t>
-            </a:r>
-            <a:r>
-              <a:rPr lang="en-GB" dirty="0" smtClean="0"/>
-              <a:t>found</a:t>
-            </a:r>
-          </a:p>
-        </p:txBody>
-      </p:sp>
-      <p:sp>
-        <p:nvSpPr>
-          <p:cNvPr id="4" name="Slide Number Placeholder 3"/>
-          <p:cNvSpPr>
-            <a:spLocks noGrp="1"/>
-          </p:cNvSpPr>
-          <p:nvPr>
-            <p:ph type="sldNum" sz="quarter" idx="10"/>
-          </p:nvPr>
-        </p:nvSpPr>
-        <p:spPr/>
-        <p:txBody>
-          <a:bodyPr/>
-          <a:lstStyle/>
-          <a:p>
-            <a:fld id="{D9B8CB04-7B95-2844-BD15-B133C35E4786}" type="slidenum">
-              <a:rPr lang="en-GB" smtClean="0"/>
-              <a:pPr/>
-              <a:t>47</a:t>
-            </a:fld>
-            <a:endParaRPr lang="en-GB"/>
-          </a:p>
-        </p:txBody>
-      </p:sp>
-    </p:spTree>
-    <p:extLst>
-      <p:ext uri="{BB962C8B-B14F-4D97-AF65-F5344CB8AC3E}">
-        <p14:creationId xmlns:p14="http://schemas.microsoft.com/office/powerpoint/2010/main" val="2089425383"/>
-      </p:ext>
-    </p:extLst>
-  </p:cSld>
-  <p:clrMapOvr>
-    <a:masterClrMapping/>
-  </p:clrMapOvr>
-  <mc:AlternateContent xmlns:mc="http://schemas.openxmlformats.org/markup-compatibility/2006" xmlns:p14="http://schemas.microsoft.com/office/powerpoint/2010/main">
-    <mc:Choice Requires="p14">
-      <p:transition spd="slow" p14:dur="2000"/>
-    </mc:Choice>
-    <mc:Fallback xmlns="">
-      <p:transition xmlns:p14="http://schemas.microsoft.com/office/powerpoint/2010/main" spd="slow"/>
-    </mc:Fallback>
-  </mc:AlternateContent>
-  <p:timing>
-    <p:tnLst>
-      <p:par>
-        <p:cTn xmlns:p14="http://schemas.microsoft.com/office/powerpoint/2010/main" id="1" dur="indefinite" restart="never" nodeType="tmRoot"/>
-      </p:par>
-    </p:tnLst>
-  </p:timing>
-</p:sld>
-</file>
-
-<file path=ppt/slides/slide48.xml><?xml version="1.0" encoding="utf-8"?>
-<p:sld xmlns:a="http://schemas.openxmlformats.org/drawingml/2006/main" xmlns:r="http://schemas.openxmlformats.org/officeDocument/2006/relationships" xmlns:p="http://schemas.openxmlformats.org/presentationml/2006/main">
-  <p:cSld>
-    <p:spTree>
-      <p:nvGrpSpPr>
-        <p:cNvPr id="1" name=""/>
-        <p:cNvGrpSpPr/>
-        <p:nvPr/>
-      </p:nvGrpSpPr>
-      <p:grpSpPr>
-        <a:xfrm>
-          <a:off x="0" y="0"/>
-          <a:ext cx="0" cy="0"/>
-          <a:chOff x="0" y="0"/>
-          <a:chExt cx="0" cy="0"/>
-        </a:xfrm>
-      </p:grpSpPr>
-      <p:sp>
-        <p:nvSpPr>
-          <p:cNvPr id="2" name="Title 1"/>
-          <p:cNvSpPr>
-            <a:spLocks noGrp="1"/>
-          </p:cNvSpPr>
-          <p:nvPr>
-            <p:ph type="title"/>
-          </p:nvPr>
-        </p:nvSpPr>
-        <p:spPr/>
-        <p:txBody>
-          <a:bodyPr/>
-          <a:lstStyle/>
-          <a:p>
-            <a:r>
-              <a:rPr lang="en-GB" dirty="0" smtClean="0"/>
-              <a:t>Software ECC exercise</a:t>
-            </a:r>
-            <a:endParaRPr lang="en-GB" dirty="0"/>
-          </a:p>
-        </p:txBody>
-      </p:sp>
-      <p:sp>
-        <p:nvSpPr>
-          <p:cNvPr id="3" name="Content Placeholder 2"/>
-          <p:cNvSpPr>
-            <a:spLocks noGrp="1"/>
-          </p:cNvSpPr>
-          <p:nvPr>
-            <p:ph idx="1"/>
-          </p:nvPr>
-        </p:nvSpPr>
-        <p:spPr/>
-        <p:txBody>
-          <a:bodyPr/>
-          <a:lstStyle/>
-          <a:p>
-            <a:r>
-              <a:rPr lang="en-GB" sz="2800" dirty="0" smtClean="0"/>
-              <a:t>Comments in the code will guide you</a:t>
-            </a:r>
-          </a:p>
-          <a:p>
-            <a:pPr lvl="1"/>
-            <a:r>
-              <a:rPr lang="en-GB" sz="2400" dirty="0" smtClean="0"/>
-              <a:t>You just need to modify </a:t>
-            </a:r>
-            <a:r>
-              <a:rPr lang="en-GB" sz="2400" b="1" dirty="0" err="1" smtClean="0">
-                <a:solidFill>
-                  <a:srgbClr val="008000"/>
-                </a:solidFill>
-                <a:latin typeface="Courier New"/>
-                <a:cs typeface="Courier New"/>
-              </a:rPr>
-              <a:t>spmv.c</a:t>
-            </a:r>
-            <a:endParaRPr lang="en-GB" sz="2400" b="1" dirty="0" smtClean="0">
-              <a:solidFill>
-                <a:srgbClr val="008000"/>
-              </a:solidFill>
-              <a:latin typeface="Courier New"/>
-              <a:cs typeface="Courier New"/>
-            </a:endParaRPr>
-          </a:p>
-          <a:p>
-            <a:r>
-              <a:rPr lang="en-GB" sz="2800" dirty="0" smtClean="0"/>
-              <a:t>Two routines are provided to do the heavy lifting (see comments in </a:t>
-            </a:r>
-            <a:r>
-              <a:rPr lang="en-GB" sz="2800" b="1" dirty="0" err="1" smtClean="0">
-                <a:latin typeface="Courier New"/>
-                <a:cs typeface="Courier New"/>
-              </a:rPr>
-              <a:t>common.h</a:t>
-            </a:r>
-            <a:r>
-              <a:rPr lang="en-GB" sz="2800" dirty="0" smtClean="0"/>
-              <a:t> for descriptions):</a:t>
-            </a:r>
-          </a:p>
-          <a:p>
-            <a:pPr lvl="1"/>
-            <a:r>
-              <a:rPr lang="en-GB" sz="2400" b="1" dirty="0" smtClean="0">
-                <a:solidFill>
-                  <a:srgbClr val="3366FF"/>
-                </a:solidFill>
-                <a:latin typeface="Courier New"/>
-                <a:cs typeface="Courier New"/>
-              </a:rPr>
-              <a:t>ecc_compute_col8</a:t>
-            </a:r>
-          </a:p>
-          <a:p>
-            <a:pPr lvl="1"/>
-            <a:r>
-              <a:rPr lang="en-GB" sz="2400" b="1" dirty="0" smtClean="0">
-                <a:solidFill>
-                  <a:srgbClr val="3366FF"/>
-                </a:solidFill>
-                <a:latin typeface="Courier New"/>
-                <a:cs typeface="Courier New"/>
-              </a:rPr>
-              <a:t>ecc_correct_col8</a:t>
-            </a:r>
-          </a:p>
-          <a:p>
-            <a:r>
-              <a:rPr lang="en-GB" sz="2800" dirty="0"/>
-              <a:t>To test the code, pass the ‘</a:t>
-            </a:r>
-            <a:r>
-              <a:rPr lang="en-GB" sz="2800" dirty="0">
-                <a:latin typeface="Courier New"/>
-                <a:cs typeface="Courier New"/>
-              </a:rPr>
-              <a:t>-x</a:t>
-            </a:r>
-            <a:r>
-              <a:rPr lang="en-GB" sz="2800" dirty="0"/>
-              <a:t>’ parameter to the application to inject a random bit</a:t>
-            </a:r>
-            <a:r>
-              <a:rPr lang="en-GB" sz="2800"/>
-              <a:t>-</a:t>
-            </a:r>
-            <a:r>
-              <a:rPr lang="en-GB" sz="2800" smtClean="0"/>
-              <a:t>flip</a:t>
-            </a:r>
-            <a:endParaRPr lang="en-GB" sz="2800" dirty="0" smtClean="0"/>
-          </a:p>
-          <a:p>
-            <a:r>
-              <a:rPr lang="en-GB" sz="2800" dirty="0" smtClean="0"/>
-              <a:t>Example solutions are provided</a:t>
-            </a:r>
-            <a:endParaRPr lang="en-GB" sz="2800" dirty="0"/>
-          </a:p>
-        </p:txBody>
-      </p:sp>
-      <p:sp>
-        <p:nvSpPr>
-          <p:cNvPr id="4" name="Slide Number Placeholder 3"/>
-          <p:cNvSpPr>
-            <a:spLocks noGrp="1"/>
-          </p:cNvSpPr>
-          <p:nvPr>
-            <p:ph type="sldNum" sz="quarter" idx="10"/>
-          </p:nvPr>
-        </p:nvSpPr>
-        <p:spPr/>
-        <p:txBody>
-          <a:bodyPr/>
-          <a:lstStyle/>
-          <a:p>
-            <a:fld id="{D9B8CB04-7B95-2844-BD15-B133C35E4786}" type="slidenum">
-              <a:rPr lang="en-GB" smtClean="0"/>
-              <a:pPr/>
-              <a:t>48</a:t>
-            </a:fld>
-            <a:endParaRPr lang="en-GB"/>
-          </a:p>
-        </p:txBody>
-      </p:sp>
-    </p:spTree>
-    <p:extLst>
-      <p:ext uri="{BB962C8B-B14F-4D97-AF65-F5344CB8AC3E}">
-        <p14:creationId xmlns:p14="http://schemas.microsoft.com/office/powerpoint/2010/main" val="1795682848"/>
-      </p:ext>
-    </p:extLst>
-  </p:cSld>
-  <p:clrMapOvr>
-    <a:masterClrMapping/>
-  </p:clrMapOvr>
-  <mc:AlternateContent xmlns:mc="http://schemas.openxmlformats.org/markup-compatibility/2006" xmlns:p14="http://schemas.microsoft.com/office/powerpoint/2010/main">
-    <mc:Choice Requires="p14">
-      <p:transition spd="slow" p14:dur="2000"/>
-    </mc:Choice>
-    <mc:Fallback xmlns="">
-      <p:transition xmlns:p14="http://schemas.microsoft.com/office/powerpoint/2010/main" spd="slow"/>
-    </mc:Fallback>
-  </mc:AlternateContent>
-  <p:timing>
-    <p:tnLst>
-      <p:par>
-        <p:cTn xmlns:p14="http://schemas.microsoft.com/office/powerpoint/2010/main" id="1" dur="indefinite" restart="never" nodeType="tmRoot"/>
-      </p:par>
-    </p:tnLst>
-  </p:timing>
-</p:sld>
-</file>
-
 <file path=ppt/slides/slide49.xml><?xml version="1.0" encoding="utf-8"?>
 <p:sld xmlns:a="http://schemas.openxmlformats.org/drawingml/2006/main" xmlns:r="http://schemas.openxmlformats.org/officeDocument/2006/relationships" xmlns:p="http://schemas.openxmlformats.org/presentationml/2006/main">
   <p:cSld>
@@ -46525,74 +47868,50 @@
           <a:lstStyle/>
           <a:p>
             <a:r>
-              <a:rPr lang="en-GB" sz="2800" b="1" dirty="0" smtClean="0">
-                <a:solidFill>
-                  <a:srgbClr val="008000"/>
-                </a:solidFill>
-              </a:rPr>
-              <a:t>Extras</a:t>
-            </a:r>
-            <a:r>
-              <a:rPr lang="en-GB" sz="2800" dirty="0" smtClean="0"/>
-              <a:t> (if you finish early!):</a:t>
-            </a:r>
-          </a:p>
-          <a:p>
-            <a:pPr lvl="1"/>
-            <a:r>
-              <a:rPr lang="en-GB" sz="2400" dirty="0" smtClean="0"/>
-              <a:t>Add an additional overall parity bit to improve the performance of the error checking code</a:t>
-            </a:r>
-          </a:p>
-          <a:p>
-            <a:pPr lvl="2"/>
-            <a:r>
-              <a:rPr lang="en-GB" sz="2000" dirty="0" smtClean="0"/>
-              <a:t>Use the </a:t>
-            </a:r>
-            <a:r>
-              <a:rPr lang="en-GB" sz="2000" b="1" dirty="0" err="1" smtClean="0">
-                <a:solidFill>
-                  <a:srgbClr val="3366FF"/>
-                </a:solidFill>
-                <a:latin typeface="Courier New"/>
-                <a:cs typeface="Courier New"/>
-              </a:rPr>
-              <a:t>ecc_compute_overall_partity</a:t>
-            </a:r>
-            <a:r>
-              <a:rPr lang="en-GB" sz="2000" dirty="0" smtClean="0"/>
-              <a:t> routine</a:t>
-            </a:r>
-          </a:p>
-          <a:p>
-            <a:pPr lvl="1"/>
-            <a:r>
-              <a:rPr lang="en-GB" sz="2400" dirty="0" smtClean="0"/>
-              <a:t>Or use the extra parity bit to implement a SECDED scheme </a:t>
-            </a:r>
-            <a:r>
-              <a:rPr lang="en-GB" sz="2400" b="1" dirty="0" smtClean="0">
-                <a:solidFill>
-                  <a:srgbClr val="FF0000"/>
-                </a:solidFill>
-              </a:rPr>
-              <a:t>(TODO: add code to inject double bit-flips)</a:t>
-            </a:r>
-          </a:p>
-          <a:p>
-            <a:pPr lvl="1"/>
-            <a:r>
-              <a:rPr lang="en-GB" sz="2400" dirty="0" smtClean="0"/>
-              <a:t>Try other parity bit placement schemes (4 bits in row and 4 in column, or use the least significant bits of the value)</a:t>
-            </a:r>
-            <a:r>
-              <a:rPr lang="en-GB" sz="2400" b="1" dirty="0" smtClean="0">
-                <a:solidFill>
-                  <a:srgbClr val="FF0000"/>
-                </a:solidFill>
-              </a:rPr>
-              <a:t> (TODO: give them these ECC routines)</a:t>
+              <a:rPr lang="en-GB" dirty="0" smtClean="0"/>
+              <a:t>Using the provided CG code as a starting point, add ECC to make the code more tolerant to silent data corruption</a:t>
+            </a:r>
+          </a:p>
+          <a:p>
+            <a:r>
+              <a:rPr lang="en-GB" dirty="0" smtClean="0"/>
+              <a:t>There </a:t>
+            </a:r>
+            <a:r>
+              <a:rPr lang="en-GB" dirty="0"/>
+              <a:t>are two changes to make:</a:t>
+            </a:r>
+          </a:p>
+          <a:p>
+            <a:pPr marL="971550" lvl="1" indent="-514350">
+              <a:buFont typeface="+mj-lt"/>
+              <a:buAutoNum type="arabicPeriod"/>
+            </a:pPr>
+            <a:r>
+              <a:rPr lang="en-GB" dirty="0"/>
+              <a:t>Generate parity bits for each matrix element and store them in the high order bits of the column index</a:t>
+            </a:r>
+          </a:p>
+          <a:p>
+            <a:pPr marL="971550" lvl="1" indent="-514350">
+              <a:buFont typeface="+mj-lt"/>
+              <a:buAutoNum type="arabicPeriod"/>
+            </a:pPr>
+            <a:r>
+              <a:rPr lang="en-GB" dirty="0"/>
+              <a:t>Modify the </a:t>
+            </a:r>
+            <a:r>
+              <a:rPr lang="en-GB" dirty="0" err="1"/>
+              <a:t>SpMV</a:t>
+            </a:r>
+            <a:r>
+              <a:rPr lang="en-GB" dirty="0"/>
+              <a:t> function to check the parity bits and then correct any errors that are </a:t>
+            </a:r>
+            <a:r>
+              <a:rPr lang="en-GB" dirty="0" smtClean="0"/>
+              <a:t>found</a:t>
             </a:r>
           </a:p>
         </p:txBody>
@@ -46624,7 +47943,7 @@
     </p:spTree>
     <p:extLst>
       <p:ext uri="{BB962C8B-B14F-4D97-AF65-F5344CB8AC3E}">
-        <p14:creationId xmlns:p14="http://schemas.microsoft.com/office/powerpoint/2010/main" val="1046053255"/>
+        <p14:creationId xmlns:p14="http://schemas.microsoft.com/office/powerpoint/2010/main" val="2089425383"/>
       </p:ext>
     </p:extLst>
   </p:cSld>
@@ -46826,6 +48145,414 @@
     <p:extLst>
       <p:ext uri="{BB962C8B-B14F-4D97-AF65-F5344CB8AC3E}">
         <p14:creationId xmlns:p14="http://schemas.microsoft.com/office/powerpoint/2010/main" val="1538294852"/>
+      </p:ext>
+    </p:extLst>
+  </p:cSld>
+  <p:clrMapOvr>
+    <a:masterClrMapping/>
+  </p:clrMapOvr>
+  <mc:AlternateContent xmlns:mc="http://schemas.openxmlformats.org/markup-compatibility/2006" xmlns:p14="http://schemas.microsoft.com/office/powerpoint/2010/main">
+    <mc:Choice Requires="p14">
+      <p:transition spd="slow" p14:dur="2000"/>
+    </mc:Choice>
+    <mc:Fallback xmlns="">
+      <p:transition xmlns:p14="http://schemas.microsoft.com/office/powerpoint/2010/main" spd="slow"/>
+    </mc:Fallback>
+  </mc:AlternateContent>
+  <p:timing>
+    <p:tnLst>
+      <p:par>
+        <p:cTn xmlns:p14="http://schemas.microsoft.com/office/powerpoint/2010/main" id="1" dur="indefinite" restart="never" nodeType="tmRoot"/>
+      </p:par>
+    </p:tnLst>
+  </p:timing>
+</p:sld>
+</file>
+
+<file path=ppt/slides/slide50.xml><?xml version="1.0" encoding="utf-8"?>
+<p:sld xmlns:a="http://schemas.openxmlformats.org/drawingml/2006/main" xmlns:r="http://schemas.openxmlformats.org/officeDocument/2006/relationships" xmlns:p="http://schemas.openxmlformats.org/presentationml/2006/main">
+  <p:cSld>
+    <p:spTree>
+      <p:nvGrpSpPr>
+        <p:cNvPr id="1" name=""/>
+        <p:cNvGrpSpPr/>
+        <p:nvPr/>
+      </p:nvGrpSpPr>
+      <p:grpSpPr>
+        <a:xfrm>
+          <a:off x="0" y="0"/>
+          <a:ext cx="0" cy="0"/>
+          <a:chOff x="0" y="0"/>
+          <a:chExt cx="0" cy="0"/>
+        </a:xfrm>
+      </p:grpSpPr>
+      <p:sp>
+        <p:nvSpPr>
+          <p:cNvPr id="2" name="Title 1"/>
+          <p:cNvSpPr>
+            <a:spLocks noGrp="1"/>
+          </p:cNvSpPr>
+          <p:nvPr>
+            <p:ph type="title"/>
+          </p:nvPr>
+        </p:nvSpPr>
+        <p:spPr/>
+        <p:txBody>
+          <a:bodyPr/>
+          <a:lstStyle/>
+          <a:p>
+            <a:r>
+              <a:rPr lang="en-GB" dirty="0" smtClean="0"/>
+              <a:t>Software ECC exercise</a:t>
+            </a:r>
+            <a:endParaRPr lang="en-GB" dirty="0"/>
+          </a:p>
+        </p:txBody>
+      </p:sp>
+      <p:sp>
+        <p:nvSpPr>
+          <p:cNvPr id="3" name="Content Placeholder 2"/>
+          <p:cNvSpPr>
+            <a:spLocks noGrp="1"/>
+          </p:cNvSpPr>
+          <p:nvPr>
+            <p:ph idx="1"/>
+          </p:nvPr>
+        </p:nvSpPr>
+        <p:spPr/>
+        <p:txBody>
+          <a:bodyPr/>
+          <a:lstStyle/>
+          <a:p>
+            <a:r>
+              <a:rPr lang="en-GB" sz="2800" dirty="0" smtClean="0"/>
+              <a:t>Comments in the code will guide you</a:t>
+            </a:r>
+          </a:p>
+          <a:p>
+            <a:pPr lvl="1"/>
+            <a:r>
+              <a:rPr lang="en-GB" sz="2400" dirty="0" smtClean="0"/>
+              <a:t>You just need to modify </a:t>
+            </a:r>
+            <a:r>
+              <a:rPr lang="en-GB" sz="2400" b="1" dirty="0" err="1" smtClean="0">
+                <a:solidFill>
+                  <a:srgbClr val="008000"/>
+                </a:solidFill>
+                <a:latin typeface="Courier New"/>
+                <a:cs typeface="Courier New"/>
+              </a:rPr>
+              <a:t>spmv.c</a:t>
+            </a:r>
+            <a:endParaRPr lang="en-GB" sz="2400" b="1" dirty="0" smtClean="0">
+              <a:solidFill>
+                <a:srgbClr val="008000"/>
+              </a:solidFill>
+              <a:latin typeface="Courier New"/>
+              <a:cs typeface="Courier New"/>
+            </a:endParaRPr>
+          </a:p>
+          <a:p>
+            <a:r>
+              <a:rPr lang="en-GB" sz="2800" dirty="0" smtClean="0"/>
+              <a:t>Two routines are provided to do the heavy lifting (see comments in </a:t>
+            </a:r>
+            <a:r>
+              <a:rPr lang="en-GB" sz="2800" b="1" dirty="0" err="1" smtClean="0">
+                <a:latin typeface="Courier New"/>
+                <a:cs typeface="Courier New"/>
+              </a:rPr>
+              <a:t>common.h</a:t>
+            </a:r>
+            <a:r>
+              <a:rPr lang="en-GB" sz="2800" dirty="0" smtClean="0"/>
+              <a:t> for descriptions):</a:t>
+            </a:r>
+          </a:p>
+          <a:p>
+            <a:pPr lvl="1"/>
+            <a:r>
+              <a:rPr lang="en-GB" sz="2400" b="1" dirty="0" smtClean="0">
+                <a:solidFill>
+                  <a:srgbClr val="3366FF"/>
+                </a:solidFill>
+                <a:latin typeface="Courier New"/>
+                <a:cs typeface="Courier New"/>
+              </a:rPr>
+              <a:t>ecc_compute_col8</a:t>
+            </a:r>
+          </a:p>
+          <a:p>
+            <a:pPr lvl="1"/>
+            <a:r>
+              <a:rPr lang="en-GB" sz="2400" b="1" dirty="0" smtClean="0">
+                <a:solidFill>
+                  <a:srgbClr val="3366FF"/>
+                </a:solidFill>
+                <a:latin typeface="Courier New"/>
+                <a:cs typeface="Courier New"/>
+              </a:rPr>
+              <a:t>ecc_correct_col8</a:t>
+            </a:r>
+          </a:p>
+          <a:p>
+            <a:r>
+              <a:rPr lang="en-GB" sz="2800" dirty="0"/>
+              <a:t>To test the code, pass the ‘</a:t>
+            </a:r>
+            <a:r>
+              <a:rPr lang="en-GB" sz="2800" dirty="0">
+                <a:latin typeface="Courier New"/>
+                <a:cs typeface="Courier New"/>
+              </a:rPr>
+              <a:t>-x</a:t>
+            </a:r>
+            <a:r>
+              <a:rPr lang="en-GB" sz="2800" dirty="0"/>
+              <a:t>’ parameter to the application to inject a random bit</a:t>
+            </a:r>
+            <a:r>
+              <a:rPr lang="en-GB" sz="2800"/>
+              <a:t>-</a:t>
+            </a:r>
+            <a:r>
+              <a:rPr lang="en-GB" sz="2800" smtClean="0"/>
+              <a:t>flip</a:t>
+            </a:r>
+            <a:endParaRPr lang="en-GB" sz="2800" dirty="0" smtClean="0"/>
+          </a:p>
+          <a:p>
+            <a:r>
+              <a:rPr lang="en-GB" sz="2800" dirty="0" smtClean="0"/>
+              <a:t>Example solutions are provided</a:t>
+            </a:r>
+            <a:endParaRPr lang="en-GB" sz="2800" dirty="0"/>
+          </a:p>
+        </p:txBody>
+      </p:sp>
+      <p:sp>
+        <p:nvSpPr>
+          <p:cNvPr id="4" name="Slide Number Placeholder 3"/>
+          <p:cNvSpPr>
+            <a:spLocks noGrp="1"/>
+          </p:cNvSpPr>
+          <p:nvPr>
+            <p:ph type="sldNum" sz="quarter" idx="10"/>
+          </p:nvPr>
+        </p:nvSpPr>
+        <p:spPr/>
+        <p:txBody>
+          <a:bodyPr/>
+          <a:lstStyle/>
+          <a:p>
+            <a:fld id="{D9B8CB04-7B95-2844-BD15-B133C35E4786}" type="slidenum">
+              <a:rPr lang="en-GB" smtClean="0"/>
+              <a:pPr/>
+              <a:t>50</a:t>
+            </a:fld>
+            <a:endParaRPr lang="en-GB"/>
+          </a:p>
+        </p:txBody>
+      </p:sp>
+    </p:spTree>
+    <p:extLst>
+      <p:ext uri="{BB962C8B-B14F-4D97-AF65-F5344CB8AC3E}">
+        <p14:creationId xmlns:p14="http://schemas.microsoft.com/office/powerpoint/2010/main" val="1795682848"/>
+      </p:ext>
+    </p:extLst>
+  </p:cSld>
+  <p:clrMapOvr>
+    <a:masterClrMapping/>
+  </p:clrMapOvr>
+  <mc:AlternateContent xmlns:mc="http://schemas.openxmlformats.org/markup-compatibility/2006" xmlns:p14="http://schemas.microsoft.com/office/powerpoint/2010/main">
+    <mc:Choice Requires="p14">
+      <p:transition spd="slow" p14:dur="2000"/>
+    </mc:Choice>
+    <mc:Fallback xmlns="">
+      <p:transition xmlns:p14="http://schemas.microsoft.com/office/powerpoint/2010/main" spd="slow"/>
+    </mc:Fallback>
+  </mc:AlternateContent>
+  <p:timing>
+    <p:tnLst>
+      <p:par>
+        <p:cTn xmlns:p14="http://schemas.microsoft.com/office/powerpoint/2010/main" id="1" dur="indefinite" restart="never" nodeType="tmRoot"/>
+      </p:par>
+    </p:tnLst>
+  </p:timing>
+</p:sld>
+</file>
+
+<file path=ppt/slides/slide51.xml><?xml version="1.0" encoding="utf-8"?>
+<p:sld xmlns:a="http://schemas.openxmlformats.org/drawingml/2006/main" xmlns:r="http://schemas.openxmlformats.org/officeDocument/2006/relationships" xmlns:p="http://schemas.openxmlformats.org/presentationml/2006/main">
+  <p:cSld>
+    <p:spTree>
+      <p:nvGrpSpPr>
+        <p:cNvPr id="1" name=""/>
+        <p:cNvGrpSpPr/>
+        <p:nvPr/>
+      </p:nvGrpSpPr>
+      <p:grpSpPr>
+        <a:xfrm>
+          <a:off x="0" y="0"/>
+          <a:ext cx="0" cy="0"/>
+          <a:chOff x="0" y="0"/>
+          <a:chExt cx="0" cy="0"/>
+        </a:xfrm>
+      </p:grpSpPr>
+      <p:sp>
+        <p:nvSpPr>
+          <p:cNvPr id="2" name="Title 1"/>
+          <p:cNvSpPr>
+            <a:spLocks noGrp="1"/>
+          </p:cNvSpPr>
+          <p:nvPr>
+            <p:ph type="title"/>
+          </p:nvPr>
+        </p:nvSpPr>
+        <p:spPr/>
+        <p:txBody>
+          <a:bodyPr/>
+          <a:lstStyle/>
+          <a:p>
+            <a:r>
+              <a:rPr lang="en-GB" dirty="0" smtClean="0"/>
+              <a:t>Software ECC exercise</a:t>
+            </a:r>
+            <a:endParaRPr lang="en-GB" dirty="0"/>
+          </a:p>
+        </p:txBody>
+      </p:sp>
+      <p:sp>
+        <p:nvSpPr>
+          <p:cNvPr id="3" name="Content Placeholder 2"/>
+          <p:cNvSpPr>
+            <a:spLocks noGrp="1"/>
+          </p:cNvSpPr>
+          <p:nvPr>
+            <p:ph idx="1"/>
+          </p:nvPr>
+        </p:nvSpPr>
+        <p:spPr/>
+        <p:txBody>
+          <a:bodyPr/>
+          <a:lstStyle/>
+          <a:p>
+            <a:r>
+              <a:rPr lang="en-GB" sz="2800" b="1" dirty="0" smtClean="0">
+                <a:solidFill>
+                  <a:srgbClr val="008000"/>
+                </a:solidFill>
+              </a:rPr>
+              <a:t>Extras</a:t>
+            </a:r>
+            <a:r>
+              <a:rPr lang="en-GB" sz="2800" dirty="0" smtClean="0"/>
+              <a:t> (if you finish early!):</a:t>
+            </a:r>
+          </a:p>
+          <a:p>
+            <a:pPr lvl="1"/>
+            <a:r>
+              <a:rPr lang="en-GB" sz="2400" dirty="0" smtClean="0"/>
+              <a:t>Add an additional overall parity bit to improve the performance of the error checking code</a:t>
+            </a:r>
+          </a:p>
+          <a:p>
+            <a:pPr lvl="2"/>
+            <a:r>
+              <a:rPr lang="en-GB" sz="2000" dirty="0" smtClean="0"/>
+              <a:t>Use the </a:t>
+            </a:r>
+            <a:r>
+              <a:rPr lang="en-GB" sz="2000" b="1" dirty="0" err="1" smtClean="0">
+                <a:solidFill>
+                  <a:srgbClr val="3366FF"/>
+                </a:solidFill>
+                <a:latin typeface="Courier New"/>
+                <a:cs typeface="Courier New"/>
+              </a:rPr>
+              <a:t>ecc_compute_overall_partity</a:t>
+            </a:r>
+            <a:r>
+              <a:rPr lang="en-GB" sz="2000" dirty="0" smtClean="0"/>
+              <a:t> routine</a:t>
+            </a:r>
+          </a:p>
+          <a:p>
+            <a:pPr lvl="1"/>
+            <a:r>
+              <a:rPr lang="en-GB" sz="2400" dirty="0" smtClean="0"/>
+              <a:t>Or use the extra parity bit to implement a SECDED </a:t>
+            </a:r>
+            <a:r>
+              <a:rPr lang="en-GB" sz="2400" dirty="0" smtClean="0"/>
+              <a:t>scheme (use </a:t>
+            </a:r>
+            <a:r>
+              <a:rPr lang="en-GB" sz="2400" b="1" dirty="0" smtClean="0">
+                <a:solidFill>
+                  <a:srgbClr val="3366FF"/>
+                </a:solidFill>
+                <a:latin typeface="Courier New"/>
+                <a:cs typeface="Courier New"/>
+              </a:rPr>
+              <a:t>–xx</a:t>
+            </a:r>
+            <a:r>
+              <a:rPr lang="en-GB" sz="2400" dirty="0" smtClean="0"/>
+              <a:t> to inject a double-bit flip)</a:t>
+            </a:r>
+          </a:p>
+          <a:p>
+            <a:pPr lvl="1"/>
+            <a:r>
+              <a:rPr lang="en-GB" sz="2400" dirty="0" smtClean="0"/>
+              <a:t>Try </a:t>
+            </a:r>
+            <a:r>
+              <a:rPr lang="en-GB" sz="2400" dirty="0" smtClean="0"/>
+              <a:t>other parity bit placement schemes (4 bits in row and 4 in column, or use the least significant bits of the value)</a:t>
+            </a:r>
+            <a:r>
+              <a:rPr lang="en-GB" sz="2400" b="1" dirty="0" smtClean="0">
+                <a:solidFill>
+                  <a:srgbClr val="FF0000"/>
+                </a:solidFill>
+              </a:rPr>
+              <a:t> (TODO: give them these ECC routines)</a:t>
+            </a:r>
+          </a:p>
+        </p:txBody>
+      </p:sp>
+      <p:sp>
+        <p:nvSpPr>
+          <p:cNvPr id="4" name="Slide Number Placeholder 3"/>
+          <p:cNvSpPr>
+            <a:spLocks noGrp="1"/>
+          </p:cNvSpPr>
+          <p:nvPr>
+            <p:ph type="sldNum" sz="quarter" idx="10"/>
+          </p:nvPr>
+        </p:nvSpPr>
+        <p:spPr/>
+        <p:txBody>
+          <a:bodyPr/>
+          <a:lstStyle/>
+          <a:p>
+            <a:fld id="{D9B8CB04-7B95-2844-BD15-B133C35E4786}" type="slidenum">
+              <a:rPr lang="en-GB" smtClean="0"/>
+              <a:pPr/>
+              <a:t>51</a:t>
+            </a:fld>
+            <a:endParaRPr lang="en-GB"/>
+          </a:p>
+        </p:txBody>
+      </p:sp>
+    </p:spTree>
+    <p:extLst>
+      <p:ext uri="{BB962C8B-B14F-4D97-AF65-F5344CB8AC3E}">
+        <p14:creationId xmlns:p14="http://schemas.microsoft.com/office/powerpoint/2010/main" val="1046053255"/>
       </p:ext>
     </p:extLst>
   </p:cSld>

</xml_diff>

<commit_message>
Add notes about combining with checkpoint/restartx
</commit_message>
<xml_diff>
--- a/sparse-abft.pptx
+++ b/sparse-abft.pptx
@@ -5,10 +5,10 @@
     <p:sldMasterId id="2147483649" r:id="rId3"/>
   </p:sldMasterIdLst>
   <p:notesMasterIdLst>
-    <p:notesMasterId r:id="rId57"/>
+    <p:notesMasterId r:id="rId58"/>
   </p:notesMasterIdLst>
   <p:handoutMasterIdLst>
-    <p:handoutMasterId r:id="rId58"/>
+    <p:handoutMasterId r:id="rId59"/>
   </p:handoutMasterIdLst>
   <p:sldIdLst>
     <p:sldId id="257" r:id="rId4"/>
@@ -61,9 +61,10 @@
     <p:sldId id="615" r:id="rId51"/>
     <p:sldId id="626" r:id="rId52"/>
     <p:sldId id="620" r:id="rId53"/>
-    <p:sldId id="618" r:id="rId54"/>
-    <p:sldId id="588" r:id="rId55"/>
-    <p:sldId id="619" r:id="rId56"/>
+    <p:sldId id="629" r:id="rId54"/>
+    <p:sldId id="618" r:id="rId55"/>
+    <p:sldId id="588" r:id="rId56"/>
+    <p:sldId id="619" r:id="rId57"/>
   </p:sldIdLst>
   <p:sldSz cx="9144000" cy="6858000" type="screen4x3"/>
   <p:notesSz cx="6858000" cy="9144000"/>
@@ -7732,12 +7733,16 @@
           <a:lstStyle/>
           <a:p>
             <a:r>
+              <a:rPr lang="en-GB" dirty="0" err="1" smtClean="0"/>
+              <a:t>nasarb</a:t>
+            </a:r>
+            <a:r>
               <a:rPr lang="en-GB" dirty="0" smtClean="0"/>
-              <a:t>circuit5M is one of the largest real matrices </a:t>
+              <a:t> is of</a:t>
             </a:r>
             <a:r>
               <a:rPr lang="en-GB" baseline="0" dirty="0" smtClean="0"/>
-              <a:t>in the collection – </a:t>
+              <a:t> average size in the collection – </a:t>
             </a:r>
           </a:p>
           <a:p>
@@ -7753,7 +7758,7 @@
                 <a:ea typeface="ＭＳ Ｐゴシック" charset="-128"/>
                 <a:cs typeface="ＭＳ Ｐゴシック" charset="-128"/>
               </a:rPr>
-              <a:t>---- 5,558,326 x 5,558,326 (~30,000,000,000,000 potential positions)</a:t>
+              <a:t>---- 54,870 x 54,870 (~3,000,000,000 potential positions)</a:t>
             </a:r>
           </a:p>
           <a:p>
@@ -7788,7 +7793,7 @@
                 <a:ea typeface="ＭＳ Ｐゴシック" charset="-128"/>
                 <a:cs typeface="ＭＳ Ｐゴシック" charset="-128"/>
               </a:rPr>
-              <a:t> = 59,524,291 (which is ~0.0002% fill)</a:t>
+              <a:t> = 2,677,324 (which is ~0.09% fill)</a:t>
             </a:r>
           </a:p>
           <a:p>
@@ -7813,7 +7818,7 @@
                 <a:cs typeface="ＭＳ Ｐゴシック" charset="-128"/>
                 <a:hlinkClick r:id="rId3"/>
               </a:rPr>
-              <a:t>https://www.cise.ufl.edu/research/sparse/matrices/Freescale/circuit5M.html</a:t>
+              <a:t>https://www.cise.ufl.edu/research/sparse/matrices/Nasa/nasasrb.html</a:t>
             </a:r>
           </a:p>
           <a:p>
@@ -7844,7 +7849,7 @@
               <a:pPr>
                 <a:defRPr/>
               </a:pPr>
-              <a:t>14</a:t>
+              <a:t>13</a:t>
             </a:fld>
             <a:endParaRPr lang="en-GB"/>
           </a:p>
@@ -7909,11 +7914,11 @@
           <a:p>
             <a:r>
               <a:rPr lang="en-GB" dirty="0" smtClean="0"/>
-              <a:t>Thus we believe we should be able to hide the cost of most of the constraint checking, making this a</a:t>
+              <a:t>circuit5M is one of the largest real matrices </a:t>
             </a:r>
             <a:r>
               <a:rPr lang="en-GB" baseline="0" dirty="0" smtClean="0"/>
-              <a:t> very low overhead approach</a:t>
+              <a:t>in the collection – </a:t>
             </a:r>
           </a:p>
           <a:p>
@@ -7921,9 +7926,78 @@
           </a:p>
           <a:p>
             <a:r>
-              <a:rPr lang="en-GB" baseline="0" dirty="0" smtClean="0"/>
-              <a:t>The overhead is all compute, there's no extra bandwidth required, and we think we can get this down lower.</a:t>
-            </a:r>
+              <a:rPr lang="en-US" sz="1200" kern="1200" dirty="0" smtClean="0">
+                <a:solidFill>
+                  <a:schemeClr val="tx1"/>
+                </a:solidFill>
+                <a:latin typeface="Arial" charset="0"/>
+                <a:ea typeface="ＭＳ Ｐゴシック" charset="-128"/>
+                <a:cs typeface="ＭＳ Ｐゴシック" charset="-128"/>
+              </a:rPr>
+              <a:t>---- 5,558,326 x 5,558,326 (~30,000,000,000,000 potential positions)</a:t>
+            </a:r>
+          </a:p>
+          <a:p>
+            <a:r>
+              <a:rPr lang="en-US" sz="1200" kern="1200" dirty="0" smtClean="0">
+                <a:solidFill>
+                  <a:schemeClr val="tx1"/>
+                </a:solidFill>
+                <a:latin typeface="Arial" charset="0"/>
+                <a:ea typeface="ＭＳ Ｐゴシック" charset="-128"/>
+                <a:cs typeface="ＭＳ Ｐゴシック" charset="-128"/>
+              </a:rPr>
+              <a:t>---- </a:t>
+            </a:r>
+            <a:r>
+              <a:rPr lang="en-US" sz="1200" kern="1200" dirty="0" err="1" smtClean="0">
+                <a:solidFill>
+                  <a:schemeClr val="tx1"/>
+                </a:solidFill>
+                <a:latin typeface="Arial" charset="0"/>
+                <a:ea typeface="ＭＳ Ｐゴシック" charset="-128"/>
+                <a:cs typeface="ＭＳ Ｐゴシック" charset="-128"/>
+              </a:rPr>
+              <a:t>nnz</a:t>
+            </a:r>
+            <a:r>
+              <a:rPr lang="en-US" sz="1200" kern="1200" dirty="0" smtClean="0">
+                <a:solidFill>
+                  <a:schemeClr val="tx1"/>
+                </a:solidFill>
+                <a:latin typeface="Arial" charset="0"/>
+                <a:ea typeface="ＭＳ Ｐゴシック" charset="-128"/>
+                <a:cs typeface="ＭＳ Ｐゴシック" charset="-128"/>
+              </a:rPr>
+              <a:t> = 59,524,291 (which is ~0.0002% fill)</a:t>
+            </a:r>
+          </a:p>
+          <a:p>
+            <a:r>
+              <a:rPr lang="en-US" sz="1200" kern="1200" dirty="0" smtClean="0">
+                <a:solidFill>
+                  <a:schemeClr val="tx1"/>
+                </a:solidFill>
+                <a:latin typeface="Arial" charset="0"/>
+                <a:ea typeface="ＭＳ Ｐゴシック" charset="-128"/>
+                <a:cs typeface="ＭＳ Ｐゴシック" charset="-128"/>
+              </a:rPr>
+              <a:t>---- any other data you may want: </a:t>
+            </a:r>
+            <a:r>
+              <a:rPr lang="en-US" sz="1200" u="sng" kern="1200" dirty="0" smtClean="0">
+                <a:solidFill>
+                  <a:schemeClr val="tx1"/>
+                </a:solidFill>
+                <a:latin typeface="Arial" charset="0"/>
+                <a:ea typeface="ＭＳ Ｐゴシック" charset="-128"/>
+                <a:cs typeface="ＭＳ Ｐゴシック" charset="-128"/>
+                <a:hlinkClick r:id="rId3"/>
+              </a:rPr>
+              <a:t>https://www.cise.ufl.edu/research/sparse/matrices/Freescale/circuit5M.html</a:t>
+            </a:r>
+          </a:p>
+          <a:p>
             <a:endParaRPr lang="en-GB" dirty="0"/>
           </a:p>
         </p:txBody>
@@ -7951,7 +8025,7 @@
               <a:pPr>
                 <a:defRPr/>
               </a:pPr>
-              <a:t>15</a:t>
+              <a:t>14</a:t>
             </a:fld>
             <a:endParaRPr lang="en-GB"/>
           </a:p>
@@ -7960,7 +8034,7 @@
     </p:spTree>
     <p:extLst>
       <p:ext uri="{BB962C8B-B14F-4D97-AF65-F5344CB8AC3E}">
-        <p14:creationId xmlns:p14="http://schemas.microsoft.com/office/powerpoint/2010/main" val="1747623644"/>
+        <p14:creationId xmlns:p14="http://schemas.microsoft.com/office/powerpoint/2010/main" val="4291184631"/>
       </p:ext>
     </p:extLst>
   </p:cSld>
@@ -8016,28 +8090,20 @@
           <a:p>
             <a:r>
               <a:rPr lang="en-GB" dirty="0" smtClean="0"/>
-              <a:t>At Exascale, 10-20% could represent</a:t>
+              <a:t>Thus we believe we should be able to hide the cost of most of the constraint checking, making this a</a:t>
             </a:r>
             <a:r>
               <a:rPr lang="en-GB" baseline="0" dirty="0" smtClean="0"/>
-              <a:t> a couple of </a:t>
-            </a:r>
-            <a:r>
-              <a:rPr lang="en-GB" baseline="0" dirty="0" err="1" smtClean="0"/>
-              <a:t>MegaWatts</a:t>
-            </a:r>
+              <a:t> very low overhead approach</a:t>
+            </a:r>
+          </a:p>
+          <a:p>
+            <a:endParaRPr lang="en-GB" baseline="0" dirty="0" smtClean="0"/>
+          </a:p>
+          <a:p>
             <a:r>
               <a:rPr lang="en-GB" baseline="0" dirty="0" smtClean="0"/>
-              <a:t> and millions of dollars per year.</a:t>
-            </a:r>
-          </a:p>
-          <a:p>
-            <a:endParaRPr lang="en-GB" baseline="0" dirty="0" smtClean="0"/>
-          </a:p>
-          <a:p>
-            <a:r>
-              <a:rPr lang="en-GB" baseline="0" dirty="0" smtClean="0"/>
-              <a:t>Architectures such as GPUs already have the ability to selectively turn off ECC on external memory to save energy and increase performance.</a:t>
+              <a:t>The overhead is all compute, there's no extra bandwidth required, and we think we can get this down lower.</a:t>
             </a:r>
             <a:endParaRPr lang="en-GB" dirty="0"/>
           </a:p>
@@ -8066,7 +8132,7 @@
               <a:pPr>
                 <a:defRPr/>
               </a:pPr>
-              <a:t>18</a:t>
+              <a:t>15</a:t>
             </a:fld>
             <a:endParaRPr lang="en-GB"/>
           </a:p>
@@ -8075,7 +8141,7 @@
     </p:spTree>
     <p:extLst>
       <p:ext uri="{BB962C8B-B14F-4D97-AF65-F5344CB8AC3E}">
-        <p14:creationId xmlns:p14="http://schemas.microsoft.com/office/powerpoint/2010/main" val="611868313"/>
+        <p14:creationId xmlns:p14="http://schemas.microsoft.com/office/powerpoint/2010/main" val="1747623644"/>
       </p:ext>
     </p:extLst>
   </p:cSld>
@@ -8131,45 +8197,28 @@
           <a:p>
             <a:r>
               <a:rPr lang="en-GB" dirty="0" smtClean="0"/>
-              <a:t>It's a bit more complicated</a:t>
+              <a:t>At Exascale, 10-20% could represent</a:t>
             </a:r>
             <a:r>
               <a:rPr lang="en-GB" baseline="0" dirty="0" smtClean="0"/>
-              <a:t> than this:</a:t>
-            </a:r>
-          </a:p>
-          <a:p>
-            <a:pPr marL="171450" indent="-171450">
-              <a:buFontTx/>
-              <a:buChar char="-"/>
-            </a:pPr>
+              <a:t> a couple of </a:t>
+            </a:r>
+            <a:r>
+              <a:rPr lang="en-GB" baseline="0" dirty="0" err="1" smtClean="0"/>
+              <a:t>MegaWatts</a:t>
+            </a:r>
             <a:r>
               <a:rPr lang="en-GB" baseline="0" dirty="0" smtClean="0"/>
-              <a:t>The bits can't be grouped as shown for a parity scheme to work </a:t>
-            </a:r>
-          </a:p>
-          <a:p>
-            <a:pPr marL="171450" indent="-171450">
-              <a:buFontTx/>
-              <a:buChar char="-"/>
-            </a:pPr>
+              <a:t> and millions of dollars per year.</a:t>
+            </a:r>
+          </a:p>
+          <a:p>
+            <a:endParaRPr lang="en-GB" baseline="0" dirty="0" smtClean="0"/>
+          </a:p>
+          <a:p>
             <a:r>
               <a:rPr lang="en-GB" baseline="0" dirty="0" smtClean="0"/>
-              <a:t>Instead have to be distributed through the fields that need protecting</a:t>
-            </a:r>
-          </a:p>
-          <a:p>
-            <a:pPr marL="171450" indent="-171450">
-              <a:buFontTx/>
-              <a:buChar char="-"/>
-            </a:pPr>
-            <a:r>
-              <a:rPr lang="en-GB" baseline="0" dirty="0" smtClean="0"/>
-              <a:t>Would require some construction/deconstruction as elements are accessed, but again just rudimentary instructions such as bit ops, shifts </a:t>
-            </a:r>
-            <a:r>
-              <a:rPr lang="en-GB" baseline="0" dirty="0" err="1" smtClean="0"/>
-              <a:t>etc</a:t>
+              <a:t>Architectures such as GPUs already have the ability to selectively turn off ECC on external memory to save energy and increase performance.</a:t>
             </a:r>
             <a:endParaRPr lang="en-GB" dirty="0"/>
           </a:p>
@@ -8198,7 +8247,7 @@
               <a:pPr>
                 <a:defRPr/>
               </a:pPr>
-              <a:t>19</a:t>
+              <a:t>18</a:t>
             </a:fld>
             <a:endParaRPr lang="en-GB"/>
           </a:p>
@@ -8207,7 +8256,7 @@
     </p:spTree>
     <p:extLst>
       <p:ext uri="{BB962C8B-B14F-4D97-AF65-F5344CB8AC3E}">
-        <p14:creationId xmlns:p14="http://schemas.microsoft.com/office/powerpoint/2010/main" val="2209820087"/>
+        <p14:creationId xmlns:p14="http://schemas.microsoft.com/office/powerpoint/2010/main" val="611868313"/>
       </p:ext>
     </p:extLst>
   </p:cSld>
@@ -8263,11 +8312,45 @@
           <a:p>
             <a:r>
               <a:rPr lang="en-GB" dirty="0" smtClean="0"/>
-              <a:t>Correction could be done with checkpoint</a:t>
+              <a:t>It's a bit more complicated</a:t>
             </a:r>
             <a:r>
               <a:rPr lang="en-GB" baseline="0" dirty="0" smtClean="0"/>
-              <a:t> restart, or reload from second copy of matrix</a:t>
+              <a:t> than this:</a:t>
+            </a:r>
+          </a:p>
+          <a:p>
+            <a:pPr marL="171450" indent="-171450">
+              <a:buFontTx/>
+              <a:buChar char="-"/>
+            </a:pPr>
+            <a:r>
+              <a:rPr lang="en-GB" baseline="0" dirty="0" smtClean="0"/>
+              <a:t>The bits can't be grouped as shown for a parity scheme to work </a:t>
+            </a:r>
+          </a:p>
+          <a:p>
+            <a:pPr marL="171450" indent="-171450">
+              <a:buFontTx/>
+              <a:buChar char="-"/>
+            </a:pPr>
+            <a:r>
+              <a:rPr lang="en-GB" baseline="0" dirty="0" smtClean="0"/>
+              <a:t>Instead have to be distributed through the fields that need protecting</a:t>
+            </a:r>
+          </a:p>
+          <a:p>
+            <a:pPr marL="171450" indent="-171450">
+              <a:buFontTx/>
+              <a:buChar char="-"/>
+            </a:pPr>
+            <a:r>
+              <a:rPr lang="en-GB" baseline="0" dirty="0" smtClean="0"/>
+              <a:t>Would require some construction/deconstruction as elements are accessed, but again just rudimentary instructions such as bit ops, shifts </a:t>
+            </a:r>
+            <a:r>
+              <a:rPr lang="en-GB" baseline="0" dirty="0" err="1" smtClean="0"/>
+              <a:t>etc</a:t>
             </a:r>
             <a:endParaRPr lang="en-GB" dirty="0"/>
           </a:p>
@@ -8288,10 +8371,15 @@
           <a:bodyPr/>
           <a:lstStyle/>
           <a:p>
-            <a:fld id="{1C811BE7-51AF-BD41-88D3-08D74CFB37BF}" type="slidenum">
+            <a:pPr>
+              <a:defRPr/>
+            </a:pPr>
+            <a:fld id="{4082635D-059A-CB44-9BFE-E5877B2A18E3}" type="slidenum">
               <a:rPr lang="en-GB" smtClean="0"/>
-              <a:pPr/>
-              <a:t>20</a:t>
+              <a:pPr>
+                <a:defRPr/>
+              </a:pPr>
+              <a:t>19</a:t>
             </a:fld>
             <a:endParaRPr lang="en-GB"/>
           </a:p>
@@ -8300,7 +8388,7 @@
     </p:spTree>
     <p:extLst>
       <p:ext uri="{BB962C8B-B14F-4D97-AF65-F5344CB8AC3E}">
-        <p14:creationId xmlns:p14="http://schemas.microsoft.com/office/powerpoint/2010/main" val="4264065732"/>
+        <p14:creationId xmlns:p14="http://schemas.microsoft.com/office/powerpoint/2010/main" val="2209820087"/>
       </p:ext>
     </p:extLst>
   </p:cSld>
@@ -8354,6 +8442,14 @@
           <a:bodyPr/>
           <a:lstStyle/>
           <a:p>
+            <a:r>
+              <a:rPr lang="en-GB" dirty="0" smtClean="0"/>
+              <a:t>Correction could be done with checkpoint</a:t>
+            </a:r>
+            <a:r>
+              <a:rPr lang="en-GB" baseline="0" dirty="0" smtClean="0"/>
+              <a:t> restart, or reload from second copy of matrix</a:t>
+            </a:r>
             <a:endParaRPr lang="en-GB" dirty="0"/>
           </a:p>
         </p:txBody>
@@ -8376,7 +8472,7 @@
             <a:fld id="{1C811BE7-51AF-BD41-88D3-08D74CFB37BF}" type="slidenum">
               <a:rPr lang="en-GB" smtClean="0"/>
               <a:pPr/>
-              <a:t>21</a:t>
+              <a:t>20</a:t>
             </a:fld>
             <a:endParaRPr lang="en-GB"/>
           </a:p>
@@ -8385,7 +8481,7 @@
     </p:spTree>
     <p:extLst>
       <p:ext uri="{BB962C8B-B14F-4D97-AF65-F5344CB8AC3E}">
-        <p14:creationId xmlns:p14="http://schemas.microsoft.com/office/powerpoint/2010/main" val="2442681378"/>
+        <p14:creationId xmlns:p14="http://schemas.microsoft.com/office/powerpoint/2010/main" val="4264065732"/>
       </p:ext>
     </p:extLst>
   </p:cSld>
@@ -8461,7 +8557,7 @@
             <a:fld id="{1C811BE7-51AF-BD41-88D3-08D74CFB37BF}" type="slidenum">
               <a:rPr lang="en-GB" smtClean="0"/>
               <a:pPr/>
-              <a:t>23</a:t>
+              <a:t>21</a:t>
             </a:fld>
             <a:endParaRPr lang="en-GB"/>
           </a:p>
@@ -8470,7 +8566,7 @@
     </p:spTree>
     <p:extLst>
       <p:ext uri="{BB962C8B-B14F-4D97-AF65-F5344CB8AC3E}">
-        <p14:creationId xmlns:p14="http://schemas.microsoft.com/office/powerpoint/2010/main" val="1269505060"/>
+        <p14:creationId xmlns:p14="http://schemas.microsoft.com/office/powerpoint/2010/main" val="2442681378"/>
       </p:ext>
     </p:extLst>
   </p:cSld>
@@ -8524,14 +8620,6 @@
           <a:bodyPr/>
           <a:lstStyle/>
           <a:p>
-            <a:r>
-              <a:rPr lang="en-GB" dirty="0" smtClean="0"/>
-              <a:t>Invented by</a:t>
-            </a:r>
-            <a:r>
-              <a:rPr lang="en-GB" baseline="0" dirty="0" smtClean="0"/>
-              <a:t> Richard Hamming (Bell labs) in 1950</a:t>
-            </a:r>
             <a:endParaRPr lang="en-GB" dirty="0"/>
           </a:p>
         </p:txBody>
@@ -8554,7 +8642,7 @@
             <a:fld id="{1C811BE7-51AF-BD41-88D3-08D74CFB37BF}" type="slidenum">
               <a:rPr lang="en-GB" smtClean="0"/>
               <a:pPr/>
-              <a:t>27</a:t>
+              <a:t>23</a:t>
             </a:fld>
             <a:endParaRPr lang="en-GB"/>
           </a:p>
@@ -8563,7 +8651,7 @@
     </p:spTree>
     <p:extLst>
       <p:ext uri="{BB962C8B-B14F-4D97-AF65-F5344CB8AC3E}">
-        <p14:creationId xmlns:p14="http://schemas.microsoft.com/office/powerpoint/2010/main" val="3271489321"/>
+        <p14:creationId xmlns:p14="http://schemas.microsoft.com/office/powerpoint/2010/main" val="1269505060"/>
       </p:ext>
     </p:extLst>
   </p:cSld>
@@ -8619,21 +8707,11 @@
           <a:p>
             <a:r>
               <a:rPr lang="en-GB" dirty="0" smtClean="0"/>
-              <a:t>This illustrates the way that each bit</a:t>
+              <a:t>Invented by</a:t>
             </a:r>
             <a:r>
               <a:rPr lang="en-GB" baseline="0" dirty="0" smtClean="0"/>
-              <a:t> is protected by a unique set of parity </a:t>
-            </a:r>
-            <a:r>
-              <a:rPr lang="en-GB" baseline="0" dirty="0" smtClean="0"/>
-              <a:t>bits</a:t>
-            </a:r>
-          </a:p>
-          <a:p>
-            <a:r>
-              <a:rPr lang="en-GB" baseline="0" dirty="0" smtClean="0"/>
-              <a:t>e.g. if bit 9 flipped, will show up in parity bits 1 and 4</a:t>
+              <a:t> Richard Hamming (Bell labs) in 1950</a:t>
             </a:r>
             <a:endParaRPr lang="en-GB" dirty="0"/>
           </a:p>
@@ -8657,7 +8735,7 @@
             <a:fld id="{1C811BE7-51AF-BD41-88D3-08D74CFB37BF}" type="slidenum">
               <a:rPr lang="en-GB" smtClean="0"/>
               <a:pPr/>
-              <a:t>29</a:t>
+              <a:t>27</a:t>
             </a:fld>
             <a:endParaRPr lang="en-GB"/>
           </a:p>
@@ -8666,7 +8744,7 @@
     </p:spTree>
     <p:extLst>
       <p:ext uri="{BB962C8B-B14F-4D97-AF65-F5344CB8AC3E}">
-        <p14:creationId xmlns:p14="http://schemas.microsoft.com/office/powerpoint/2010/main" val="2403286589"/>
+        <p14:creationId xmlns:p14="http://schemas.microsoft.com/office/powerpoint/2010/main" val="3271489321"/>
       </p:ext>
     </p:extLst>
   </p:cSld>
@@ -8720,6 +8798,24 @@
           <a:bodyPr/>
           <a:lstStyle/>
           <a:p>
+            <a:r>
+              <a:rPr lang="en-GB" dirty="0" smtClean="0"/>
+              <a:t>This illustrates the way that each bit</a:t>
+            </a:r>
+            <a:r>
+              <a:rPr lang="en-GB" baseline="0" dirty="0" smtClean="0"/>
+              <a:t> is protected by a unique set of parity </a:t>
+            </a:r>
+            <a:r>
+              <a:rPr lang="en-GB" baseline="0" dirty="0" smtClean="0"/>
+              <a:t>bits</a:t>
+            </a:r>
+          </a:p>
+          <a:p>
+            <a:r>
+              <a:rPr lang="en-GB" baseline="0" dirty="0" smtClean="0"/>
+              <a:t>e.g. if bit 9 flipped, will show up in parity bits 1 and 4</a:t>
+            </a:r>
             <a:endParaRPr lang="en-GB" dirty="0"/>
           </a:p>
         </p:txBody>
@@ -8742,7 +8838,7 @@
             <a:fld id="{1C811BE7-51AF-BD41-88D3-08D74CFB37BF}" type="slidenum">
               <a:rPr lang="en-GB" smtClean="0"/>
               <a:pPr/>
-              <a:t>31</a:t>
+              <a:t>29</a:t>
             </a:fld>
             <a:endParaRPr lang="en-GB"/>
           </a:p>
@@ -8751,7 +8847,7 @@
     </p:spTree>
     <p:extLst>
       <p:ext uri="{BB962C8B-B14F-4D97-AF65-F5344CB8AC3E}">
-        <p14:creationId xmlns:p14="http://schemas.microsoft.com/office/powerpoint/2010/main" val="2442681378"/>
+        <p14:creationId xmlns:p14="http://schemas.microsoft.com/office/powerpoint/2010/main" val="2403286589"/>
       </p:ext>
     </p:extLst>
   </p:cSld>
@@ -8807,7 +8903,7 @@
           <a:p>
             <a:r>
               <a:rPr lang="en-GB" dirty="0" smtClean="0"/>
-              <a:t>10B non-zeros in 0.01% of 10Mx10M matrix</a:t>
+              <a:t>We’ll use CG for the exercise</a:t>
             </a:r>
             <a:endParaRPr lang="en-GB" dirty="0"/>
           </a:p>
@@ -8831,7 +8927,7 @@
             <a:fld id="{1C811BE7-51AF-BD41-88D3-08D74CFB37BF}" type="slidenum">
               <a:rPr lang="en-GB" smtClean="0"/>
               <a:pPr/>
-              <a:t>4</a:t>
+              <a:t>3</a:t>
             </a:fld>
             <a:endParaRPr lang="en-GB"/>
           </a:p>
@@ -8840,7 +8936,7 @@
     </p:spTree>
     <p:extLst>
       <p:ext uri="{BB962C8B-B14F-4D97-AF65-F5344CB8AC3E}">
-        <p14:creationId xmlns:p14="http://schemas.microsoft.com/office/powerpoint/2010/main" val="2787948799"/>
+        <p14:creationId xmlns:p14="http://schemas.microsoft.com/office/powerpoint/2010/main" val="3612073772"/>
       </p:ext>
     </p:extLst>
   </p:cSld>
@@ -8916,7 +9012,7 @@
             <a:fld id="{1C811BE7-51AF-BD41-88D3-08D74CFB37BF}" type="slidenum">
               <a:rPr lang="en-GB" smtClean="0"/>
               <a:pPr/>
-              <a:t>32</a:t>
+              <a:t>31</a:t>
             </a:fld>
             <a:endParaRPr lang="en-GB"/>
           </a:p>
@@ -9001,7 +9097,7 @@
             <a:fld id="{1C811BE7-51AF-BD41-88D3-08D74CFB37BF}" type="slidenum">
               <a:rPr lang="en-GB" smtClean="0"/>
               <a:pPr/>
-              <a:t>33</a:t>
+              <a:t>32</a:t>
             </a:fld>
             <a:endParaRPr lang="en-GB"/>
           </a:p>
@@ -9086,7 +9182,7 @@
             <a:fld id="{1C811BE7-51AF-BD41-88D3-08D74CFB37BF}" type="slidenum">
               <a:rPr lang="en-GB" smtClean="0"/>
               <a:pPr/>
-              <a:t>34</a:t>
+              <a:t>33</a:t>
             </a:fld>
             <a:endParaRPr lang="en-GB"/>
           </a:p>
@@ -9171,7 +9267,7 @@
             <a:fld id="{1C811BE7-51AF-BD41-88D3-08D74CFB37BF}" type="slidenum">
               <a:rPr lang="en-GB" smtClean="0"/>
               <a:pPr/>
-              <a:t>35</a:t>
+              <a:t>34</a:t>
             </a:fld>
             <a:endParaRPr lang="en-GB"/>
           </a:p>
@@ -9256,7 +9352,7 @@
             <a:fld id="{1C811BE7-51AF-BD41-88D3-08D74CFB37BF}" type="slidenum">
               <a:rPr lang="en-GB" smtClean="0"/>
               <a:pPr/>
-              <a:t>36</a:t>
+              <a:t>35</a:t>
             </a:fld>
             <a:endParaRPr lang="en-GB"/>
           </a:p>
@@ -9341,7 +9437,7 @@
             <a:fld id="{1C811BE7-51AF-BD41-88D3-08D74CFB37BF}" type="slidenum">
               <a:rPr lang="en-GB" smtClean="0"/>
               <a:pPr/>
-              <a:t>37</a:t>
+              <a:t>36</a:t>
             </a:fld>
             <a:endParaRPr lang="en-GB"/>
           </a:p>
@@ -9426,7 +9522,7 @@
             <a:fld id="{1C811BE7-51AF-BD41-88D3-08D74CFB37BF}" type="slidenum">
               <a:rPr lang="en-GB" smtClean="0"/>
               <a:pPr/>
-              <a:t>38</a:t>
+              <a:t>37</a:t>
             </a:fld>
             <a:endParaRPr lang="en-GB"/>
           </a:p>
@@ -9511,7 +9607,7 @@
             <a:fld id="{1C811BE7-51AF-BD41-88D3-08D74CFB37BF}" type="slidenum">
               <a:rPr lang="en-GB" smtClean="0"/>
               <a:pPr/>
-              <a:t>40</a:t>
+              <a:t>38</a:t>
             </a:fld>
             <a:endParaRPr lang="en-GB"/>
           </a:p>
@@ -9574,10 +9670,6 @@
           <a:bodyPr/>
           <a:lstStyle/>
           <a:p>
-            <a:r>
-              <a:rPr lang="en-GB" dirty="0" smtClean="0"/>
-              <a:t>Masks will change if you change where you store the parity bits</a:t>
-            </a:r>
             <a:endParaRPr lang="en-GB" dirty="0"/>
           </a:p>
         </p:txBody>
@@ -9600,7 +9692,7 @@
             <a:fld id="{1C811BE7-51AF-BD41-88D3-08D74CFB37BF}" type="slidenum">
               <a:rPr lang="en-GB" smtClean="0"/>
               <a:pPr/>
-              <a:t>43</a:t>
+              <a:t>40</a:t>
             </a:fld>
             <a:endParaRPr lang="en-GB"/>
           </a:p>
@@ -9609,7 +9701,7 @@
     </p:spTree>
     <p:extLst>
       <p:ext uri="{BB962C8B-B14F-4D97-AF65-F5344CB8AC3E}">
-        <p14:creationId xmlns:p14="http://schemas.microsoft.com/office/powerpoint/2010/main" val="2174565375"/>
+        <p14:creationId xmlns:p14="http://schemas.microsoft.com/office/powerpoint/2010/main" val="2442681378"/>
       </p:ext>
     </p:extLst>
   </p:cSld>
@@ -9665,11 +9757,7 @@
           <a:p>
             <a:r>
               <a:rPr lang="en-GB" dirty="0" smtClean="0"/>
-              <a:t>Since data corruption should be very infrequent,</a:t>
-            </a:r>
-            <a:r>
-              <a:rPr lang="en-GB" baseline="0" dirty="0" smtClean="0"/>
-              <a:t> we will very rarely pay the full cost of checking all 7 parity bits</a:t>
+              <a:t>Masks will change if you change where you store the parity bits</a:t>
             </a:r>
             <a:endParaRPr lang="en-GB" dirty="0"/>
           </a:p>
@@ -9693,7 +9781,7 @@
             <a:fld id="{1C811BE7-51AF-BD41-88D3-08D74CFB37BF}" type="slidenum">
               <a:rPr lang="en-GB" smtClean="0"/>
               <a:pPr/>
-              <a:t>45</a:t>
+              <a:t>43</a:t>
             </a:fld>
             <a:endParaRPr lang="en-GB"/>
           </a:p>
@@ -9702,7 +9790,7 @@
     </p:spTree>
     <p:extLst>
       <p:ext uri="{BB962C8B-B14F-4D97-AF65-F5344CB8AC3E}">
-        <p14:creationId xmlns:p14="http://schemas.microsoft.com/office/powerpoint/2010/main" val="645188229"/>
+        <p14:creationId xmlns:p14="http://schemas.microsoft.com/office/powerpoint/2010/main" val="2174565375"/>
       </p:ext>
     </p:extLst>
   </p:cSld>
@@ -9756,6 +9844,10 @@
           <a:bodyPr/>
           <a:lstStyle/>
           <a:p>
+            <a:r>
+              <a:rPr lang="en-GB" dirty="0" smtClean="0"/>
+              <a:t>10B non-zeros in 0.01% of 10Mx10M matrix</a:t>
+            </a:r>
             <a:endParaRPr lang="en-GB" dirty="0"/>
           </a:p>
         </p:txBody>
@@ -9775,15 +9867,10 @@
           <a:bodyPr/>
           <a:lstStyle/>
           <a:p>
-            <a:pPr>
-              <a:defRPr/>
-            </a:pPr>
-            <a:fld id="{4082635D-059A-CB44-9BFE-E5877B2A18E3}" type="slidenum">
+            <a:fld id="{1C811BE7-51AF-BD41-88D3-08D74CFB37BF}" type="slidenum">
               <a:rPr lang="en-GB" smtClean="0"/>
-              <a:pPr>
-                <a:defRPr/>
-              </a:pPr>
-              <a:t>6</a:t>
+              <a:pPr/>
+              <a:t>4</a:t>
             </a:fld>
             <a:endParaRPr lang="en-GB"/>
           </a:p>
@@ -9792,7 +9879,7 @@
     </p:spTree>
     <p:extLst>
       <p:ext uri="{BB962C8B-B14F-4D97-AF65-F5344CB8AC3E}">
-        <p14:creationId xmlns:p14="http://schemas.microsoft.com/office/powerpoint/2010/main" val="4043691626"/>
+        <p14:creationId xmlns:p14="http://schemas.microsoft.com/office/powerpoint/2010/main" val="2787948799"/>
       </p:ext>
     </p:extLst>
   </p:cSld>
@@ -9846,6 +9933,14 @@
           <a:bodyPr/>
           <a:lstStyle/>
           <a:p>
+            <a:r>
+              <a:rPr lang="en-GB" dirty="0" smtClean="0"/>
+              <a:t>Since data corruption should be very infrequent,</a:t>
+            </a:r>
+            <a:r>
+              <a:rPr lang="en-GB" baseline="0" dirty="0" smtClean="0"/>
+              <a:t> we will very rarely pay the full cost of checking all 7 parity bits</a:t>
+            </a:r>
             <a:endParaRPr lang="en-GB" dirty="0"/>
           </a:p>
         </p:txBody>
@@ -9868,7 +9963,7 @@
             <a:fld id="{1C811BE7-51AF-BD41-88D3-08D74CFB37BF}" type="slidenum">
               <a:rPr lang="en-GB" smtClean="0"/>
               <a:pPr/>
-              <a:t>46</a:t>
+              <a:t>45</a:t>
             </a:fld>
             <a:endParaRPr lang="en-GB"/>
           </a:p>
@@ -9877,7 +9972,7 @@
     </p:spTree>
     <p:extLst>
       <p:ext uri="{BB962C8B-B14F-4D97-AF65-F5344CB8AC3E}">
-        <p14:creationId xmlns:p14="http://schemas.microsoft.com/office/powerpoint/2010/main" val="2174565375"/>
+        <p14:creationId xmlns:p14="http://schemas.microsoft.com/office/powerpoint/2010/main" val="645188229"/>
       </p:ext>
     </p:extLst>
   </p:cSld>
@@ -9953,7 +10048,7 @@
             <a:fld id="{1C811BE7-51AF-BD41-88D3-08D74CFB37BF}" type="slidenum">
               <a:rPr lang="en-GB" smtClean="0"/>
               <a:pPr/>
-              <a:t>48</a:t>
+              <a:t>46</a:t>
             </a:fld>
             <a:endParaRPr lang="en-GB"/>
           </a:p>
@@ -9962,7 +10057,7 @@
     </p:spTree>
     <p:extLst>
       <p:ext uri="{BB962C8B-B14F-4D97-AF65-F5344CB8AC3E}">
-        <p14:creationId xmlns:p14="http://schemas.microsoft.com/office/powerpoint/2010/main" val="645188229"/>
+        <p14:creationId xmlns:p14="http://schemas.microsoft.com/office/powerpoint/2010/main" val="2174565375"/>
       </p:ext>
     </p:extLst>
   </p:cSld>
@@ -10038,7 +10133,7 @@
             <a:fld id="{1C811BE7-51AF-BD41-88D3-08D74CFB37BF}" type="slidenum">
               <a:rPr lang="en-GB" smtClean="0"/>
               <a:pPr/>
-              <a:t>49</a:t>
+              <a:t>48</a:t>
             </a:fld>
             <a:endParaRPr lang="en-GB"/>
           </a:p>
@@ -10047,7 +10142,7 @@
     </p:spTree>
     <p:extLst>
       <p:ext uri="{BB962C8B-B14F-4D97-AF65-F5344CB8AC3E}">
-        <p14:creationId xmlns:p14="http://schemas.microsoft.com/office/powerpoint/2010/main" val="2174565375"/>
+        <p14:creationId xmlns:p14="http://schemas.microsoft.com/office/powerpoint/2010/main" val="645188229"/>
       </p:ext>
     </p:extLst>
   </p:cSld>
@@ -10123,7 +10218,278 @@
             <a:fld id="{1C811BE7-51AF-BD41-88D3-08D74CFB37BF}" type="slidenum">
               <a:rPr lang="en-GB" smtClean="0"/>
               <a:pPr/>
+              <a:t>49</a:t>
+            </a:fld>
+            <a:endParaRPr lang="en-GB"/>
+          </a:p>
+        </p:txBody>
+      </p:sp>
+    </p:spTree>
+    <p:extLst>
+      <p:ext uri="{BB962C8B-B14F-4D97-AF65-F5344CB8AC3E}">
+        <p14:creationId xmlns:p14="http://schemas.microsoft.com/office/powerpoint/2010/main" val="2174565375"/>
+      </p:ext>
+    </p:extLst>
+  </p:cSld>
+  <p:clrMapOvr>
+    <a:masterClrMapping/>
+  </p:clrMapOvr>
+</p:notes>
+</file>
+
+<file path=ppt/notesSlides/notesSlide34.xml><?xml version="1.0" encoding="utf-8"?>
+<p:notes xmlns:a="http://schemas.openxmlformats.org/drawingml/2006/main" xmlns:r="http://schemas.openxmlformats.org/officeDocument/2006/relationships" xmlns:p="http://schemas.openxmlformats.org/presentationml/2006/main">
+  <p:cSld>
+    <p:spTree>
+      <p:nvGrpSpPr>
+        <p:cNvPr id="1" name=""/>
+        <p:cNvGrpSpPr/>
+        <p:nvPr/>
+      </p:nvGrpSpPr>
+      <p:grpSpPr>
+        <a:xfrm>
+          <a:off x="0" y="0"/>
+          <a:ext cx="0" cy="0"/>
+          <a:chOff x="0" y="0"/>
+          <a:chExt cx="0" cy="0"/>
+        </a:xfrm>
+      </p:grpSpPr>
+      <p:sp>
+        <p:nvSpPr>
+          <p:cNvPr id="2" name="Slide Image Placeholder 1"/>
+          <p:cNvSpPr>
+            <a:spLocks noGrp="1" noRot="1" noChangeAspect="1"/>
+          </p:cNvSpPr>
+          <p:nvPr>
+            <p:ph type="sldImg"/>
+          </p:nvPr>
+        </p:nvSpPr>
+        <p:spPr/>
+      </p:sp>
+      <p:sp>
+        <p:nvSpPr>
+          <p:cNvPr id="3" name="Notes Placeholder 2"/>
+          <p:cNvSpPr>
+            <a:spLocks noGrp="1"/>
+          </p:cNvSpPr>
+          <p:nvPr>
+            <p:ph type="body" idx="1"/>
+          </p:nvPr>
+        </p:nvSpPr>
+        <p:spPr/>
+        <p:txBody>
+          <a:bodyPr/>
+          <a:lstStyle/>
+          <a:p>
+            <a:r>
+              <a:rPr lang="en-GB" dirty="0" smtClean="0"/>
+              <a:t>Could run expensive schemes only every</a:t>
+            </a:r>
+            <a:r>
+              <a:rPr lang="en-GB" baseline="0" dirty="0" smtClean="0"/>
+              <a:t> X iterations to reduce overheads (need checkpoint to </a:t>
+            </a:r>
+            <a:r>
+              <a:rPr lang="en-GB" baseline="0" dirty="0" err="1" smtClean="0"/>
+              <a:t>fallback</a:t>
+            </a:r>
+            <a:r>
+              <a:rPr lang="en-GB" baseline="0" dirty="0" smtClean="0"/>
+              <a:t> on)</a:t>
+            </a:r>
+            <a:endParaRPr lang="en-GB" dirty="0"/>
+          </a:p>
+        </p:txBody>
+      </p:sp>
+      <p:sp>
+        <p:nvSpPr>
+          <p:cNvPr id="4" name="Slide Number Placeholder 3"/>
+          <p:cNvSpPr>
+            <a:spLocks noGrp="1"/>
+          </p:cNvSpPr>
+          <p:nvPr>
+            <p:ph type="sldNum" sz="quarter" idx="10"/>
+          </p:nvPr>
+        </p:nvSpPr>
+        <p:spPr/>
+        <p:txBody>
+          <a:bodyPr/>
+          <a:lstStyle/>
+          <a:p>
+            <a:fld id="{1C811BE7-51AF-BD41-88D3-08D74CFB37BF}" type="slidenum">
+              <a:rPr lang="en-GB" smtClean="0"/>
+              <a:pPr/>
+              <a:t>50</a:t>
+            </a:fld>
+            <a:endParaRPr lang="en-GB"/>
+          </a:p>
+        </p:txBody>
+      </p:sp>
+    </p:spTree>
+    <p:extLst>
+      <p:ext uri="{BB962C8B-B14F-4D97-AF65-F5344CB8AC3E}">
+        <p14:creationId xmlns:p14="http://schemas.microsoft.com/office/powerpoint/2010/main" val="2761030481"/>
+      </p:ext>
+    </p:extLst>
+  </p:cSld>
+  <p:clrMapOvr>
+    <a:masterClrMapping/>
+  </p:clrMapOvr>
+</p:notes>
+</file>
+
+<file path=ppt/notesSlides/notesSlide35.xml><?xml version="1.0" encoding="utf-8"?>
+<p:notes xmlns:a="http://schemas.openxmlformats.org/drawingml/2006/main" xmlns:r="http://schemas.openxmlformats.org/officeDocument/2006/relationships" xmlns:p="http://schemas.openxmlformats.org/presentationml/2006/main">
+  <p:cSld>
+    <p:spTree>
+      <p:nvGrpSpPr>
+        <p:cNvPr id="1" name=""/>
+        <p:cNvGrpSpPr/>
+        <p:nvPr/>
+      </p:nvGrpSpPr>
+      <p:grpSpPr>
+        <a:xfrm>
+          <a:off x="0" y="0"/>
+          <a:ext cx="0" cy="0"/>
+          <a:chOff x="0" y="0"/>
+          <a:chExt cx="0" cy="0"/>
+        </a:xfrm>
+      </p:grpSpPr>
+      <p:sp>
+        <p:nvSpPr>
+          <p:cNvPr id="2" name="Slide Image Placeholder 1"/>
+          <p:cNvSpPr>
+            <a:spLocks noGrp="1" noRot="1" noChangeAspect="1"/>
+          </p:cNvSpPr>
+          <p:nvPr>
+            <p:ph type="sldImg"/>
+          </p:nvPr>
+        </p:nvSpPr>
+        <p:spPr/>
+      </p:sp>
+      <p:sp>
+        <p:nvSpPr>
+          <p:cNvPr id="3" name="Notes Placeholder 2"/>
+          <p:cNvSpPr>
+            <a:spLocks noGrp="1"/>
+          </p:cNvSpPr>
+          <p:nvPr>
+            <p:ph type="body" idx="1"/>
+          </p:nvPr>
+        </p:nvSpPr>
+        <p:spPr/>
+        <p:txBody>
+          <a:bodyPr/>
+          <a:lstStyle/>
+          <a:p>
+            <a:endParaRPr lang="en-GB" dirty="0"/>
+          </a:p>
+        </p:txBody>
+      </p:sp>
+      <p:sp>
+        <p:nvSpPr>
+          <p:cNvPr id="4" name="Slide Number Placeholder 3"/>
+          <p:cNvSpPr>
+            <a:spLocks noGrp="1"/>
+          </p:cNvSpPr>
+          <p:nvPr>
+            <p:ph type="sldNum" sz="quarter" idx="10"/>
+          </p:nvPr>
+        </p:nvSpPr>
+        <p:spPr/>
+        <p:txBody>
+          <a:bodyPr/>
+          <a:lstStyle/>
+          <a:p>
+            <a:fld id="{1C811BE7-51AF-BD41-88D3-08D74CFB37BF}" type="slidenum">
+              <a:rPr lang="en-GB" smtClean="0"/>
+              <a:pPr/>
               <a:t>51</a:t>
+            </a:fld>
+            <a:endParaRPr lang="en-GB"/>
+          </a:p>
+        </p:txBody>
+      </p:sp>
+    </p:spTree>
+    <p:extLst>
+      <p:ext uri="{BB962C8B-B14F-4D97-AF65-F5344CB8AC3E}">
+        <p14:creationId xmlns:p14="http://schemas.microsoft.com/office/powerpoint/2010/main" val="645188229"/>
+      </p:ext>
+    </p:extLst>
+  </p:cSld>
+  <p:clrMapOvr>
+    <a:masterClrMapping/>
+  </p:clrMapOvr>
+</p:notes>
+</file>
+
+<file path=ppt/notesSlides/notesSlide36.xml><?xml version="1.0" encoding="utf-8"?>
+<p:notes xmlns:a="http://schemas.openxmlformats.org/drawingml/2006/main" xmlns:r="http://schemas.openxmlformats.org/officeDocument/2006/relationships" xmlns:p="http://schemas.openxmlformats.org/presentationml/2006/main">
+  <p:cSld>
+    <p:spTree>
+      <p:nvGrpSpPr>
+        <p:cNvPr id="1" name=""/>
+        <p:cNvGrpSpPr/>
+        <p:nvPr/>
+      </p:nvGrpSpPr>
+      <p:grpSpPr>
+        <a:xfrm>
+          <a:off x="0" y="0"/>
+          <a:ext cx="0" cy="0"/>
+          <a:chOff x="0" y="0"/>
+          <a:chExt cx="0" cy="0"/>
+        </a:xfrm>
+      </p:grpSpPr>
+      <p:sp>
+        <p:nvSpPr>
+          <p:cNvPr id="2" name="Slide Image Placeholder 1"/>
+          <p:cNvSpPr>
+            <a:spLocks noGrp="1" noRot="1" noChangeAspect="1"/>
+          </p:cNvSpPr>
+          <p:nvPr>
+            <p:ph type="sldImg"/>
+          </p:nvPr>
+        </p:nvSpPr>
+        <p:spPr/>
+      </p:sp>
+      <p:sp>
+        <p:nvSpPr>
+          <p:cNvPr id="3" name="Notes Placeholder 2"/>
+          <p:cNvSpPr>
+            <a:spLocks noGrp="1"/>
+          </p:cNvSpPr>
+          <p:nvPr>
+            <p:ph type="body" idx="1"/>
+          </p:nvPr>
+        </p:nvSpPr>
+        <p:spPr/>
+        <p:txBody>
+          <a:bodyPr/>
+          <a:lstStyle/>
+          <a:p>
+            <a:endParaRPr lang="en-GB" dirty="0"/>
+          </a:p>
+        </p:txBody>
+      </p:sp>
+      <p:sp>
+        <p:nvSpPr>
+          <p:cNvPr id="4" name="Slide Number Placeholder 3"/>
+          <p:cNvSpPr>
+            <a:spLocks noGrp="1"/>
+          </p:cNvSpPr>
+          <p:nvPr>
+            <p:ph type="sldNum" sz="quarter" idx="10"/>
+          </p:nvPr>
+        </p:nvSpPr>
+        <p:spPr/>
+        <p:txBody>
+          <a:bodyPr/>
+          <a:lstStyle/>
+          <a:p>
+            <a:fld id="{1C811BE7-51AF-BD41-88D3-08D74CFB37BF}" type="slidenum">
+              <a:rPr lang="en-GB" smtClean="0"/>
+              <a:pPr/>
+              <a:t>52</a:t>
             </a:fld>
             <a:endParaRPr lang="en-GB"/>
           </a:p>
@@ -10186,10 +10552,6 @@
           <a:bodyPr/>
           <a:lstStyle/>
           <a:p>
-            <a:r>
-              <a:rPr lang="en-GB" dirty="0" smtClean="0"/>
-              <a:t>Not usually stored this way, but makes it easier to explain.</a:t>
-            </a:r>
             <a:endParaRPr lang="en-GB" dirty="0"/>
           </a:p>
         </p:txBody>
@@ -10217,7 +10579,7 @@
               <a:pPr>
                 <a:defRPr/>
               </a:pPr>
-              <a:t>7</a:t>
+              <a:t>6</a:t>
             </a:fld>
             <a:endParaRPr lang="en-GB"/>
           </a:p>
@@ -10226,7 +10588,7 @@
     </p:spTree>
     <p:extLst>
       <p:ext uri="{BB962C8B-B14F-4D97-AF65-F5344CB8AC3E}">
-        <p14:creationId xmlns:p14="http://schemas.microsoft.com/office/powerpoint/2010/main" val="3650784985"/>
+        <p14:creationId xmlns:p14="http://schemas.microsoft.com/office/powerpoint/2010/main" val="4043691626"/>
       </p:ext>
     </p:extLst>
   </p:cSld>
@@ -10282,35 +10644,8 @@
           <a:p>
             <a:r>
               <a:rPr lang="en-GB" dirty="0" smtClean="0"/>
-              <a:t>Note that an error in the top bits might have caused erroneous pointer access, causing an application crash.</a:t>
-            </a:r>
-          </a:p>
-          <a:p>
-            <a:endParaRPr lang="en-GB" dirty="0" smtClean="0"/>
-          </a:p>
-          <a:p>
-            <a:r>
-              <a:rPr lang="en-GB" dirty="0" smtClean="0"/>
-              <a:t>On average it's much better than this. Excluding</a:t>
-            </a:r>
-            <a:r>
-              <a:rPr lang="en-GB" baseline="0" dirty="0" smtClean="0"/>
-              <a:t> the largest 13 matrices from the collection, the rest are only up to 16Mx16M, needing just 24 bits, so we've already protected the top 8 bits of each index, or 25% of the index data (12.5% of an entire sparse matrix element).</a:t>
-            </a:r>
-          </a:p>
-          <a:p>
-            <a:endParaRPr lang="en-GB" baseline="0" dirty="0" smtClean="0"/>
-          </a:p>
-          <a:p>
-            <a:r>
-              <a:rPr lang="en-GB" baseline="0" dirty="0" smtClean="0"/>
-              <a:t>Moreover, these errors can be immediately corrected almost for free – just zero the top bits (could just always do this). Considerably cheaper than a checkpoint/restart.</a:t>
-            </a:r>
-          </a:p>
-          <a:p>
-            <a:endParaRPr lang="en-GB" baseline="0" dirty="0" smtClean="0"/>
-          </a:p>
-          <a:p>
+              <a:t>Not usually stored this way, but makes it easier to explain.</a:t>
+            </a:r>
             <a:endParaRPr lang="en-GB" dirty="0"/>
           </a:p>
         </p:txBody>
@@ -10338,7 +10673,7 @@
               <a:pPr>
                 <a:defRPr/>
               </a:pPr>
-              <a:t>9</a:t>
+              <a:t>7</a:t>
             </a:fld>
             <a:endParaRPr lang="en-GB"/>
           </a:p>
@@ -10347,7 +10682,7 @@
     </p:spTree>
     <p:extLst>
       <p:ext uri="{BB962C8B-B14F-4D97-AF65-F5344CB8AC3E}">
-        <p14:creationId xmlns:p14="http://schemas.microsoft.com/office/powerpoint/2010/main" val="1840722145"/>
+        <p14:creationId xmlns:p14="http://schemas.microsoft.com/office/powerpoint/2010/main" val="3650784985"/>
       </p:ext>
     </p:extLst>
   </p:cSld>
@@ -10403,11 +10738,20 @@
           <a:p>
             <a:r>
               <a:rPr lang="en-GB" dirty="0" smtClean="0"/>
-              <a:t>If we have CSR format instead of COO then we actually</a:t>
+              <a:t>Note that an error in the top bits might have caused erroneous pointer access, causing an application crash.</a:t>
+            </a:r>
+          </a:p>
+          <a:p>
+            <a:endParaRPr lang="en-GB" dirty="0" smtClean="0"/>
+          </a:p>
+          <a:p>
+            <a:r>
+              <a:rPr lang="en-GB" dirty="0" smtClean="0"/>
+              <a:t>On average it's much better than this. Excluding</a:t>
             </a:r>
             <a:r>
               <a:rPr lang="en-GB" baseline="0" dirty="0" smtClean="0"/>
-              <a:t> have a couple of slightly different constraints we can use instead.</a:t>
+              <a:t> the largest 13 matrices from the collection, the rest are only up to 16Mx16M, needing just 24 bits, so we've already protected the top 8 bits of each index, or 25% of the index data (12.5% of an entire sparse matrix element).</a:t>
             </a:r>
           </a:p>
           <a:p>
@@ -10416,8 +10760,13 @@
           <a:p>
             <a:r>
               <a:rPr lang="en-GB" baseline="0" dirty="0" smtClean="0"/>
-              <a:t>More constraints available when banded, symmetric etc.</a:t>
-            </a:r>
+              <a:t>Moreover, these errors can be immediately corrected almost for free – just zero the top bits (could just always do this). Considerably cheaper than a checkpoint/restart.</a:t>
+            </a:r>
+          </a:p>
+          <a:p>
+            <a:endParaRPr lang="en-GB" baseline="0" dirty="0" smtClean="0"/>
+          </a:p>
+          <a:p>
             <a:endParaRPr lang="en-GB" dirty="0"/>
           </a:p>
         </p:txBody>
@@ -10445,7 +10794,7 @@
               <a:pPr>
                 <a:defRPr/>
               </a:pPr>
-              <a:t>10</a:t>
+              <a:t>9</a:t>
             </a:fld>
             <a:endParaRPr lang="en-GB"/>
           </a:p>
@@ -10454,7 +10803,7 @@
     </p:spTree>
     <p:extLst>
       <p:ext uri="{BB962C8B-B14F-4D97-AF65-F5344CB8AC3E}">
-        <p14:creationId xmlns:p14="http://schemas.microsoft.com/office/powerpoint/2010/main" val="3411545255"/>
+        <p14:creationId xmlns:p14="http://schemas.microsoft.com/office/powerpoint/2010/main" val="1840722145"/>
       </p:ext>
     </p:extLst>
   </p:cSld>
@@ -10510,11 +10859,11 @@
           <a:p>
             <a:r>
               <a:rPr lang="en-GB" dirty="0" smtClean="0"/>
-              <a:t>In some cases when a bit has been flipped which</a:t>
+              <a:t>If we have CSR format instead of COO then we actually</a:t>
             </a:r>
             <a:r>
               <a:rPr lang="en-GB" baseline="0" dirty="0" smtClean="0"/>
-              <a:t> violates the ordering constraint, there is only one possibility for which bit has been flipped. In these cases the error can be trivially and cheaply corrected just by re-flipping the bit.</a:t>
+              <a:t> have a couple of slightly different constraints we can use instead.</a:t>
             </a:r>
           </a:p>
           <a:p>
@@ -10523,19 +10872,8 @@
           <a:p>
             <a:r>
               <a:rPr lang="en-GB" baseline="0" dirty="0" smtClean="0"/>
-              <a:t>For example, if non-zeros were on average about 512 elements apart, then there'd be about 10 bits that would be "susceptible" per index, as one or more of the bottom 10 bits could be flipped, and the index would still be within its original boundaries. The index could therefore be corrupted by [-512..+511] without changing the ordering of the indices.</a:t>
-            </a:r>
-          </a:p>
-          <a:p>
-            <a:endParaRPr lang="en-GB" baseline="0" dirty="0" smtClean="0"/>
-          </a:p>
-          <a:p>
-            <a:r>
-              <a:rPr lang="en-GB" baseline="0" dirty="0" smtClean="0"/>
-              <a:t>However, when the indices are close, say around 16 apart on average, then only the bottom 5 bits of the index are susceptible, and if any other bits are flipped then the ordering constraint would catch the error.</a:t>
-            </a:r>
-          </a:p>
-          <a:p>
+              <a:t>More constraints available when banded, symmetric etc.</a:t>
+            </a:r>
             <a:endParaRPr lang="en-GB" dirty="0"/>
           </a:p>
         </p:txBody>
@@ -10563,7 +10901,7 @@
               <a:pPr>
                 <a:defRPr/>
               </a:pPr>
-              <a:t>11</a:t>
+              <a:t>10</a:t>
             </a:fld>
             <a:endParaRPr lang="en-GB"/>
           </a:p>
@@ -10572,7 +10910,7 @@
     </p:spTree>
     <p:extLst>
       <p:ext uri="{BB962C8B-B14F-4D97-AF65-F5344CB8AC3E}">
-        <p14:creationId xmlns:p14="http://schemas.microsoft.com/office/powerpoint/2010/main" val="53758508"/>
+        <p14:creationId xmlns:p14="http://schemas.microsoft.com/office/powerpoint/2010/main" val="3411545255"/>
       </p:ext>
     </p:extLst>
   </p:cSld>
@@ -10628,21 +10966,29 @@
           <a:p>
             <a:r>
               <a:rPr lang="en-GB" dirty="0" smtClean="0"/>
-              <a:t>NSAS shuttle rocket booster</a:t>
-            </a:r>
-          </a:p>
-          <a:p>
-            <a:r>
-              <a:rPr lang="en-GB" dirty="0" err="1" smtClean="0"/>
-              <a:t>Freescale</a:t>
-            </a:r>
-            <a:r>
-              <a:rPr lang="en-GB" dirty="0" smtClean="0"/>
-              <a:t> semiconductor</a:t>
+              <a:t>In some cases when a bit has been flipped which</a:t>
             </a:r>
             <a:r>
               <a:rPr lang="en-GB" baseline="0" dirty="0" smtClean="0"/>
-              <a:t> circuit</a:t>
+              <a:t> violates the ordering constraint, there is only one possibility for which bit has been flipped. In these cases the error can be trivially and cheaply corrected just by re-flipping the bit.</a:t>
+            </a:r>
+          </a:p>
+          <a:p>
+            <a:endParaRPr lang="en-GB" baseline="0" dirty="0" smtClean="0"/>
+          </a:p>
+          <a:p>
+            <a:r>
+              <a:rPr lang="en-GB" baseline="0" dirty="0" smtClean="0"/>
+              <a:t>For example, if non-zeros were on average about 512 elements apart, then there'd be about 10 bits that would be "susceptible" per index, as one or more of the bottom 10 bits could be flipped, and the index would still be within its original boundaries. The index could therefore be corrupted by [-512..+511] without changing the ordering of the indices.</a:t>
+            </a:r>
+          </a:p>
+          <a:p>
+            <a:endParaRPr lang="en-GB" baseline="0" dirty="0" smtClean="0"/>
+          </a:p>
+          <a:p>
+            <a:r>
+              <a:rPr lang="en-GB" baseline="0" dirty="0" smtClean="0"/>
+              <a:t>However, when the indices are close, say around 16 apart on average, then only the bottom 5 bits of the index are susceptible, and if any other bits are flipped then the ordering constraint would catch the error.</a:t>
             </a:r>
           </a:p>
           <a:p>
@@ -10665,10 +11011,15 @@
           <a:bodyPr/>
           <a:lstStyle/>
           <a:p>
-            <a:fld id="{1C811BE7-51AF-BD41-88D3-08D74CFB37BF}" type="slidenum">
+            <a:pPr>
+              <a:defRPr/>
+            </a:pPr>
+            <a:fld id="{4082635D-059A-CB44-9BFE-E5877B2A18E3}" type="slidenum">
               <a:rPr lang="en-GB" smtClean="0"/>
-              <a:pPr/>
-              <a:t>12</a:t>
+              <a:pPr>
+                <a:defRPr/>
+              </a:pPr>
+              <a:t>11</a:t>
             </a:fld>
             <a:endParaRPr lang="en-GB"/>
           </a:p>
@@ -10677,7 +11028,7 @@
     </p:spTree>
     <p:extLst>
       <p:ext uri="{BB962C8B-B14F-4D97-AF65-F5344CB8AC3E}">
-        <p14:creationId xmlns:p14="http://schemas.microsoft.com/office/powerpoint/2010/main" val="1116332653"/>
+        <p14:creationId xmlns:p14="http://schemas.microsoft.com/office/powerpoint/2010/main" val="53758508"/>
       </p:ext>
     </p:extLst>
   </p:cSld>
@@ -10732,92 +11083,22 @@
           <a:lstStyle/>
           <a:p>
             <a:r>
+              <a:rPr lang="en-GB" dirty="0" smtClean="0"/>
+              <a:t>NSAS shuttle rocket booster</a:t>
+            </a:r>
+          </a:p>
+          <a:p>
+            <a:r>
               <a:rPr lang="en-GB" dirty="0" err="1" smtClean="0"/>
-              <a:t>nasarb</a:t>
+              <a:t>Freescale</a:t>
             </a:r>
             <a:r>
               <a:rPr lang="en-GB" dirty="0" smtClean="0"/>
-              <a:t> is of</a:t>
+              <a:t> semiconductor</a:t>
             </a:r>
             <a:r>
               <a:rPr lang="en-GB" baseline="0" dirty="0" smtClean="0"/>
-              <a:t> average size in the collection – </a:t>
-            </a:r>
-          </a:p>
-          <a:p>
-            <a:endParaRPr lang="en-GB" baseline="0" dirty="0" smtClean="0"/>
-          </a:p>
-          <a:p>
-            <a:r>
-              <a:rPr lang="en-US" sz="1200" kern="1200" dirty="0" smtClean="0">
-                <a:solidFill>
-                  <a:schemeClr val="tx1"/>
-                </a:solidFill>
-                <a:latin typeface="Arial" charset="0"/>
-                <a:ea typeface="ＭＳ Ｐゴシック" charset="-128"/>
-                <a:cs typeface="ＭＳ Ｐゴシック" charset="-128"/>
-              </a:rPr>
-              <a:t>---- 54,870 x 54,870 (~3,000,000,000 potential positions)</a:t>
-            </a:r>
-          </a:p>
-          <a:p>
-            <a:r>
-              <a:rPr lang="en-US" sz="1200" kern="1200" dirty="0" smtClean="0">
-                <a:solidFill>
-                  <a:schemeClr val="tx1"/>
-                </a:solidFill>
-                <a:latin typeface="Arial" charset="0"/>
-                <a:ea typeface="ＭＳ Ｐゴシック" charset="-128"/>
-                <a:cs typeface="ＭＳ Ｐゴシック" charset="-128"/>
-              </a:rPr>
-              <a:t>---- </a:t>
-            </a:r>
-            <a:r>
-              <a:rPr lang="en-US" sz="1200" kern="1200" dirty="0" err="1" smtClean="0">
-                <a:solidFill>
-                  <a:schemeClr val="tx1"/>
-                </a:solidFill>
-                <a:latin typeface="Arial" charset="0"/>
-                <a:ea typeface="ＭＳ Ｐゴシック" charset="-128"/>
-                <a:cs typeface="ＭＳ Ｐゴシック" charset="-128"/>
-              </a:rPr>
-              <a:t>nnz</a:t>
-            </a:r>
-            <a:r>
-              <a:rPr lang="en-US" sz="1200" kern="1200" dirty="0" smtClean="0">
-                <a:solidFill>
-                  <a:schemeClr val="tx1"/>
-                </a:solidFill>
-                <a:latin typeface="Arial" charset="0"/>
-                <a:ea typeface="ＭＳ Ｐゴシック" charset="-128"/>
-                <a:cs typeface="ＭＳ Ｐゴシック" charset="-128"/>
-              </a:rPr>
-              <a:t> = 2,677,324 (which is ~0.09% fill)</a:t>
-            </a:r>
-          </a:p>
-          <a:p>
-            <a:r>
-              <a:rPr lang="en-US" sz="1200" kern="1200" dirty="0" smtClean="0">
-                <a:solidFill>
-                  <a:schemeClr val="tx1"/>
-                </a:solidFill>
-                <a:latin typeface="Arial" charset="0"/>
-                <a:ea typeface="ＭＳ Ｐゴシック" charset="-128"/>
-                <a:cs typeface="ＭＳ Ｐゴシック" charset="-128"/>
-              </a:rPr>
-              <a:t>---- any other data you may want: </a:t>
-            </a:r>
-            <a:r>
-              <a:rPr lang="en-US" sz="1200" u="sng" kern="1200" dirty="0" smtClean="0">
-                <a:solidFill>
-                  <a:schemeClr val="tx1"/>
-                </a:solidFill>
-                <a:latin typeface="Arial" charset="0"/>
-                <a:ea typeface="ＭＳ Ｐゴシック" charset="-128"/>
-                <a:cs typeface="ＭＳ Ｐゴシック" charset="-128"/>
-                <a:hlinkClick r:id="rId3"/>
-              </a:rPr>
-              <a:t>https://www.cise.ufl.edu/research/sparse/matrices/Nasa/nasasrb.html</a:t>
+              <a:t> circuit</a:t>
             </a:r>
           </a:p>
           <a:p>
@@ -10840,15 +11121,10 @@
           <a:bodyPr/>
           <a:lstStyle/>
           <a:p>
-            <a:pPr>
-              <a:defRPr/>
-            </a:pPr>
-            <a:fld id="{4082635D-059A-CB44-9BFE-E5877B2A18E3}" type="slidenum">
+            <a:fld id="{1C811BE7-51AF-BD41-88D3-08D74CFB37BF}" type="slidenum">
               <a:rPr lang="en-GB" smtClean="0"/>
-              <a:pPr>
-                <a:defRPr/>
-              </a:pPr>
-              <a:t>13</a:t>
+              <a:pPr/>
+              <a:t>12</a:t>
             </a:fld>
             <a:endParaRPr lang="en-GB"/>
           </a:p>
@@ -10857,7 +11133,7 @@
     </p:spTree>
     <p:extLst>
       <p:ext uri="{BB962C8B-B14F-4D97-AF65-F5344CB8AC3E}">
-        <p14:creationId xmlns:p14="http://schemas.microsoft.com/office/powerpoint/2010/main" val="4291184631"/>
+        <p14:creationId xmlns:p14="http://schemas.microsoft.com/office/powerpoint/2010/main" val="1116332653"/>
       </p:ext>
     </p:extLst>
   </p:cSld>
@@ -47743,10 +48019,18 @@
           <a:lstStyle/>
           <a:p>
             <a:r>
-              <a:rPr lang="en-GB" b="1" dirty="0" smtClean="0"/>
+              <a:rPr lang="en-GB" b="1" dirty="0" smtClean="0">
+                <a:solidFill>
+                  <a:srgbClr val="FF0000"/>
+                </a:solidFill>
+              </a:rPr>
               <a:t>parity bit 3</a:t>
             </a:r>
-            <a:endParaRPr lang="en-GB" b="1" dirty="0"/>
+            <a:endParaRPr lang="en-GB" b="1" dirty="0">
+              <a:solidFill>
+                <a:srgbClr val="FF0000"/>
+              </a:solidFill>
+            </a:endParaRPr>
           </a:p>
         </p:txBody>
       </p:sp>
@@ -47773,10 +48057,18 @@
           <a:lstStyle/>
           <a:p>
             <a:r>
-              <a:rPr lang="en-GB" b="1" dirty="0" smtClean="0"/>
+              <a:rPr lang="en-GB" b="1" dirty="0" smtClean="0">
+                <a:solidFill>
+                  <a:srgbClr val="FF0000"/>
+                </a:solidFill>
+              </a:rPr>
               <a:t>parity bit 2</a:t>
             </a:r>
-            <a:endParaRPr lang="en-GB" b="1" dirty="0"/>
+            <a:endParaRPr lang="en-GB" b="1" dirty="0">
+              <a:solidFill>
+                <a:srgbClr val="FF0000"/>
+              </a:solidFill>
+            </a:endParaRPr>
           </a:p>
         </p:txBody>
       </p:sp>
@@ -55658,7 +55950,7 @@
           <a:p>
             <a:r>
               <a:rPr lang="en-GB" dirty="0" smtClean="0"/>
-              <a:t>Software ECC exercise</a:t>
+              <a:t>Software ECC</a:t>
             </a:r>
             <a:endParaRPr lang="en-GB" dirty="0"/>
           </a:p>
@@ -55679,52 +55971,75 @@
           <a:bodyPr/>
           <a:lstStyle/>
           <a:p>
-            <a:r>
-              <a:rPr lang="en-GB" dirty="0" smtClean="0"/>
-              <a:t>Using the provided CG code as a starting point, add ECC to make the code more tolerant to silent data corruption</a:t>
-            </a:r>
-          </a:p>
-          <a:p>
-            <a:r>
-              <a:rPr lang="en-GB" dirty="0" smtClean="0"/>
-              <a:t>There </a:t>
-            </a:r>
-            <a:r>
-              <a:rPr lang="en-GB" dirty="0"/>
-              <a:t>are two changes to make:</a:t>
-            </a:r>
-          </a:p>
-          <a:p>
-            <a:pPr marL="971550" lvl="1" indent="-514350">
-              <a:buFont typeface="+mj-lt"/>
-              <a:buAutoNum type="arabicPeriod"/>
+            <a:pPr>
+              <a:spcBef>
+                <a:spcPts val="1176"/>
+              </a:spcBef>
             </a:pPr>
             <a:r>
-              <a:rPr lang="en-GB" dirty="0"/>
-              <a:t>Generate parity bits for each matrix element and store them in the high order bits of the column index</a:t>
-            </a:r>
-          </a:p>
-          <a:p>
-            <a:pPr marL="971550" lvl="1" indent="-514350">
-              <a:buFont typeface="+mj-lt"/>
-              <a:buAutoNum type="arabicPeriod"/>
+              <a:rPr lang="en-GB" sz="2400" dirty="0" smtClean="0"/>
+              <a:t>We cannot correct a double-bit error with the parity bits, but we could restore the matrix element from the original source (e.g. </a:t>
+            </a:r>
+            <a:r>
+              <a:rPr lang="en-GB" sz="2400" dirty="0" smtClean="0"/>
+              <a:t>a file on disk</a:t>
+            </a:r>
+            <a:r>
+              <a:rPr lang="en-GB" sz="2400" dirty="0" smtClean="0"/>
+              <a:t>)</a:t>
+            </a:r>
+            <a:endParaRPr lang="en-GB" sz="1600" dirty="0" smtClean="0"/>
+          </a:p>
+          <a:p>
+            <a:pPr>
+              <a:spcBef>
+                <a:spcPts val="1176"/>
+              </a:spcBef>
             </a:pPr>
             <a:r>
-              <a:rPr lang="en-GB" dirty="0"/>
-              <a:t>Modify the </a:t>
-            </a:r>
-            <a:r>
-              <a:rPr lang="en-GB" dirty="0" err="1"/>
-              <a:t>SpMV</a:t>
-            </a:r>
-            <a:r>
-              <a:rPr lang="en-GB" dirty="0"/>
-              <a:t> function to check the parity bits and then correct any errors that are </a:t>
-            </a:r>
-            <a:r>
-              <a:rPr lang="en-GB" dirty="0" smtClean="0"/>
-              <a:t>found</a:t>
-            </a:r>
+              <a:rPr lang="en-GB" sz="2400" dirty="0" smtClean="0"/>
+              <a:t>Alternatively, we could combine ECC with a checkpoint/restart scheme</a:t>
+            </a:r>
+          </a:p>
+          <a:p>
+            <a:pPr lvl="1">
+              <a:spcBef>
+                <a:spcPts val="1176"/>
+              </a:spcBef>
+            </a:pPr>
+            <a:r>
+              <a:rPr lang="en-GB" sz="2000" dirty="0" smtClean="0"/>
+              <a:t>Iterative solvers provide natural points at which to checkpoint (e.g. every </a:t>
+            </a:r>
+            <a:r>
+              <a:rPr lang="en-GB" sz="2000" i="1" dirty="0" smtClean="0"/>
+              <a:t>X </a:t>
+            </a:r>
+            <a:r>
+              <a:rPr lang="en-GB" sz="2000" dirty="0" smtClean="0"/>
+              <a:t>iterations)</a:t>
+            </a:r>
+            <a:endParaRPr lang="en-GB" sz="2000" dirty="0" smtClean="0"/>
+          </a:p>
+          <a:p>
+            <a:pPr>
+              <a:spcBef>
+                <a:spcPts val="1176"/>
+              </a:spcBef>
+            </a:pPr>
+            <a:r>
+              <a:rPr lang="en-GB" sz="2400" dirty="0" smtClean="0"/>
+              <a:t>To further reduce the overheads of ECC, we could also perform the checks only every </a:t>
+            </a:r>
+            <a:r>
+              <a:rPr lang="en-GB" sz="2400" i="1" dirty="0" smtClean="0"/>
+              <a:t>X</a:t>
+            </a:r>
+            <a:r>
+              <a:rPr lang="en-GB" sz="2400" dirty="0" smtClean="0"/>
+              <a:t> iterations</a:t>
+            </a:r>
+            <a:endParaRPr lang="en-GB" sz="2000" dirty="0"/>
           </a:p>
         </p:txBody>
       </p:sp>
@@ -55755,7 +56070,7 @@
     </p:spTree>
     <p:extLst>
       <p:ext uri="{BB962C8B-B14F-4D97-AF65-F5344CB8AC3E}">
-        <p14:creationId xmlns:p14="http://schemas.microsoft.com/office/powerpoint/2010/main" val="2089425383"/>
+        <p14:creationId xmlns:p14="http://schemas.microsoft.com/office/powerpoint/2010/main" val="3795016973"/>
       </p:ext>
     </p:extLst>
   </p:cSld>
@@ -55836,109 +56151,51 @@
           <a:lstStyle/>
           <a:p>
             <a:r>
-              <a:rPr lang="en-GB" sz="2800" dirty="0" smtClean="0"/>
-              <a:t>Comments in the code will guide you</a:t>
-            </a:r>
-          </a:p>
-          <a:p>
-            <a:pPr lvl="1"/>
-            <a:r>
-              <a:rPr lang="en-GB" sz="2400" dirty="0" smtClean="0"/>
-              <a:t>You just need to modify </a:t>
-            </a:r>
-            <a:r>
-              <a:rPr lang="en-GB" sz="2400" b="1" dirty="0" err="1" smtClean="0">
-                <a:solidFill>
-                  <a:srgbClr val="008000"/>
-                </a:solidFill>
-                <a:latin typeface="Courier New"/>
-                <a:cs typeface="Courier New"/>
-              </a:rPr>
-              <a:t>spmv.c</a:t>
-            </a:r>
-            <a:endParaRPr lang="en-GB" sz="2400" b="1" dirty="0" smtClean="0">
-              <a:solidFill>
-                <a:srgbClr val="008000"/>
-              </a:solidFill>
-              <a:latin typeface="Courier New"/>
-              <a:cs typeface="Courier New"/>
-            </a:endParaRPr>
-          </a:p>
-          <a:p>
-            <a:r>
-              <a:rPr lang="en-GB" sz="2800" dirty="0" smtClean="0"/>
-              <a:t>Two routines are provided to do the heavy lifting (see comments in </a:t>
-            </a:r>
-            <a:r>
-              <a:rPr lang="en-GB" sz="2800" b="1" dirty="0" err="1" smtClean="0">
-                <a:latin typeface="Courier New"/>
-                <a:cs typeface="Courier New"/>
-              </a:rPr>
-              <a:t>common.h</a:t>
-            </a:r>
-            <a:r>
-              <a:rPr lang="en-GB" sz="2800" dirty="0" smtClean="0"/>
-              <a:t> for descriptions):</a:t>
-            </a:r>
-          </a:p>
-          <a:p>
-            <a:pPr lvl="1"/>
-            <a:r>
-              <a:rPr lang="en-GB" sz="2400" b="1" dirty="0" smtClean="0">
-                <a:solidFill>
-                  <a:srgbClr val="3366FF"/>
-                </a:solidFill>
-                <a:latin typeface="Courier New"/>
-                <a:cs typeface="Courier New"/>
-              </a:rPr>
-              <a:t>ecc_compute_col8</a:t>
-            </a:r>
-          </a:p>
-          <a:p>
-            <a:pPr lvl="1"/>
-            <a:r>
-              <a:rPr lang="en-GB" sz="2400" b="1" dirty="0" smtClean="0">
-                <a:solidFill>
-                  <a:srgbClr val="3366FF"/>
-                </a:solidFill>
-                <a:latin typeface="Courier New"/>
-                <a:cs typeface="Courier New"/>
-              </a:rPr>
-              <a:t>ecc_correct_col8</a:t>
-            </a:r>
-          </a:p>
-          <a:p>
-            <a:r>
-              <a:rPr lang="en-GB" sz="2800" dirty="0"/>
-              <a:t>To test the code, pass the ‘</a:t>
-            </a:r>
-            <a:r>
-              <a:rPr lang="en-GB" sz="2800" dirty="0">
-                <a:latin typeface="Courier New"/>
-                <a:cs typeface="Courier New"/>
-              </a:rPr>
-              <a:t>-x</a:t>
-            </a:r>
-            <a:r>
-              <a:rPr lang="en-GB" sz="2800" dirty="0"/>
-              <a:t>’ parameter to the application to inject a random bit</a:t>
-            </a:r>
-            <a:r>
-              <a:rPr lang="en-GB" sz="2800"/>
-              <a:t>-</a:t>
-            </a:r>
-            <a:r>
-              <a:rPr lang="en-GB" sz="2800" smtClean="0"/>
-              <a:t>flip</a:t>
-            </a:r>
-            <a:endParaRPr lang="en-GB" sz="2800" dirty="0" smtClean="0"/>
-          </a:p>
-          <a:p>
-            <a:r>
-              <a:rPr lang="en-GB" sz="2800" dirty="0" smtClean="0"/>
-              <a:t>Example solutions are provided</a:t>
-            </a:r>
-            <a:endParaRPr lang="en-GB" sz="2800" dirty="0"/>
+              <a:rPr lang="en-GB" dirty="0" smtClean="0"/>
+              <a:t>Using the provided CG code as a starting point, add ECC to make the code more tolerant to silent data corruption</a:t>
+            </a:r>
+          </a:p>
+          <a:p>
+            <a:r>
+              <a:rPr lang="en-GB" dirty="0" smtClean="0"/>
+              <a:t>There </a:t>
+            </a:r>
+            <a:r>
+              <a:rPr lang="en-GB" dirty="0"/>
+              <a:t>are two changes to make:</a:t>
+            </a:r>
+          </a:p>
+          <a:p>
+            <a:pPr marL="971550" lvl="1" indent="-514350">
+              <a:buFont typeface="+mj-lt"/>
+              <a:buAutoNum type="arabicPeriod"/>
+            </a:pPr>
+            <a:r>
+              <a:rPr lang="en-GB" dirty="0"/>
+              <a:t>Generate parity bits for each matrix element and store them in the high order bits of the column index</a:t>
+            </a:r>
+          </a:p>
+          <a:p>
+            <a:pPr marL="971550" lvl="1" indent="-514350">
+              <a:buFont typeface="+mj-lt"/>
+              <a:buAutoNum type="arabicPeriod"/>
+            </a:pPr>
+            <a:r>
+              <a:rPr lang="en-GB" dirty="0"/>
+              <a:t>Modify the </a:t>
+            </a:r>
+            <a:r>
+              <a:rPr lang="en-GB" dirty="0" err="1"/>
+              <a:t>SpMV</a:t>
+            </a:r>
+            <a:r>
+              <a:rPr lang="en-GB" dirty="0"/>
+              <a:t> function to check the parity bits and then correct any errors that are </a:t>
+            </a:r>
+            <a:r>
+              <a:rPr lang="en-GB" dirty="0" smtClean="0"/>
+              <a:t>found</a:t>
+            </a:r>
           </a:p>
         </p:txBody>
       </p:sp>
@@ -55969,7 +56226,7 @@
     </p:spTree>
     <p:extLst>
       <p:ext uri="{BB962C8B-B14F-4D97-AF65-F5344CB8AC3E}">
-        <p14:creationId xmlns:p14="http://schemas.microsoft.com/office/powerpoint/2010/main" val="1795682848"/>
+        <p14:creationId xmlns:p14="http://schemas.microsoft.com/office/powerpoint/2010/main" val="2089425383"/>
       </p:ext>
     </p:extLst>
   </p:cSld>
@@ -56050,6 +56307,229 @@
           <a:lstStyle/>
           <a:p>
             <a:r>
+              <a:rPr lang="en-GB" sz="2800" dirty="0" smtClean="0"/>
+              <a:t>Comments in the code will guide you</a:t>
+            </a:r>
+          </a:p>
+          <a:p>
+            <a:pPr lvl="1"/>
+            <a:r>
+              <a:rPr lang="en-GB" sz="2400" dirty="0" smtClean="0"/>
+              <a:t>You just need to modify </a:t>
+            </a:r>
+            <a:r>
+              <a:rPr lang="en-GB" sz="2400" b="1" dirty="0" err="1" smtClean="0">
+                <a:solidFill>
+                  <a:srgbClr val="008000"/>
+                </a:solidFill>
+                <a:latin typeface="Courier New"/>
+                <a:cs typeface="Courier New"/>
+              </a:rPr>
+              <a:t>spmv.c</a:t>
+            </a:r>
+            <a:endParaRPr lang="en-GB" sz="2400" b="1" dirty="0" smtClean="0">
+              <a:solidFill>
+                <a:srgbClr val="008000"/>
+              </a:solidFill>
+              <a:latin typeface="Courier New"/>
+              <a:cs typeface="Courier New"/>
+            </a:endParaRPr>
+          </a:p>
+          <a:p>
+            <a:r>
+              <a:rPr lang="en-GB" sz="2800" dirty="0" smtClean="0"/>
+              <a:t>Two routines are provided to do the heavy lifting (see comments in </a:t>
+            </a:r>
+            <a:r>
+              <a:rPr lang="en-GB" sz="2800" b="1" dirty="0" err="1" smtClean="0">
+                <a:latin typeface="Courier New"/>
+                <a:cs typeface="Courier New"/>
+              </a:rPr>
+              <a:t>common.h</a:t>
+            </a:r>
+            <a:r>
+              <a:rPr lang="en-GB" sz="2800" dirty="0" smtClean="0"/>
+              <a:t> for descriptions):</a:t>
+            </a:r>
+          </a:p>
+          <a:p>
+            <a:pPr lvl="1"/>
+            <a:r>
+              <a:rPr lang="en-GB" sz="2400" b="1" dirty="0" smtClean="0">
+                <a:solidFill>
+                  <a:srgbClr val="3366FF"/>
+                </a:solidFill>
+                <a:latin typeface="Courier New"/>
+                <a:cs typeface="Courier New"/>
+              </a:rPr>
+              <a:t>ecc_compute_col8</a:t>
+            </a:r>
+          </a:p>
+          <a:p>
+            <a:pPr lvl="1"/>
+            <a:r>
+              <a:rPr lang="en-GB" sz="2400" b="1" dirty="0" smtClean="0">
+                <a:solidFill>
+                  <a:srgbClr val="3366FF"/>
+                </a:solidFill>
+                <a:latin typeface="Courier New"/>
+                <a:cs typeface="Courier New"/>
+              </a:rPr>
+              <a:t>ecc_correct_col8</a:t>
+            </a:r>
+          </a:p>
+          <a:p>
+            <a:r>
+              <a:rPr lang="en-GB" sz="2800" dirty="0"/>
+              <a:t>To test the code, pass the ‘</a:t>
+            </a:r>
+            <a:r>
+              <a:rPr lang="en-GB" sz="2800" dirty="0">
+                <a:latin typeface="Courier New"/>
+                <a:cs typeface="Courier New"/>
+              </a:rPr>
+              <a:t>-x</a:t>
+            </a:r>
+            <a:r>
+              <a:rPr lang="en-GB" sz="2800" dirty="0"/>
+              <a:t>’ parameter to the application to inject a random bit</a:t>
+            </a:r>
+            <a:r>
+              <a:rPr lang="en-GB" sz="2800"/>
+              <a:t>-</a:t>
+            </a:r>
+            <a:r>
+              <a:rPr lang="en-GB" sz="2800" smtClean="0"/>
+              <a:t>flip</a:t>
+            </a:r>
+            <a:endParaRPr lang="en-GB" sz="2800" dirty="0" smtClean="0"/>
+          </a:p>
+          <a:p>
+            <a:r>
+              <a:rPr lang="en-GB" sz="2800" dirty="0" smtClean="0"/>
+              <a:t>Example solutions are provided</a:t>
+            </a:r>
+            <a:endParaRPr lang="en-GB" sz="2800" dirty="0"/>
+          </a:p>
+        </p:txBody>
+      </p:sp>
+      <p:sp>
+        <p:nvSpPr>
+          <p:cNvPr id="4" name="Slide Number Placeholder 3"/>
+          <p:cNvSpPr>
+            <a:spLocks noGrp="1"/>
+          </p:cNvSpPr>
+          <p:nvPr>
+            <p:ph type="sldNum" sz="quarter" idx="10"/>
+          </p:nvPr>
+        </p:nvSpPr>
+        <p:spPr/>
+        <p:txBody>
+          <a:bodyPr/>
+          <a:lstStyle/>
+          <a:p>
+            <a:fld id="{D9B8CB04-7B95-2844-BD15-B133C35E4786}" type="slidenum">
+              <a:rPr lang="en-GB" smtClean="0"/>
+              <a:pPr/>
+              <a:t>53</a:t>
+            </a:fld>
+            <a:endParaRPr lang="en-GB"/>
+          </a:p>
+        </p:txBody>
+      </p:sp>
+    </p:spTree>
+    <p:extLst>
+      <p:ext uri="{BB962C8B-B14F-4D97-AF65-F5344CB8AC3E}">
+        <p14:creationId xmlns:p14="http://schemas.microsoft.com/office/powerpoint/2010/main" val="1795682848"/>
+      </p:ext>
+    </p:extLst>
+  </p:cSld>
+  <p:clrMapOvr>
+    <a:masterClrMapping/>
+  </p:clrMapOvr>
+  <mc:AlternateContent xmlns:mc="http://schemas.openxmlformats.org/markup-compatibility/2006" xmlns:p14="http://schemas.microsoft.com/office/powerpoint/2010/main">
+    <mc:Choice Requires="p14">
+      <p:transition spd="slow" p14:dur="2000"/>
+    </mc:Choice>
+    <mc:Fallback xmlns="">
+      <p:transition xmlns:p14="http://schemas.microsoft.com/office/powerpoint/2010/main" spd="slow"/>
+    </mc:Fallback>
+  </mc:AlternateContent>
+  <p:timing>
+    <p:tnLst>
+      <p:par>
+        <p:cTn xmlns:p14="http://schemas.microsoft.com/office/powerpoint/2010/main" id="1" dur="indefinite" restart="never" nodeType="tmRoot"/>
+      </p:par>
+    </p:tnLst>
+  </p:timing>
+</p:sld>
+</file>
+
+<file path=ppt/slides/slide54.xml><?xml version="1.0" encoding="utf-8"?>
+<p:sld xmlns:a="http://schemas.openxmlformats.org/drawingml/2006/main" xmlns:r="http://schemas.openxmlformats.org/officeDocument/2006/relationships" xmlns:p="http://schemas.openxmlformats.org/presentationml/2006/main">
+  <p:cSld>
+    <p:spTree>
+      <p:nvGrpSpPr>
+        <p:cNvPr id="1" name=""/>
+        <p:cNvGrpSpPr/>
+        <p:nvPr/>
+      </p:nvGrpSpPr>
+      <p:grpSpPr>
+        <a:xfrm>
+          <a:off x="0" y="0"/>
+          <a:ext cx="0" cy="0"/>
+          <a:chOff x="0" y="0"/>
+          <a:chExt cx="0" cy="0"/>
+        </a:xfrm>
+      </p:grpSpPr>
+      <p:sp>
+        <p:nvSpPr>
+          <p:cNvPr id="2" name="Title 1"/>
+          <p:cNvSpPr>
+            <a:spLocks noGrp="1"/>
+          </p:cNvSpPr>
+          <p:nvPr>
+            <p:ph type="title"/>
+          </p:nvPr>
+        </p:nvSpPr>
+        <p:spPr/>
+        <p:txBody>
+          <a:bodyPr/>
+          <a:lstStyle/>
+          <a:p>
+            <a:r>
+              <a:rPr lang="en-GB" dirty="0" smtClean="0"/>
+              <a:t>Software </a:t>
+            </a:r>
+            <a:r>
+              <a:rPr lang="en-GB" dirty="0" smtClean="0"/>
+              <a:t>ECC exercise</a:t>
+            </a:r>
+            <a:endParaRPr lang="en-GB" dirty="0"/>
+          </a:p>
+        </p:txBody>
+      </p:sp>
+      <p:sp>
+        <p:nvSpPr>
+          <p:cNvPr id="3" name="Content Placeholder 2"/>
+          <p:cNvSpPr>
+            <a:spLocks noGrp="1"/>
+          </p:cNvSpPr>
+          <p:nvPr>
+            <p:ph idx="1"/>
+          </p:nvPr>
+        </p:nvSpPr>
+        <p:spPr/>
+        <p:txBody>
+          <a:bodyPr/>
+          <a:lstStyle/>
+          <a:p>
+            <a:pPr>
+              <a:spcBef>
+                <a:spcPts val="1272"/>
+              </a:spcBef>
+            </a:pPr>
+            <a:r>
               <a:rPr lang="en-GB" sz="2800" b="1" dirty="0" smtClean="0">
                 <a:solidFill>
                   <a:srgbClr val="008000"/>
@@ -56063,14 +56543,22 @@
             </a:r>
           </a:p>
           <a:p>
-            <a:pPr lvl="1"/>
+            <a:pPr lvl="1">
+              <a:spcBef>
+                <a:spcPts val="1272"/>
+              </a:spcBef>
+            </a:pPr>
             <a:r>
               <a:rPr lang="en-GB" sz="2400" dirty="0" smtClean="0"/>
               <a:t>Add an additional overall parity bit to improve the performance of the error checking code</a:t>
             </a:r>
           </a:p>
           <a:p>
-            <a:pPr lvl="2"/>
+            <a:pPr lvl="2">
+              <a:spcBef>
+                <a:spcPts val="1272"/>
+              </a:spcBef>
+            </a:pPr>
             <a:r>
               <a:rPr lang="en-GB" sz="2000" dirty="0" smtClean="0"/>
               <a:t>Use the </a:t>
@@ -56091,7 +56579,11 @@
             </a:r>
           </a:p>
           <a:p>
-            <a:pPr lvl="1"/>
+            <a:pPr lvl="1">
+              <a:spcBef>
+                <a:spcPts val="1272"/>
+              </a:spcBef>
+            </a:pPr>
             <a:r>
               <a:rPr lang="en-GB" sz="2400" dirty="0" smtClean="0"/>
               <a:t>Or use the extra parity bit to implement a SECDED scheme (use ‘</a:t>
@@ -56109,19 +56601,20 @@
             </a:r>
           </a:p>
           <a:p>
-            <a:pPr lvl="1"/>
+            <a:pPr lvl="1">
+              <a:spcBef>
+                <a:spcPts val="1272"/>
+              </a:spcBef>
+            </a:pPr>
             <a:r>
               <a:rPr lang="en-GB" sz="2400" dirty="0" smtClean="0"/>
-              <a:t>Try other parity bit placement schemes (4 bits in row and 4 in column, or use the least significant bits of the value)</a:t>
-            </a:r>
-            <a:r>
-              <a:rPr lang="en-GB" sz="2400" b="1" dirty="0" smtClean="0">
-                <a:solidFill>
-                  <a:srgbClr val="FF0000"/>
-                </a:solidFill>
-              </a:rPr>
-              <a:t> (TODO: give them these ECC routines)</a:t>
-            </a:r>
+              <a:t>Try implementing the index constraints scheme discussed earlier instead of ECC</a:t>
+            </a:r>
+            <a:endParaRPr lang="en-GB" sz="2400" b="1" dirty="0" smtClean="0">
+              <a:solidFill>
+                <a:srgbClr val="FF0000"/>
+              </a:solidFill>
+            </a:endParaRPr>
           </a:p>
         </p:txBody>
       </p:sp>
@@ -56143,7 +56636,7 @@
             <a:fld id="{D9B8CB04-7B95-2844-BD15-B133C35E4786}" type="slidenum">
               <a:rPr lang="en-GB" smtClean="0"/>
               <a:pPr/>
-              <a:t>53</a:t>
+              <a:t>54</a:t>
             </a:fld>
             <a:endParaRPr lang="en-GB"/>
           </a:p>

</xml_diff>

<commit_message>
Final tweaks to presentation
</commit_message>
<xml_diff>
--- a/sparse-abft.pptx
+++ b/sparse-abft.pptx
@@ -2678,258 +2678,6 @@
       <dsp:cNvGrpSpPr/>
     </dsp:nvGrpSpPr>
     <dsp:grpSpPr/>
-    <dsp:sp modelId="{73C04BAC-058E-3C4D-AFA4-F4C0EA7379BB}">
-      <dsp:nvSpPr>
-        <dsp:cNvPr id="0" name=""/>
-        <dsp:cNvSpPr/>
-      </dsp:nvSpPr>
-      <dsp:spPr>
-        <a:xfrm>
-          <a:off x="977894" y="1"/>
-          <a:ext cx="6273810" cy="2530598"/>
-        </a:xfrm>
-        <a:prstGeom prst="ellipse">
-          <a:avLst/>
-        </a:prstGeom>
-        <a:solidFill>
-          <a:srgbClr val="FF0000">
-            <a:alpha val="50000"/>
-          </a:srgbClr>
-        </a:solidFill>
-        <a:ln>
-          <a:noFill/>
-        </a:ln>
-        <a:effectLst/>
-      </dsp:spPr>
-      <dsp:style>
-        <a:lnRef idx="0">
-          <a:scrgbClr r="0" g="0" b="0"/>
-        </a:lnRef>
-        <a:fillRef idx="3">
-          <a:scrgbClr r="0" g="0" b="0"/>
-        </a:fillRef>
-        <a:effectRef idx="0">
-          <a:scrgbClr r="0" g="0" b="0"/>
-        </a:effectRef>
-        <a:fontRef idx="minor">
-          <a:schemeClr val="tx1"/>
-        </a:fontRef>
-      </dsp:style>
-      <dsp:txBody>
-        <a:bodyPr spcFirstLastPara="0" vert="horz" wrap="square" lIns="0" tIns="0" rIns="0" bIns="0" numCol="1" spcCol="1270" anchor="ctr" anchorCtr="0">
-          <a:noAutofit/>
-        </a:bodyPr>
-        <a:lstStyle/>
-        <a:p>
-          <a:pPr lvl="0" algn="ctr" defTabSz="2533650">
-            <a:lnSpc>
-              <a:spcPct val="90000"/>
-            </a:lnSpc>
-            <a:spcBef>
-              <a:spcPct val="0"/>
-            </a:spcBef>
-            <a:spcAft>
-              <a:spcPct val="35000"/>
-            </a:spcAft>
-          </a:pPr>
-          <a:endParaRPr lang="en-GB" sz="5700" kern="1200" dirty="0"/>
-        </a:p>
-      </dsp:txBody>
-      <dsp:txXfrm>
-        <a:off x="1701796" y="340659"/>
-        <a:ext cx="4826007" cy="802978"/>
-      </dsp:txXfrm>
-    </dsp:sp>
-    <dsp:sp modelId="{2DA0EACF-5F00-3D46-8335-6F979672C82A}">
-      <dsp:nvSpPr>
-        <dsp:cNvPr id="0" name=""/>
-        <dsp:cNvSpPr/>
-      </dsp:nvSpPr>
-      <dsp:spPr>
-        <a:xfrm>
-          <a:off x="4124188" y="1493021"/>
-          <a:ext cx="3610109" cy="2436876"/>
-        </a:xfrm>
-        <a:prstGeom prst="ellipse">
-          <a:avLst/>
-        </a:prstGeom>
-        <a:solidFill>
-          <a:srgbClr val="008000">
-            <a:alpha val="50000"/>
-          </a:srgbClr>
-        </a:solidFill>
-        <a:ln w="50800">
-          <a:solidFill>
-            <a:schemeClr val="tx1"/>
-          </a:solidFill>
-        </a:ln>
-        <a:effectLst/>
-      </dsp:spPr>
-      <dsp:style>
-        <a:lnRef idx="0">
-          <a:scrgbClr r="0" g="0" b="0"/>
-        </a:lnRef>
-        <a:fillRef idx="3">
-          <a:scrgbClr r="0" g="0" b="0"/>
-        </a:fillRef>
-        <a:effectRef idx="0">
-          <a:scrgbClr r="0" g="0" b="0"/>
-        </a:effectRef>
-        <a:fontRef idx="minor">
-          <a:schemeClr val="tx1"/>
-        </a:fontRef>
-      </dsp:style>
-      <dsp:txBody>
-        <a:bodyPr spcFirstLastPara="0" vert="horz" wrap="square" lIns="0" tIns="0" rIns="0" bIns="0" numCol="1" spcCol="1270" anchor="ctr" anchorCtr="0">
-          <a:noAutofit/>
-        </a:bodyPr>
-        <a:lstStyle/>
-        <a:p>
-          <a:pPr lvl="0" algn="ctr" defTabSz="2889250">
-            <a:lnSpc>
-              <a:spcPct val="90000"/>
-            </a:lnSpc>
-            <a:spcBef>
-              <a:spcPct val="0"/>
-            </a:spcBef>
-            <a:spcAft>
-              <a:spcPct val="35000"/>
-            </a:spcAft>
-          </a:pPr>
-          <a:endParaRPr lang="en-GB" sz="6500" kern="1200" dirty="0"/>
-        </a:p>
-      </dsp:txBody>
-      <dsp:txXfrm>
-        <a:off x="6068093" y="1774199"/>
-        <a:ext cx="1388503" cy="1874520"/>
-      </dsp:txXfrm>
-    </dsp:sp>
-    <dsp:sp modelId="{7B9AF114-74BA-3744-805D-62A5188BCFCB}">
-      <dsp:nvSpPr>
-        <dsp:cNvPr id="0" name=""/>
-        <dsp:cNvSpPr/>
-      </dsp:nvSpPr>
-      <dsp:spPr>
-        <a:xfrm>
-          <a:off x="2006609" y="1774694"/>
-          <a:ext cx="3682996" cy="2530598"/>
-        </a:xfrm>
-        <a:prstGeom prst="ellipse">
-          <a:avLst/>
-        </a:prstGeom>
-        <a:solidFill>
-          <a:srgbClr val="3366FF">
-            <a:alpha val="50000"/>
-          </a:srgbClr>
-        </a:solidFill>
-        <a:ln w="50800">
-          <a:solidFill>
-            <a:schemeClr val="tx1"/>
-          </a:solidFill>
-        </a:ln>
-        <a:effectLst/>
-      </dsp:spPr>
-      <dsp:style>
-        <a:lnRef idx="0">
-          <a:scrgbClr r="0" g="0" b="0"/>
-        </a:lnRef>
-        <a:fillRef idx="3">
-          <a:scrgbClr r="0" g="0" b="0"/>
-        </a:fillRef>
-        <a:effectRef idx="0">
-          <a:scrgbClr r="0" g="0" b="0"/>
-        </a:effectRef>
-        <a:fontRef idx="minor">
-          <a:schemeClr val="tx1"/>
-        </a:fontRef>
-      </dsp:style>
-      <dsp:txBody>
-        <a:bodyPr spcFirstLastPara="0" vert="horz" wrap="square" lIns="0" tIns="0" rIns="0" bIns="0" numCol="1" spcCol="1270" anchor="ctr" anchorCtr="0">
-          <a:noAutofit/>
-        </a:bodyPr>
-        <a:lstStyle/>
-        <a:p>
-          <a:pPr lvl="0" algn="ctr" defTabSz="2533650">
-            <a:lnSpc>
-              <a:spcPct val="90000"/>
-            </a:lnSpc>
-            <a:spcBef>
-              <a:spcPct val="0"/>
-            </a:spcBef>
-            <a:spcAft>
-              <a:spcPct val="35000"/>
-            </a:spcAft>
-          </a:pPr>
-          <a:endParaRPr lang="en-GB" sz="5700" kern="1200" dirty="0"/>
-        </a:p>
-      </dsp:txBody>
-      <dsp:txXfrm>
-        <a:off x="2431571" y="3161656"/>
-        <a:ext cx="2833074" cy="802978"/>
-      </dsp:txXfrm>
-    </dsp:sp>
-    <dsp:sp modelId="{2BD88F83-3538-3045-A6C0-E832D22C5ED1}">
-      <dsp:nvSpPr>
-        <dsp:cNvPr id="0" name=""/>
-        <dsp:cNvSpPr/>
-      </dsp:nvSpPr>
-      <dsp:spPr>
-        <a:xfrm>
-          <a:off x="139688" y="1289834"/>
-          <a:ext cx="3400294" cy="2436876"/>
-        </a:xfrm>
-        <a:prstGeom prst="ellipse">
-          <a:avLst/>
-        </a:prstGeom>
-        <a:solidFill>
-          <a:srgbClr val="FFFF00">
-            <a:alpha val="50000"/>
-          </a:srgbClr>
-        </a:solidFill>
-        <a:ln>
-          <a:noFill/>
-        </a:ln>
-        <a:effectLst/>
-      </dsp:spPr>
-      <dsp:style>
-        <a:lnRef idx="0">
-          <a:scrgbClr r="0" g="0" b="0"/>
-        </a:lnRef>
-        <a:fillRef idx="3">
-          <a:scrgbClr r="0" g="0" b="0"/>
-        </a:fillRef>
-        <a:effectRef idx="0">
-          <a:scrgbClr r="0" g="0" b="0"/>
-        </a:effectRef>
-        <a:fontRef idx="minor">
-          <a:schemeClr val="tx1"/>
-        </a:fontRef>
-      </dsp:style>
-      <dsp:txBody>
-        <a:bodyPr spcFirstLastPara="0" vert="horz" wrap="square" lIns="0" tIns="0" rIns="0" bIns="0" numCol="1" spcCol="1270" anchor="ctr" anchorCtr="0">
-          <a:noAutofit/>
-        </a:bodyPr>
-        <a:lstStyle/>
-        <a:p>
-          <a:pPr lvl="0" algn="ctr" defTabSz="2889250">
-            <a:lnSpc>
-              <a:spcPct val="90000"/>
-            </a:lnSpc>
-            <a:spcBef>
-              <a:spcPct val="0"/>
-            </a:spcBef>
-            <a:spcAft>
-              <a:spcPct val="35000"/>
-            </a:spcAft>
-          </a:pPr>
-          <a:endParaRPr lang="en-GB" sz="6500" kern="1200" dirty="0"/>
-        </a:p>
-      </dsp:txBody>
-      <dsp:txXfrm>
-        <a:off x="401249" y="1571012"/>
-        <a:ext cx="1307805" cy="1874520"/>
-      </dsp:txXfrm>
-    </dsp:sp>
   </dsp:spTree>
 </dsp:drawing>
 </file>
@@ -6868,7 +6616,7 @@
             <a:fld id="{36830665-627D-8446-BB4C-F734FB643EF0}" type="datetime1">
               <a:rPr lang="en-US"/>
               <a:pPr/>
-              <a:t>20/04/16</a:t>
+              <a:t>21/04/16</a:t>
             </a:fld>
             <a:endParaRPr lang="en-US"/>
           </a:p>
@@ -8197,7 +7945,35 @@
           <a:bodyPr/>
           <a:lstStyle/>
           <a:p>
-            <a:endParaRPr lang="en-GB" dirty="0"/>
+            <a:r>
+              <a:rPr lang="en-GB" dirty="0" err="1" smtClean="0"/>
+              <a:t>TeaLeaf</a:t>
+            </a:r>
+            <a:r>
+              <a:rPr lang="en-GB" dirty="0" smtClean="0"/>
+              <a:t> uses CSR – </a:t>
+            </a:r>
+            <a:r>
+              <a:rPr lang="en-GB" dirty="0" err="1" smtClean="0"/>
+              <a:t>silghtly</a:t>
+            </a:r>
+            <a:r>
+              <a:rPr lang="en-GB" dirty="0" smtClean="0"/>
+              <a:t> </a:t>
+            </a:r>
+            <a:r>
+              <a:rPr lang="en-GB" smtClean="0"/>
+              <a:t>different</a:t>
+            </a:r>
+            <a:r>
+              <a:rPr lang="en-GB" baseline="0" smtClean="0"/>
+              <a:t> index</a:t>
+            </a:r>
+            <a:r>
+              <a:rPr lang="en-GB" smtClean="0"/>
+              <a:t> constraints</a:t>
+            </a:r>
+            <a:endParaRPr lang="en-GB"/>
           </a:p>
         </p:txBody>
       </p:sp>
@@ -8219,7 +7995,7 @@
             <a:fld id="{1C811BE7-51AF-BD41-88D3-08D74CFB37BF}" type="slidenum">
               <a:rPr lang="en-GB" smtClean="0"/>
               <a:pPr/>
-              <a:t>17</a:t>
+              <a:t>16</a:t>
             </a:fld>
             <a:endParaRPr lang="en-GB"/>
           </a:p>
@@ -8228,7 +8004,7 @@
     </p:spTree>
     <p:extLst>
       <p:ext uri="{BB962C8B-B14F-4D97-AF65-F5344CB8AC3E}">
-        <p14:creationId xmlns:p14="http://schemas.microsoft.com/office/powerpoint/2010/main" val="259544647"/>
+        <p14:creationId xmlns:p14="http://schemas.microsoft.com/office/powerpoint/2010/main" val="4051046800"/>
       </p:ext>
     </p:extLst>
   </p:cSld>
@@ -8304,7 +8080,7 @@
             <a:fld id="{1C811BE7-51AF-BD41-88D3-08D74CFB37BF}" type="slidenum">
               <a:rPr lang="en-GB" smtClean="0"/>
               <a:pPr/>
-              <a:t>18</a:t>
+              <a:t>17</a:t>
             </a:fld>
             <a:endParaRPr lang="en-GB"/>
           </a:p>
@@ -8367,31 +8143,6 @@
           <a:bodyPr/>
           <a:lstStyle/>
           <a:p>
-            <a:r>
-              <a:rPr lang="en-GB" dirty="0" smtClean="0"/>
-              <a:t>At Exascale, 10-20% could represent</a:t>
-            </a:r>
-            <a:r>
-              <a:rPr lang="en-GB" baseline="0" dirty="0" smtClean="0"/>
-              <a:t> a couple of </a:t>
-            </a:r>
-            <a:r>
-              <a:rPr lang="en-GB" baseline="0" dirty="0" err="1" smtClean="0"/>
-              <a:t>MegaWatts</a:t>
-            </a:r>
-            <a:r>
-              <a:rPr lang="en-GB" baseline="0" dirty="0" smtClean="0"/>
-              <a:t> and millions of dollars per year.</a:t>
-            </a:r>
-          </a:p>
-          <a:p>
-            <a:endParaRPr lang="en-GB" baseline="0" dirty="0" smtClean="0"/>
-          </a:p>
-          <a:p>
-            <a:r>
-              <a:rPr lang="en-GB" baseline="0" dirty="0" smtClean="0"/>
-              <a:t>Architectures such as GPUs already have the ability to selectively turn off ECC on external memory to save energy and increase performance.</a:t>
-            </a:r>
             <a:endParaRPr lang="en-GB" dirty="0"/>
           </a:p>
         </p:txBody>
@@ -8411,15 +8162,10 @@
           <a:bodyPr/>
           <a:lstStyle/>
           <a:p>
-            <a:pPr>
-              <a:defRPr/>
-            </a:pPr>
-            <a:fld id="{4082635D-059A-CB44-9BFE-E5877B2A18E3}" type="slidenum">
+            <a:fld id="{1C811BE7-51AF-BD41-88D3-08D74CFB37BF}" type="slidenum">
               <a:rPr lang="en-GB" smtClean="0"/>
-              <a:pPr>
-                <a:defRPr/>
-              </a:pPr>
-              <a:t>20</a:t>
+              <a:pPr/>
+              <a:t>18</a:t>
             </a:fld>
             <a:endParaRPr lang="en-GB"/>
           </a:p>
@@ -8428,7 +8174,7 @@
     </p:spTree>
     <p:extLst>
       <p:ext uri="{BB962C8B-B14F-4D97-AF65-F5344CB8AC3E}">
-        <p14:creationId xmlns:p14="http://schemas.microsoft.com/office/powerpoint/2010/main" val="611868313"/>
+        <p14:creationId xmlns:p14="http://schemas.microsoft.com/office/powerpoint/2010/main" val="259544647"/>
       </p:ext>
     </p:extLst>
   </p:cSld>
@@ -8484,45 +8230,28 @@
           <a:p>
             <a:r>
               <a:rPr lang="en-GB" dirty="0" smtClean="0"/>
-              <a:t>It's a bit more complicated</a:t>
+              <a:t>At Exascale, 10-20% could represent</a:t>
             </a:r>
             <a:r>
               <a:rPr lang="en-GB" baseline="0" dirty="0" smtClean="0"/>
-              <a:t> than this:</a:t>
-            </a:r>
-          </a:p>
-          <a:p>
-            <a:pPr marL="171450" indent="-171450">
-              <a:buFontTx/>
-              <a:buChar char="-"/>
-            </a:pPr>
+              <a:t> a couple of </a:t>
+            </a:r>
+            <a:r>
+              <a:rPr lang="en-GB" baseline="0" dirty="0" err="1" smtClean="0"/>
+              <a:t>MegaWatts</a:t>
+            </a:r>
             <a:r>
               <a:rPr lang="en-GB" baseline="0" dirty="0" smtClean="0"/>
-              <a:t>The bits can't be grouped as shown for a parity scheme to work </a:t>
-            </a:r>
-          </a:p>
-          <a:p>
-            <a:pPr marL="171450" indent="-171450">
-              <a:buFontTx/>
-              <a:buChar char="-"/>
-            </a:pPr>
+              <a:t> and millions of dollars per year.</a:t>
+            </a:r>
+          </a:p>
+          <a:p>
+            <a:endParaRPr lang="en-GB" baseline="0" dirty="0" smtClean="0"/>
+          </a:p>
+          <a:p>
             <a:r>
               <a:rPr lang="en-GB" baseline="0" dirty="0" smtClean="0"/>
-              <a:t>Instead have to be distributed through the fields that need protecting</a:t>
-            </a:r>
-          </a:p>
-          <a:p>
-            <a:pPr marL="171450" indent="-171450">
-              <a:buFontTx/>
-              <a:buChar char="-"/>
-            </a:pPr>
-            <a:r>
-              <a:rPr lang="en-GB" baseline="0" dirty="0" smtClean="0"/>
-              <a:t>Would require some construction/deconstruction as elements are accessed, but again just rudimentary instructions such as bit ops, shifts </a:t>
-            </a:r>
-            <a:r>
-              <a:rPr lang="en-GB" baseline="0" dirty="0" err="1" smtClean="0"/>
-              <a:t>etc</a:t>
+              <a:t>Architectures such as GPUs already have the ability to selectively turn off ECC on external memory to save energy and increase performance.</a:t>
             </a:r>
             <a:endParaRPr lang="en-GB" dirty="0"/>
           </a:p>
@@ -8551,7 +8280,7 @@
               <a:pPr>
                 <a:defRPr/>
               </a:pPr>
-              <a:t>21</a:t>
+              <a:t>20</a:t>
             </a:fld>
             <a:endParaRPr lang="en-GB"/>
           </a:p>
@@ -8560,7 +8289,7 @@
     </p:spTree>
     <p:extLst>
       <p:ext uri="{BB962C8B-B14F-4D97-AF65-F5344CB8AC3E}">
-        <p14:creationId xmlns:p14="http://schemas.microsoft.com/office/powerpoint/2010/main" val="2209820087"/>
+        <p14:creationId xmlns:p14="http://schemas.microsoft.com/office/powerpoint/2010/main" val="611868313"/>
       </p:ext>
     </p:extLst>
   </p:cSld>
@@ -8616,11 +8345,45 @@
           <a:p>
             <a:r>
               <a:rPr lang="en-GB" dirty="0" smtClean="0"/>
-              <a:t>Correction could be done with checkpoint</a:t>
+              <a:t>It's a bit more complicated</a:t>
             </a:r>
             <a:r>
               <a:rPr lang="en-GB" baseline="0" dirty="0" smtClean="0"/>
-              <a:t> restart, or reload from second copy of matrix</a:t>
+              <a:t> than this:</a:t>
+            </a:r>
+          </a:p>
+          <a:p>
+            <a:pPr marL="171450" indent="-171450">
+              <a:buFontTx/>
+              <a:buChar char="-"/>
+            </a:pPr>
+            <a:r>
+              <a:rPr lang="en-GB" baseline="0" dirty="0" smtClean="0"/>
+              <a:t>The bits can't be grouped as shown for a parity scheme to work </a:t>
+            </a:r>
+          </a:p>
+          <a:p>
+            <a:pPr marL="171450" indent="-171450">
+              <a:buFontTx/>
+              <a:buChar char="-"/>
+            </a:pPr>
+            <a:r>
+              <a:rPr lang="en-GB" baseline="0" dirty="0" smtClean="0"/>
+              <a:t>Instead have to be distributed through the fields that need protecting</a:t>
+            </a:r>
+          </a:p>
+          <a:p>
+            <a:pPr marL="171450" indent="-171450">
+              <a:buFontTx/>
+              <a:buChar char="-"/>
+            </a:pPr>
+            <a:r>
+              <a:rPr lang="en-GB" baseline="0" dirty="0" smtClean="0"/>
+              <a:t>Would require some construction/deconstruction as elements are accessed, but again just rudimentary instructions such as bit ops, shifts </a:t>
+            </a:r>
+            <a:r>
+              <a:rPr lang="en-GB" baseline="0" dirty="0" err="1" smtClean="0"/>
+              <a:t>etc</a:t>
             </a:r>
             <a:endParaRPr lang="en-GB" dirty="0"/>
           </a:p>
@@ -8641,10 +8404,15 @@
           <a:bodyPr/>
           <a:lstStyle/>
           <a:p>
-            <a:fld id="{1C811BE7-51AF-BD41-88D3-08D74CFB37BF}" type="slidenum">
+            <a:pPr>
+              <a:defRPr/>
+            </a:pPr>
+            <a:fld id="{4082635D-059A-CB44-9BFE-E5877B2A18E3}" type="slidenum">
               <a:rPr lang="en-GB" smtClean="0"/>
-              <a:pPr/>
-              <a:t>22</a:t>
+              <a:pPr>
+                <a:defRPr/>
+              </a:pPr>
+              <a:t>21</a:t>
             </a:fld>
             <a:endParaRPr lang="en-GB"/>
           </a:p>
@@ -8653,7 +8421,7 @@
     </p:spTree>
     <p:extLst>
       <p:ext uri="{BB962C8B-B14F-4D97-AF65-F5344CB8AC3E}">
-        <p14:creationId xmlns:p14="http://schemas.microsoft.com/office/powerpoint/2010/main" val="4264065732"/>
+        <p14:creationId xmlns:p14="http://schemas.microsoft.com/office/powerpoint/2010/main" val="2209820087"/>
       </p:ext>
     </p:extLst>
   </p:cSld>
@@ -8707,6 +8475,14 @@
           <a:bodyPr/>
           <a:lstStyle/>
           <a:p>
+            <a:r>
+              <a:rPr lang="en-GB" dirty="0" smtClean="0"/>
+              <a:t>Correction could be done with checkpoint</a:t>
+            </a:r>
+            <a:r>
+              <a:rPr lang="en-GB" baseline="0" dirty="0" smtClean="0"/>
+              <a:t> restart, or reload from second copy of matrix</a:t>
+            </a:r>
             <a:endParaRPr lang="en-GB" dirty="0"/>
           </a:p>
         </p:txBody>
@@ -8729,7 +8505,7 @@
             <a:fld id="{1C811BE7-51AF-BD41-88D3-08D74CFB37BF}" type="slidenum">
               <a:rPr lang="en-GB" smtClean="0"/>
               <a:pPr/>
-              <a:t>23</a:t>
+              <a:t>22</a:t>
             </a:fld>
             <a:endParaRPr lang="en-GB"/>
           </a:p>
@@ -8738,7 +8514,7 @@
     </p:spTree>
     <p:extLst>
       <p:ext uri="{BB962C8B-B14F-4D97-AF65-F5344CB8AC3E}">
-        <p14:creationId xmlns:p14="http://schemas.microsoft.com/office/powerpoint/2010/main" val="2442681378"/>
+        <p14:creationId xmlns:p14="http://schemas.microsoft.com/office/powerpoint/2010/main" val="4264065732"/>
       </p:ext>
     </p:extLst>
   </p:cSld>
@@ -8814,7 +8590,7 @@
             <a:fld id="{1C811BE7-51AF-BD41-88D3-08D74CFB37BF}" type="slidenum">
               <a:rPr lang="en-GB" smtClean="0"/>
               <a:pPr/>
-              <a:t>25</a:t>
+              <a:t>23</a:t>
             </a:fld>
             <a:endParaRPr lang="en-GB"/>
           </a:p>
@@ -8823,7 +8599,7 @@
     </p:spTree>
     <p:extLst>
       <p:ext uri="{BB962C8B-B14F-4D97-AF65-F5344CB8AC3E}">
-        <p14:creationId xmlns:p14="http://schemas.microsoft.com/office/powerpoint/2010/main" val="1269505060"/>
+        <p14:creationId xmlns:p14="http://schemas.microsoft.com/office/powerpoint/2010/main" val="2442681378"/>
       </p:ext>
     </p:extLst>
   </p:cSld>
@@ -8966,14 +8742,6 @@
           <a:bodyPr/>
           <a:lstStyle/>
           <a:p>
-            <a:r>
-              <a:rPr lang="en-GB" dirty="0" smtClean="0"/>
-              <a:t>Invented by</a:t>
-            </a:r>
-            <a:r>
-              <a:rPr lang="en-GB" baseline="0" dirty="0" smtClean="0"/>
-              <a:t> Richard Hamming (Bell labs) in 1950</a:t>
-            </a:r>
             <a:endParaRPr lang="en-GB" dirty="0"/>
           </a:p>
         </p:txBody>
@@ -8996,7 +8764,7 @@
             <a:fld id="{1C811BE7-51AF-BD41-88D3-08D74CFB37BF}" type="slidenum">
               <a:rPr lang="en-GB" smtClean="0"/>
               <a:pPr/>
-              <a:t>29</a:t>
+              <a:t>25</a:t>
             </a:fld>
             <a:endParaRPr lang="en-GB"/>
           </a:p>
@@ -9005,7 +8773,7 @@
     </p:spTree>
     <p:extLst>
       <p:ext uri="{BB962C8B-B14F-4D97-AF65-F5344CB8AC3E}">
-        <p14:creationId xmlns:p14="http://schemas.microsoft.com/office/powerpoint/2010/main" val="3271489321"/>
+        <p14:creationId xmlns:p14="http://schemas.microsoft.com/office/powerpoint/2010/main" val="1269505060"/>
       </p:ext>
     </p:extLst>
   </p:cSld>
@@ -9061,17 +8829,11 @@
           <a:p>
             <a:r>
               <a:rPr lang="en-GB" dirty="0" smtClean="0"/>
-              <a:t>This illustrates the way that each bit</a:t>
+              <a:t>Invented by</a:t>
             </a:r>
             <a:r>
               <a:rPr lang="en-GB" baseline="0" dirty="0" smtClean="0"/>
-              <a:t> is protected by a unique set of parity bits</a:t>
-            </a:r>
-          </a:p>
-          <a:p>
-            <a:r>
-              <a:rPr lang="en-GB" baseline="0" dirty="0" smtClean="0"/>
-              <a:t>e.g. if bit 9 flipped, will show up in parity bits 1 and 4</a:t>
+              <a:t> Richard Hamming (Bell labs) in 1950</a:t>
             </a:r>
             <a:endParaRPr lang="en-GB" dirty="0"/>
           </a:p>
@@ -9095,7 +8857,7 @@
             <a:fld id="{1C811BE7-51AF-BD41-88D3-08D74CFB37BF}" type="slidenum">
               <a:rPr lang="en-GB" smtClean="0"/>
               <a:pPr/>
-              <a:t>31</a:t>
+              <a:t>29</a:t>
             </a:fld>
             <a:endParaRPr lang="en-GB"/>
           </a:p>
@@ -9104,7 +8866,7 @@
     </p:spTree>
     <p:extLst>
       <p:ext uri="{BB962C8B-B14F-4D97-AF65-F5344CB8AC3E}">
-        <p14:creationId xmlns:p14="http://schemas.microsoft.com/office/powerpoint/2010/main" val="2403286589"/>
+        <p14:creationId xmlns:p14="http://schemas.microsoft.com/office/powerpoint/2010/main" val="3271489321"/>
       </p:ext>
     </p:extLst>
   </p:cSld>
@@ -9158,6 +8920,20 @@
           <a:bodyPr/>
           <a:lstStyle/>
           <a:p>
+            <a:r>
+              <a:rPr lang="en-GB" dirty="0" smtClean="0"/>
+              <a:t>This illustrates the way that each bit</a:t>
+            </a:r>
+            <a:r>
+              <a:rPr lang="en-GB" baseline="0" dirty="0" smtClean="0"/>
+              <a:t> is protected by a unique set of parity bits</a:t>
+            </a:r>
+          </a:p>
+          <a:p>
+            <a:r>
+              <a:rPr lang="en-GB" baseline="0" dirty="0" smtClean="0"/>
+              <a:t>e.g. if bit 9 flipped, will show up in parity bits 1 and 4</a:t>
+            </a:r>
             <a:endParaRPr lang="en-GB" dirty="0"/>
           </a:p>
         </p:txBody>
@@ -9180,7 +8956,7 @@
             <a:fld id="{1C811BE7-51AF-BD41-88D3-08D74CFB37BF}" type="slidenum">
               <a:rPr lang="en-GB" smtClean="0"/>
               <a:pPr/>
-              <a:t>33</a:t>
+              <a:t>31</a:t>
             </a:fld>
             <a:endParaRPr lang="en-GB"/>
           </a:p>
@@ -9189,7 +8965,7 @@
     </p:spTree>
     <p:extLst>
       <p:ext uri="{BB962C8B-B14F-4D97-AF65-F5344CB8AC3E}">
-        <p14:creationId xmlns:p14="http://schemas.microsoft.com/office/powerpoint/2010/main" val="2442681378"/>
+        <p14:creationId xmlns:p14="http://schemas.microsoft.com/office/powerpoint/2010/main" val="2403286589"/>
       </p:ext>
     </p:extLst>
   </p:cSld>
@@ -9265,7 +9041,7 @@
             <a:fld id="{1C811BE7-51AF-BD41-88D3-08D74CFB37BF}" type="slidenum">
               <a:rPr lang="en-GB" smtClean="0"/>
               <a:pPr/>
-              <a:t>34</a:t>
+              <a:t>33</a:t>
             </a:fld>
             <a:endParaRPr lang="en-GB"/>
           </a:p>
@@ -9350,7 +9126,7 @@
             <a:fld id="{1C811BE7-51AF-BD41-88D3-08D74CFB37BF}" type="slidenum">
               <a:rPr lang="en-GB" smtClean="0"/>
               <a:pPr/>
-              <a:t>35</a:t>
+              <a:t>34</a:t>
             </a:fld>
             <a:endParaRPr lang="en-GB"/>
           </a:p>
@@ -9435,7 +9211,7 @@
             <a:fld id="{1C811BE7-51AF-BD41-88D3-08D74CFB37BF}" type="slidenum">
               <a:rPr lang="en-GB" smtClean="0"/>
               <a:pPr/>
-              <a:t>36</a:t>
+              <a:t>35</a:t>
             </a:fld>
             <a:endParaRPr lang="en-GB"/>
           </a:p>
@@ -9520,7 +9296,7 @@
             <a:fld id="{1C811BE7-51AF-BD41-88D3-08D74CFB37BF}" type="slidenum">
               <a:rPr lang="en-GB" smtClean="0"/>
               <a:pPr/>
-              <a:t>37</a:t>
+              <a:t>36</a:t>
             </a:fld>
             <a:endParaRPr lang="en-GB"/>
           </a:p>
@@ -9605,7 +9381,7 @@
             <a:fld id="{1C811BE7-51AF-BD41-88D3-08D74CFB37BF}" type="slidenum">
               <a:rPr lang="en-GB" smtClean="0"/>
               <a:pPr/>
-              <a:t>38</a:t>
+              <a:t>37</a:t>
             </a:fld>
             <a:endParaRPr lang="en-GB"/>
           </a:p>
@@ -9690,7 +9466,7 @@
             <a:fld id="{1C811BE7-51AF-BD41-88D3-08D74CFB37BF}" type="slidenum">
               <a:rPr lang="en-GB" smtClean="0"/>
               <a:pPr/>
-              <a:t>39</a:t>
+              <a:t>38</a:t>
             </a:fld>
             <a:endParaRPr lang="en-GB"/>
           </a:p>
@@ -9775,7 +9551,7 @@
             <a:fld id="{1C811BE7-51AF-BD41-88D3-08D74CFB37BF}" type="slidenum">
               <a:rPr lang="en-GB" smtClean="0"/>
               <a:pPr/>
-              <a:t>40</a:t>
+              <a:t>39</a:t>
             </a:fld>
             <a:endParaRPr lang="en-GB"/>
           </a:p>
@@ -9949,7 +9725,7 @@
             <a:fld id="{1C811BE7-51AF-BD41-88D3-08D74CFB37BF}" type="slidenum">
               <a:rPr lang="en-GB" smtClean="0"/>
               <a:pPr/>
-              <a:t>42</a:t>
+              <a:t>40</a:t>
             </a:fld>
             <a:endParaRPr lang="en-GB"/>
           </a:p>
@@ -10012,10 +9788,6 @@
           <a:bodyPr/>
           <a:lstStyle/>
           <a:p>
-            <a:r>
-              <a:rPr lang="en-GB" dirty="0" smtClean="0"/>
-              <a:t>Masks will change if you change where you store the parity bits</a:t>
-            </a:r>
             <a:endParaRPr lang="en-GB" dirty="0"/>
           </a:p>
         </p:txBody>
@@ -10038,7 +9810,7 @@
             <a:fld id="{1C811BE7-51AF-BD41-88D3-08D74CFB37BF}" type="slidenum">
               <a:rPr lang="en-GB" smtClean="0"/>
               <a:pPr/>
-              <a:t>45</a:t>
+              <a:t>42</a:t>
             </a:fld>
             <a:endParaRPr lang="en-GB"/>
           </a:p>
@@ -10047,7 +9819,7 @@
     </p:spTree>
     <p:extLst>
       <p:ext uri="{BB962C8B-B14F-4D97-AF65-F5344CB8AC3E}">
-        <p14:creationId xmlns:p14="http://schemas.microsoft.com/office/powerpoint/2010/main" val="2174565375"/>
+        <p14:creationId xmlns:p14="http://schemas.microsoft.com/office/powerpoint/2010/main" val="2442681378"/>
       </p:ext>
     </p:extLst>
   </p:cSld>
@@ -10103,11 +9875,7 @@
           <a:p>
             <a:r>
               <a:rPr lang="en-GB" dirty="0" smtClean="0"/>
-              <a:t>Since data corruption should be very infrequent,</a:t>
-            </a:r>
-            <a:r>
-              <a:rPr lang="en-GB" baseline="0" dirty="0" smtClean="0"/>
-              <a:t> we will very rarely pay the full cost of checking all 7 parity bits</a:t>
+              <a:t>Masks will change if you change where you store the parity bits</a:t>
             </a:r>
             <a:endParaRPr lang="en-GB" dirty="0"/>
           </a:p>
@@ -10131,7 +9899,7 @@
             <a:fld id="{1C811BE7-51AF-BD41-88D3-08D74CFB37BF}" type="slidenum">
               <a:rPr lang="en-GB" smtClean="0"/>
               <a:pPr/>
-              <a:t>47</a:t>
+              <a:t>45</a:t>
             </a:fld>
             <a:endParaRPr lang="en-GB"/>
           </a:p>
@@ -10140,7 +9908,7 @@
     </p:spTree>
     <p:extLst>
       <p:ext uri="{BB962C8B-B14F-4D97-AF65-F5344CB8AC3E}">
-        <p14:creationId xmlns:p14="http://schemas.microsoft.com/office/powerpoint/2010/main" val="645188229"/>
+        <p14:creationId xmlns:p14="http://schemas.microsoft.com/office/powerpoint/2010/main" val="2174565375"/>
       </p:ext>
     </p:extLst>
   </p:cSld>
@@ -10194,6 +9962,14 @@
           <a:bodyPr/>
           <a:lstStyle/>
           <a:p>
+            <a:r>
+              <a:rPr lang="en-GB" dirty="0" smtClean="0"/>
+              <a:t>Since data corruption should be very infrequent,</a:t>
+            </a:r>
+            <a:r>
+              <a:rPr lang="en-GB" baseline="0" dirty="0" smtClean="0"/>
+              <a:t> we will very rarely pay the full cost of checking all 7 parity bits</a:t>
+            </a:r>
             <a:endParaRPr lang="en-GB" dirty="0"/>
           </a:p>
         </p:txBody>
@@ -10216,7 +9992,7 @@
             <a:fld id="{1C811BE7-51AF-BD41-88D3-08D74CFB37BF}" type="slidenum">
               <a:rPr lang="en-GB" smtClean="0"/>
               <a:pPr/>
-              <a:t>48</a:t>
+              <a:t>47</a:t>
             </a:fld>
             <a:endParaRPr lang="en-GB"/>
           </a:p>
@@ -10225,7 +10001,7 @@
     </p:spTree>
     <p:extLst>
       <p:ext uri="{BB962C8B-B14F-4D97-AF65-F5344CB8AC3E}">
-        <p14:creationId xmlns:p14="http://schemas.microsoft.com/office/powerpoint/2010/main" val="2174565375"/>
+        <p14:creationId xmlns:p14="http://schemas.microsoft.com/office/powerpoint/2010/main" val="645188229"/>
       </p:ext>
     </p:extLst>
   </p:cSld>
@@ -10301,7 +10077,7 @@
             <a:fld id="{1C811BE7-51AF-BD41-88D3-08D74CFB37BF}" type="slidenum">
               <a:rPr lang="en-GB" smtClean="0"/>
               <a:pPr/>
-              <a:t>50</a:t>
+              <a:t>48</a:t>
             </a:fld>
             <a:endParaRPr lang="en-GB"/>
           </a:p>
@@ -10310,7 +10086,7 @@
     </p:spTree>
     <p:extLst>
       <p:ext uri="{BB962C8B-B14F-4D97-AF65-F5344CB8AC3E}">
-        <p14:creationId xmlns:p14="http://schemas.microsoft.com/office/powerpoint/2010/main" val="645188229"/>
+        <p14:creationId xmlns:p14="http://schemas.microsoft.com/office/powerpoint/2010/main" val="2174565375"/>
       </p:ext>
     </p:extLst>
   </p:cSld>
@@ -10386,7 +10162,7 @@
             <a:fld id="{1C811BE7-51AF-BD41-88D3-08D74CFB37BF}" type="slidenum">
               <a:rPr lang="en-GB" smtClean="0"/>
               <a:pPr/>
-              <a:t>51</a:t>
+              <a:t>50</a:t>
             </a:fld>
             <a:endParaRPr lang="en-GB"/>
           </a:p>
@@ -10395,7 +10171,7 @@
     </p:spTree>
     <p:extLst>
       <p:ext uri="{BB962C8B-B14F-4D97-AF65-F5344CB8AC3E}">
-        <p14:creationId xmlns:p14="http://schemas.microsoft.com/office/powerpoint/2010/main" val="2174565375"/>
+        <p14:creationId xmlns:p14="http://schemas.microsoft.com/office/powerpoint/2010/main" val="645188229"/>
       </p:ext>
     </p:extLst>
   </p:cSld>
@@ -10449,22 +10225,6 @@
           <a:bodyPr/>
           <a:lstStyle/>
           <a:p>
-            <a:r>
-              <a:rPr lang="en-GB" dirty="0" smtClean="0"/>
-              <a:t>Could run expensive schemes only every</a:t>
-            </a:r>
-            <a:r>
-              <a:rPr lang="en-GB" baseline="0" dirty="0" smtClean="0"/>
-              <a:t> X iterations to reduce overheads (need checkpoint to </a:t>
-            </a:r>
-            <a:r>
-              <a:rPr lang="en-GB" baseline="0" dirty="0" err="1" smtClean="0"/>
-              <a:t>fallback</a:t>
-            </a:r>
-            <a:r>
-              <a:rPr lang="en-GB" baseline="0" dirty="0" smtClean="0"/>
-              <a:t> on)</a:t>
-            </a:r>
             <a:endParaRPr lang="en-GB" dirty="0"/>
           </a:p>
         </p:txBody>
@@ -10487,7 +10247,7 @@
             <a:fld id="{1C811BE7-51AF-BD41-88D3-08D74CFB37BF}" type="slidenum">
               <a:rPr lang="en-GB" smtClean="0"/>
               <a:pPr/>
-              <a:t>52</a:t>
+              <a:t>51</a:t>
             </a:fld>
             <a:endParaRPr lang="en-GB"/>
           </a:p>
@@ -10496,7 +10256,7 @@
     </p:spTree>
     <p:extLst>
       <p:ext uri="{BB962C8B-B14F-4D97-AF65-F5344CB8AC3E}">
-        <p14:creationId xmlns:p14="http://schemas.microsoft.com/office/powerpoint/2010/main" val="2761030481"/>
+        <p14:creationId xmlns:p14="http://schemas.microsoft.com/office/powerpoint/2010/main" val="2174565375"/>
       </p:ext>
     </p:extLst>
   </p:cSld>
@@ -10550,6 +10310,107 @@
           <a:bodyPr/>
           <a:lstStyle/>
           <a:p>
+            <a:r>
+              <a:rPr lang="en-GB" dirty="0" smtClean="0"/>
+              <a:t>Could run expensive schemes only every</a:t>
+            </a:r>
+            <a:r>
+              <a:rPr lang="en-GB" baseline="0" dirty="0" smtClean="0"/>
+              <a:t> X iterations to reduce overheads (need checkpoint to </a:t>
+            </a:r>
+            <a:r>
+              <a:rPr lang="en-GB" baseline="0" dirty="0" err="1" smtClean="0"/>
+              <a:t>fallback</a:t>
+            </a:r>
+            <a:r>
+              <a:rPr lang="en-GB" baseline="0" dirty="0" smtClean="0"/>
+              <a:t> on)</a:t>
+            </a:r>
+            <a:endParaRPr lang="en-GB" dirty="0"/>
+          </a:p>
+        </p:txBody>
+      </p:sp>
+      <p:sp>
+        <p:nvSpPr>
+          <p:cNvPr id="4" name="Slide Number Placeholder 3"/>
+          <p:cNvSpPr>
+            <a:spLocks noGrp="1"/>
+          </p:cNvSpPr>
+          <p:nvPr>
+            <p:ph type="sldNum" sz="quarter" idx="10"/>
+          </p:nvPr>
+        </p:nvSpPr>
+        <p:spPr/>
+        <p:txBody>
+          <a:bodyPr/>
+          <a:lstStyle/>
+          <a:p>
+            <a:fld id="{1C811BE7-51AF-BD41-88D3-08D74CFB37BF}" type="slidenum">
+              <a:rPr lang="en-GB" smtClean="0"/>
+              <a:pPr/>
+              <a:t>52</a:t>
+            </a:fld>
+            <a:endParaRPr lang="en-GB"/>
+          </a:p>
+        </p:txBody>
+      </p:sp>
+    </p:spTree>
+    <p:extLst>
+      <p:ext uri="{BB962C8B-B14F-4D97-AF65-F5344CB8AC3E}">
+        <p14:creationId xmlns:p14="http://schemas.microsoft.com/office/powerpoint/2010/main" val="2761030481"/>
+      </p:ext>
+    </p:extLst>
+  </p:cSld>
+  <p:clrMapOvr>
+    <a:masterClrMapping/>
+  </p:clrMapOvr>
+</p:notes>
+</file>
+
+<file path=ppt/notesSlides/notesSlide38.xml><?xml version="1.0" encoding="utf-8"?>
+<p:notes xmlns:a="http://schemas.openxmlformats.org/drawingml/2006/main" xmlns:r="http://schemas.openxmlformats.org/officeDocument/2006/relationships" xmlns:p="http://schemas.openxmlformats.org/presentationml/2006/main">
+  <p:cSld>
+    <p:spTree>
+      <p:nvGrpSpPr>
+        <p:cNvPr id="1" name=""/>
+        <p:cNvGrpSpPr/>
+        <p:nvPr/>
+      </p:nvGrpSpPr>
+      <p:grpSpPr>
+        <a:xfrm>
+          <a:off x="0" y="0"/>
+          <a:ext cx="0" cy="0"/>
+          <a:chOff x="0" y="0"/>
+          <a:chExt cx="0" cy="0"/>
+        </a:xfrm>
+      </p:grpSpPr>
+      <p:sp>
+        <p:nvSpPr>
+          <p:cNvPr id="2" name="Slide Image Placeholder 1"/>
+          <p:cNvSpPr>
+            <a:spLocks noGrp="1" noRot="1" noChangeAspect="1"/>
+          </p:cNvSpPr>
+          <p:nvPr>
+            <p:ph type="sldImg"/>
+          </p:nvPr>
+        </p:nvSpPr>
+        <p:spPr/>
+      </p:sp>
+      <p:sp>
+        <p:nvSpPr>
+          <p:cNvPr id="3" name="Notes Placeholder 2"/>
+          <p:cNvSpPr>
+            <a:spLocks noGrp="1"/>
+          </p:cNvSpPr>
+          <p:nvPr>
+            <p:ph type="body" idx="1"/>
+          </p:nvPr>
+        </p:nvSpPr>
+        <p:spPr/>
+        <p:txBody>
+          <a:bodyPr/>
+          <a:lstStyle/>
+          <a:p>
             <a:endParaRPr lang="en-GB" dirty="0"/>
           </a:p>
         </p:txBody>
@@ -10591,7 +10452,7 @@
 </p:notes>
 </file>
 
-<file path=ppt/notesSlides/notesSlide38.xml><?xml version="1.0" encoding="utf-8"?>
+<file path=ppt/notesSlides/notesSlide39.xml><?xml version="1.0" encoding="utf-8"?>
 <p:notes xmlns:a="http://schemas.openxmlformats.org/drawingml/2006/main" xmlns:r="http://schemas.openxmlformats.org/officeDocument/2006/relationships" xmlns:p="http://schemas.openxmlformats.org/presentationml/2006/main">
   <p:cSld>
     <p:spTree>
@@ -11251,8 +11112,12 @@
           <a:lstStyle/>
           <a:p>
             <a:r>
+              <a:rPr lang="en-GB" smtClean="0"/>
+              <a:t>NASA </a:t>
+            </a:r>
+            <a:r>
               <a:rPr lang="en-GB" dirty="0" smtClean="0"/>
-              <a:t>NSAS shuttle rocket booster</a:t>
+              <a:t>shuttle rocket booster</a:t>
             </a:r>
           </a:p>
           <a:p>
@@ -17715,7 +17580,7 @@
       </p:grpSpPr>
       <p:pic>
         <p:nvPicPr>
-          <p:cNvPr id="25" name="Picture 24" descr="nasasrb.png"/>
+          <p:cNvPr id="18" name="Picture 17" descr="nasasrb.pdf"/>
           <p:cNvPicPr>
             <a:picLocks noChangeAspect="1"/>
           </p:cNvPicPr>
@@ -17734,9 +17599,9 @@
           </a:stretch>
         </p:blipFill>
         <p:spPr>
-          <a:xfrm>
-            <a:off x="7278479" y="107835"/>
-            <a:ext cx="1533652" cy="1150239"/>
+          <a:xfrm rot="5400000">
+            <a:off x="1328677" y="-297543"/>
+            <a:ext cx="6100528" cy="7894800"/>
           </a:xfrm>
           <a:prstGeom prst="rect">
             <a:avLst/>
@@ -17745,14 +17610,14 @@
       </p:pic>
       <p:pic>
         <p:nvPicPr>
-          <p:cNvPr id="26" name="Picture 25" descr="nasasrb.pdf"/>
+          <p:cNvPr id="25" name="Picture 24" descr="nasasrb.png"/>
           <p:cNvPicPr>
             <a:picLocks noChangeAspect="1"/>
           </p:cNvPicPr>
           <p:nvPr/>
         </p:nvPicPr>
         <p:blipFill>
-          <a:blip>
+          <a:blip r:embed="rId4">
             <a:extLst>
               <a:ext uri="{28A0092B-C50C-407E-A947-70E740481C1C}">
                 <a14:useLocalDpi xmlns:a14="http://schemas.microsoft.com/office/drawing/2010/main" val="0"/>
@@ -17764,9 +17629,9 @@
           </a:stretch>
         </p:blipFill>
         <p:spPr>
-          <a:xfrm rot="5400000">
-            <a:off x="1328677" y="-297543"/>
-            <a:ext cx="6100528" cy="7894800"/>
+          <a:xfrm>
+            <a:off x="7278479" y="107835"/>
+            <a:ext cx="1533652" cy="1150239"/>
           </a:xfrm>
           <a:prstGeom prst="rect">
             <a:avLst/>
@@ -19402,6 +19267,13 @@
       <p:transition xmlns:p14="http://schemas.microsoft.com/office/powerpoint/2010/main" spd="slow"/>
     </mc:Fallback>
   </mc:AlternateContent>
+  <p:timing>
+    <p:tnLst>
+      <p:par>
+        <p:cTn xmlns:p14="http://schemas.microsoft.com/office/powerpoint/2010/main" id="1" dur="indefinite" restart="never" nodeType="tmRoot"/>
+      </p:par>
+    </p:tnLst>
+  </p:timing>
 </p:sld>
 </file>
 
@@ -19555,7 +19427,6 @@
               <a:rPr lang="en-GB" dirty="0" smtClean="0"/>
               <a:t>’)</a:t>
             </a:r>
-            <a:endParaRPr lang="en-GB" dirty="0" smtClean="0"/>
           </a:p>
         </p:txBody>
       </p:sp>
@@ -19700,7 +19571,6 @@
               <a:rPr lang="en-GB" dirty="0" smtClean="0"/>
               <a:t>)</a:t>
             </a:r>
-            <a:endParaRPr lang="en-GB" dirty="0" smtClean="0"/>
           </a:p>
           <a:p>
             <a:pPr lvl="1"/>
@@ -19748,7 +19618,6 @@
               <a:rPr lang="en-GB" dirty="0" smtClean="0"/>
               <a:t>scheme yourself!</a:t>
             </a:r>
-            <a:endParaRPr lang="en-GB" dirty="0" smtClean="0"/>
           </a:p>
         </p:txBody>
       </p:sp>
@@ -56989,7 +56858,6 @@
               <a:rPr lang="en-GB" sz="2800" dirty="0" smtClean="0"/>
               <a:t> to control where to flip the bits)</a:t>
             </a:r>
-            <a:endParaRPr lang="en-GB" sz="2800" dirty="0" smtClean="0"/>
           </a:p>
           <a:p>
             <a:r>
@@ -57176,22 +57044,11 @@
                 <a:latin typeface="Courier New"/>
                 <a:cs typeface="Courier New"/>
               </a:rPr>
-              <a:t>–</a:t>
-            </a:r>
-            <a:r>
-              <a:rPr lang="en-GB" sz="2400" dirty="0" smtClean="0">
-                <a:latin typeface="Courier New"/>
-                <a:cs typeface="Courier New"/>
-              </a:rPr>
-              <a:t>x 2</a:t>
+              <a:t>–x 2</a:t>
             </a:r>
             <a:r>
               <a:rPr lang="en-GB" sz="2400" dirty="0" smtClean="0"/>
-              <a:t>’ option to </a:t>
-            </a:r>
-            <a:r>
-              <a:rPr lang="en-GB" sz="2400" dirty="0" smtClean="0"/>
-              <a:t>inject a double-bit flip)</a:t>
+              <a:t>’ option to inject a double-bit flip)</a:t>
             </a:r>
           </a:p>
           <a:p>

</xml_diff>